<commit_message>
documentation & margins ppt/png update
</commit_message>
<xml_diff>
--- a/man/figures/margins.pptx
+++ b/man/figures/margins.pptx
@@ -104,6 +104,11 @@
       </a:defRPr>
     </a:lvl9pPr>
   </p:defaultTextStyle>
+  <p:extLst>
+    <p:ext uri="{EFAFB233-063F-42B5-8137-9DF3F51BA10A}">
+      <p15:sldGuideLst xmlns:p15="http://schemas.microsoft.com/office/powerpoint/2012/main"/>
+    </p:ext>
+  </p:extLst>
 </p:presentation>
 </file>
 
@@ -238,7 +243,7 @@
           <a:p>
             <a:fld id="{601E7828-7FC6-4336-B4EC-5F99010F00A5}" type="datetimeFigureOut">
               <a:rPr lang="en-US" smtClean="0"/>
-              <a:t>10/10/2020</a:t>
+              <a:t>11/2/2020</a:t>
             </a:fld>
             <a:endParaRPr lang="en-US"/>
           </a:p>
@@ -408,7 +413,7 @@
           <a:p>
             <a:fld id="{601E7828-7FC6-4336-B4EC-5F99010F00A5}" type="datetimeFigureOut">
               <a:rPr lang="en-US" smtClean="0"/>
-              <a:t>10/10/2020</a:t>
+              <a:t>11/2/2020</a:t>
             </a:fld>
             <a:endParaRPr lang="en-US"/>
           </a:p>
@@ -588,7 +593,7 @@
           <a:p>
             <a:fld id="{601E7828-7FC6-4336-B4EC-5F99010F00A5}" type="datetimeFigureOut">
               <a:rPr lang="en-US" smtClean="0"/>
-              <a:t>10/10/2020</a:t>
+              <a:t>11/2/2020</a:t>
             </a:fld>
             <a:endParaRPr lang="en-US"/>
           </a:p>
@@ -758,7 +763,7 @@
           <a:p>
             <a:fld id="{601E7828-7FC6-4336-B4EC-5F99010F00A5}" type="datetimeFigureOut">
               <a:rPr lang="en-US" smtClean="0"/>
-              <a:t>10/10/2020</a:t>
+              <a:t>11/2/2020</a:t>
             </a:fld>
             <a:endParaRPr lang="en-US"/>
           </a:p>
@@ -1004,7 +1009,7 @@
           <a:p>
             <a:fld id="{601E7828-7FC6-4336-B4EC-5F99010F00A5}" type="datetimeFigureOut">
               <a:rPr lang="en-US" smtClean="0"/>
-              <a:t>10/10/2020</a:t>
+              <a:t>11/2/2020</a:t>
             </a:fld>
             <a:endParaRPr lang="en-US"/>
           </a:p>
@@ -1236,7 +1241,7 @@
           <a:p>
             <a:fld id="{601E7828-7FC6-4336-B4EC-5F99010F00A5}" type="datetimeFigureOut">
               <a:rPr lang="en-US" smtClean="0"/>
-              <a:t>10/10/2020</a:t>
+              <a:t>11/2/2020</a:t>
             </a:fld>
             <a:endParaRPr lang="en-US"/>
           </a:p>
@@ -1603,7 +1608,7 @@
           <a:p>
             <a:fld id="{601E7828-7FC6-4336-B4EC-5F99010F00A5}" type="datetimeFigureOut">
               <a:rPr lang="en-US" smtClean="0"/>
-              <a:t>10/10/2020</a:t>
+              <a:t>11/2/2020</a:t>
             </a:fld>
             <a:endParaRPr lang="en-US"/>
           </a:p>
@@ -1721,7 +1726,7 @@
           <a:p>
             <a:fld id="{601E7828-7FC6-4336-B4EC-5F99010F00A5}" type="datetimeFigureOut">
               <a:rPr lang="en-US" smtClean="0"/>
-              <a:t>10/10/2020</a:t>
+              <a:t>11/2/2020</a:t>
             </a:fld>
             <a:endParaRPr lang="en-US"/>
           </a:p>
@@ -1816,7 +1821,7 @@
           <a:p>
             <a:fld id="{601E7828-7FC6-4336-B4EC-5F99010F00A5}" type="datetimeFigureOut">
               <a:rPr lang="en-US" smtClean="0"/>
-              <a:t>10/10/2020</a:t>
+              <a:t>11/2/2020</a:t>
             </a:fld>
             <a:endParaRPr lang="en-US"/>
           </a:p>
@@ -2093,7 +2098,7 @@
           <a:p>
             <a:fld id="{601E7828-7FC6-4336-B4EC-5F99010F00A5}" type="datetimeFigureOut">
               <a:rPr lang="en-US" smtClean="0"/>
-              <a:t>10/10/2020</a:t>
+              <a:t>11/2/2020</a:t>
             </a:fld>
             <a:endParaRPr lang="en-US"/>
           </a:p>
@@ -2346,7 +2351,7 @@
           <a:p>
             <a:fld id="{601E7828-7FC6-4336-B4EC-5F99010F00A5}" type="datetimeFigureOut">
               <a:rPr lang="en-US" smtClean="0"/>
-              <a:t>10/10/2020</a:t>
+              <a:t>11/2/2020</a:t>
             </a:fld>
             <a:endParaRPr lang="en-US"/>
           </a:p>
@@ -2559,7 +2564,7 @@
           <a:p>
             <a:fld id="{601E7828-7FC6-4336-B4EC-5F99010F00A5}" type="datetimeFigureOut">
               <a:rPr lang="en-US" smtClean="0"/>
-              <a:t>10/10/2020</a:t>
+              <a:t>11/2/2020</a:t>
             </a:fld>
             <a:endParaRPr lang="en-US"/>
           </a:p>
@@ -3801,7 +3806,7 @@
           </a:xfrm>
           <a:prstGeom prst="leftBrace">
             <a:avLst>
-              <a:gd name="adj1" fmla="val 79717"/>
+              <a:gd name="adj1" fmla="val 33569"/>
               <a:gd name="adj2" fmla="val 50000"/>
             </a:avLst>
           </a:prstGeom>
@@ -3984,7 +3989,7 @@
         <p:spPr>
           <a:xfrm>
             <a:off x="1524000" y="6471570"/>
-            <a:ext cx="9052560" cy="369332"/>
+            <a:ext cx="10608008" cy="369332"/>
           </a:xfrm>
           <a:prstGeom prst="rect">
             <a:avLst/>
@@ -4027,7 +4032,31 @@
                   <a:srgbClr val="7030A0"/>
                 </a:solidFill>
               </a:rPr>
-              <a:t>                                                                        </a:t>
+              <a:t>                                                       </a:t>
+            </a:r>
+            <a:r>
+              <a:rPr lang="en-US" dirty="0" smtClean="0">
+                <a:solidFill>
+                  <a:srgbClr val="7030A0"/>
+                </a:solidFill>
+              </a:rPr>
+              <a:t> </a:t>
+            </a:r>
+            <a:r>
+              <a:rPr lang="en-US" dirty="0" err="1" smtClean="0">
+                <a:solidFill>
+                  <a:srgbClr val="7030A0"/>
+                </a:solidFill>
+              </a:rPr>
+              <a:t>margin_panel_r</a:t>
+            </a:r>
+            <a:r>
+              <a:rPr lang="en-US" dirty="0" smtClean="0">
+                <a:solidFill>
+                  <a:srgbClr val="7030A0"/>
+                </a:solidFill>
+              </a:rPr>
+              <a:t>   </a:t>
             </a:r>
             <a:r>
               <a:rPr lang="en-US" dirty="0" err="1" smtClean="0">
@@ -4177,6 +4206,52 @@
                 <a:srgbClr val="7030A0"/>
               </a:solidFill>
             </a:endParaRPr>
+          </a:p>
+        </p:txBody>
+      </p:sp>
+      <p:sp>
+        <p:nvSpPr>
+          <p:cNvPr id="39" name="Left Brace 38"/>
+          <p:cNvSpPr/>
+          <p:nvPr/>
+        </p:nvSpPr>
+        <p:spPr>
+          <a:xfrm rot="5400000" flipH="1">
+            <a:off x="9522625" y="6318094"/>
+            <a:ext cx="112084" cy="109836"/>
+          </a:xfrm>
+          <a:prstGeom prst="leftBrace">
+            <a:avLst>
+              <a:gd name="adj1" fmla="val 25000"/>
+              <a:gd name="adj2" fmla="val 50000"/>
+            </a:avLst>
+          </a:prstGeom>
+          <a:ln w="19050">
+            <a:solidFill>
+              <a:srgbClr val="7030A0"/>
+            </a:solidFill>
+          </a:ln>
+        </p:spPr>
+        <p:style>
+          <a:lnRef idx="1">
+            <a:schemeClr val="accent1"/>
+          </a:lnRef>
+          <a:fillRef idx="0">
+            <a:schemeClr val="accent1"/>
+          </a:fillRef>
+          <a:effectRef idx="0">
+            <a:schemeClr val="accent1"/>
+          </a:effectRef>
+          <a:fontRef idx="minor">
+            <a:schemeClr val="tx1"/>
+          </a:fontRef>
+        </p:style>
+        <p:txBody>
+          <a:bodyPr rtlCol="0" anchor="ctr"/>
+          <a:lstStyle/>
+          <a:p>
+            <a:pPr algn="ctr"/>
+            <a:endParaRPr lang="en-US"/>
           </a:p>
         </p:txBody>
       </p:sp>

</xml_diff>

<commit_message>
Update margins to new graph
Also eliminate outdated call to legend_bump
</commit_message>
<xml_diff>
--- a/man/figures/margins.pptx
+++ b/man/figures/margins.pptx
@@ -2,12 +2,12 @@
 <file path=ppt/presentation.xml><?xml version="1.0" encoding="utf-8"?>
 <p:presentation xmlns:a="http://schemas.openxmlformats.org/drawingml/2006/main" xmlns:r="http://schemas.openxmlformats.org/officeDocument/2006/relationships" xmlns:p="http://schemas.openxmlformats.org/presentationml/2006/main" saveSubsetFonts="1">
   <p:sldMasterIdLst>
-    <p:sldMasterId id="2147483660" r:id="rId1"/>
+    <p:sldMasterId id="2147483672" r:id="rId1"/>
   </p:sldMasterIdLst>
   <p:sldIdLst>
     <p:sldId id="256" r:id="rId2"/>
   </p:sldIdLst>
-  <p:sldSz cx="12192000" cy="8229600"/>
+  <p:sldSz cx="13716000" cy="8229600"/>
   <p:notesSz cx="6858000" cy="9144000"/>
   <p:defaultTextStyle>
     <a:defPPr>
@@ -141,20 +141,20 @@
         </p:nvSpPr>
         <p:spPr>
           <a:xfrm>
-            <a:off x="914400" y="1346836"/>
-            <a:ext cx="10363200" cy="2865120"/>
+            <a:off x="1714500" y="1346836"/>
+            <a:ext cx="10287000" cy="2865120"/>
           </a:xfrm>
         </p:spPr>
         <p:txBody>
           <a:bodyPr anchor="b"/>
           <a:lstStyle>
             <a:lvl1pPr algn="ctr">
-              <a:defRPr sz="7200"/>
+              <a:defRPr sz="6750"/>
             </a:lvl1pPr>
           </a:lstStyle>
           <a:p>
             <a:r>
-              <a:rPr lang="en-US" smtClean="0"/>
+              <a:rPr lang="en-US"/>
               <a:t>Click to edit Master title style</a:t>
             </a:r>
             <a:endParaRPr lang="en-US" dirty="0"/>
@@ -173,8 +173,8 @@
         </p:nvSpPr>
         <p:spPr>
           <a:xfrm>
-            <a:off x="1524000" y="4322446"/>
-            <a:ext cx="9144000" cy="1986914"/>
+            <a:off x="1714500" y="4322446"/>
+            <a:ext cx="10287000" cy="1986914"/>
           </a:xfrm>
         </p:spPr>
         <p:txBody>
@@ -182,44 +182,44 @@
           <a:lstStyle>
             <a:lvl1pPr marL="0" indent="0" algn="ctr">
               <a:buNone/>
-              <a:defRPr sz="2880"/>
+              <a:defRPr sz="2700"/>
             </a:lvl1pPr>
-            <a:lvl2pPr marL="548640" indent="0" algn="ctr">
-              <a:buNone/>
-              <a:defRPr sz="2400"/>
+            <a:lvl2pPr marL="514350" indent="0" algn="ctr">
+              <a:buNone/>
+              <a:defRPr sz="2250"/>
             </a:lvl2pPr>
-            <a:lvl3pPr marL="1097280" indent="0" algn="ctr">
-              <a:buNone/>
-              <a:defRPr sz="2160"/>
+            <a:lvl3pPr marL="1028700" indent="0" algn="ctr">
+              <a:buNone/>
+              <a:defRPr sz="2025"/>
             </a:lvl3pPr>
-            <a:lvl4pPr marL="1645920" indent="0" algn="ctr">
-              <a:buNone/>
-              <a:defRPr sz="1920"/>
+            <a:lvl4pPr marL="1543050" indent="0" algn="ctr">
+              <a:buNone/>
+              <a:defRPr sz="1800"/>
             </a:lvl4pPr>
-            <a:lvl5pPr marL="2194560" indent="0" algn="ctr">
-              <a:buNone/>
-              <a:defRPr sz="1920"/>
+            <a:lvl5pPr marL="2057400" indent="0" algn="ctr">
+              <a:buNone/>
+              <a:defRPr sz="1800"/>
             </a:lvl5pPr>
-            <a:lvl6pPr marL="2743200" indent="0" algn="ctr">
-              <a:buNone/>
-              <a:defRPr sz="1920"/>
+            <a:lvl6pPr marL="2571750" indent="0" algn="ctr">
+              <a:buNone/>
+              <a:defRPr sz="1800"/>
             </a:lvl6pPr>
-            <a:lvl7pPr marL="3291840" indent="0" algn="ctr">
-              <a:buNone/>
-              <a:defRPr sz="1920"/>
+            <a:lvl7pPr marL="3086100" indent="0" algn="ctr">
+              <a:buNone/>
+              <a:defRPr sz="1800"/>
             </a:lvl7pPr>
-            <a:lvl8pPr marL="3840480" indent="0" algn="ctr">
-              <a:buNone/>
-              <a:defRPr sz="1920"/>
+            <a:lvl8pPr marL="3600450" indent="0" algn="ctr">
+              <a:buNone/>
+              <a:defRPr sz="1800"/>
             </a:lvl8pPr>
-            <a:lvl9pPr marL="4389120" indent="0" algn="ctr">
-              <a:buNone/>
-              <a:defRPr sz="1920"/>
+            <a:lvl9pPr marL="4114800" indent="0" algn="ctr">
+              <a:buNone/>
+              <a:defRPr sz="1800"/>
             </a:lvl9pPr>
           </a:lstStyle>
           <a:p>
             <a:r>
-              <a:rPr lang="en-US" smtClean="0"/>
+              <a:rPr lang="en-US"/>
               <a:t>Click to edit Master subtitle style</a:t>
             </a:r>
             <a:endParaRPr lang="en-US" dirty="0"/>
@@ -294,7 +294,7 @@
     </p:spTree>
     <p:extLst>
       <p:ext uri="{BB962C8B-B14F-4D97-AF65-F5344CB8AC3E}">
-        <p14:creationId xmlns:p14="http://schemas.microsoft.com/office/powerpoint/2010/main" val="2994307640"/>
+        <p14:creationId xmlns:p14="http://schemas.microsoft.com/office/powerpoint/2010/main" val="212239826"/>
       </p:ext>
     </p:extLst>
   </p:cSld>
@@ -337,7 +337,7 @@
           <a:lstStyle/>
           <a:p>
             <a:r>
-              <a:rPr lang="en-US" smtClean="0"/>
+              <a:rPr lang="en-US"/>
               <a:t>Click to edit Master title style</a:t>
             </a:r>
             <a:endParaRPr lang="en-US" dirty="0"/>
@@ -361,35 +361,35 @@
           <a:p>
             <a:pPr lvl="0"/>
             <a:r>
-              <a:rPr lang="en-US" smtClean="0"/>
-              <a:t>Edit Master text styles</a:t>
+              <a:rPr lang="en-US"/>
+              <a:t>Click to edit Master text styles</a:t>
             </a:r>
           </a:p>
           <a:p>
             <a:pPr lvl="1"/>
             <a:r>
-              <a:rPr lang="en-US" smtClean="0"/>
+              <a:rPr lang="en-US"/>
               <a:t>Second level</a:t>
             </a:r>
           </a:p>
           <a:p>
             <a:pPr lvl="2"/>
             <a:r>
-              <a:rPr lang="en-US" smtClean="0"/>
+              <a:rPr lang="en-US"/>
               <a:t>Third level</a:t>
             </a:r>
           </a:p>
           <a:p>
             <a:pPr lvl="3"/>
             <a:r>
-              <a:rPr lang="en-US" smtClean="0"/>
+              <a:rPr lang="en-US"/>
               <a:t>Fourth level</a:t>
             </a:r>
           </a:p>
           <a:p>
             <a:pPr lvl="4"/>
             <a:r>
-              <a:rPr lang="en-US" smtClean="0"/>
+              <a:rPr lang="en-US"/>
               <a:t>Fifth level</a:t>
             </a:r>
             <a:endParaRPr lang="en-US" dirty="0"/>
@@ -464,7 +464,7 @@
     </p:spTree>
     <p:extLst>
       <p:ext uri="{BB962C8B-B14F-4D97-AF65-F5344CB8AC3E}">
-        <p14:creationId xmlns:p14="http://schemas.microsoft.com/office/powerpoint/2010/main" val="3946539244"/>
+        <p14:creationId xmlns:p14="http://schemas.microsoft.com/office/powerpoint/2010/main" val="3032142942"/>
       </p:ext>
     </p:extLst>
   </p:cSld>
@@ -503,8 +503,8 @@
         </p:nvSpPr>
         <p:spPr>
           <a:xfrm>
-            <a:off x="8724901" y="438150"/>
-            <a:ext cx="2628900" cy="6974206"/>
+            <a:off x="9815512" y="438150"/>
+            <a:ext cx="2957513" cy="6974206"/>
           </a:xfrm>
         </p:spPr>
         <p:txBody>
@@ -512,7 +512,7 @@
           <a:lstStyle/>
           <a:p>
             <a:r>
-              <a:rPr lang="en-US" smtClean="0"/>
+              <a:rPr lang="en-US"/>
               <a:t>Click to edit Master title style</a:t>
             </a:r>
             <a:endParaRPr lang="en-US" dirty="0"/>
@@ -531,8 +531,8 @@
         </p:nvSpPr>
         <p:spPr>
           <a:xfrm>
-            <a:off x="838201" y="438150"/>
-            <a:ext cx="7734300" cy="6974206"/>
+            <a:off x="942975" y="438150"/>
+            <a:ext cx="8701088" cy="6974206"/>
           </a:xfrm>
         </p:spPr>
         <p:txBody>
@@ -541,35 +541,35 @@
           <a:p>
             <a:pPr lvl="0"/>
             <a:r>
-              <a:rPr lang="en-US" smtClean="0"/>
-              <a:t>Edit Master text styles</a:t>
+              <a:rPr lang="en-US"/>
+              <a:t>Click to edit Master text styles</a:t>
             </a:r>
           </a:p>
           <a:p>
             <a:pPr lvl="1"/>
             <a:r>
-              <a:rPr lang="en-US" smtClean="0"/>
+              <a:rPr lang="en-US"/>
               <a:t>Second level</a:t>
             </a:r>
           </a:p>
           <a:p>
             <a:pPr lvl="2"/>
             <a:r>
-              <a:rPr lang="en-US" smtClean="0"/>
+              <a:rPr lang="en-US"/>
               <a:t>Third level</a:t>
             </a:r>
           </a:p>
           <a:p>
             <a:pPr lvl="3"/>
             <a:r>
-              <a:rPr lang="en-US" smtClean="0"/>
+              <a:rPr lang="en-US"/>
               <a:t>Fourth level</a:t>
             </a:r>
           </a:p>
           <a:p>
             <a:pPr lvl="4"/>
             <a:r>
-              <a:rPr lang="en-US" smtClean="0"/>
+              <a:rPr lang="en-US"/>
               <a:t>Fifth level</a:t>
             </a:r>
             <a:endParaRPr lang="en-US" dirty="0"/>
@@ -644,7 +644,7 @@
     </p:spTree>
     <p:extLst>
       <p:ext uri="{BB962C8B-B14F-4D97-AF65-F5344CB8AC3E}">
-        <p14:creationId xmlns:p14="http://schemas.microsoft.com/office/powerpoint/2010/main" val="1072655761"/>
+        <p14:creationId xmlns:p14="http://schemas.microsoft.com/office/powerpoint/2010/main" val="4006090179"/>
       </p:ext>
     </p:extLst>
   </p:cSld>
@@ -687,7 +687,7 @@
           <a:lstStyle/>
           <a:p>
             <a:r>
-              <a:rPr lang="en-US" smtClean="0"/>
+              <a:rPr lang="en-US"/>
               <a:t>Click to edit Master title style</a:t>
             </a:r>
             <a:endParaRPr lang="en-US" dirty="0"/>
@@ -711,35 +711,35 @@
           <a:p>
             <a:pPr lvl="0"/>
             <a:r>
-              <a:rPr lang="en-US" smtClean="0"/>
-              <a:t>Edit Master text styles</a:t>
+              <a:rPr lang="en-US"/>
+              <a:t>Click to edit Master text styles</a:t>
             </a:r>
           </a:p>
           <a:p>
             <a:pPr lvl="1"/>
             <a:r>
-              <a:rPr lang="en-US" smtClean="0"/>
+              <a:rPr lang="en-US"/>
               <a:t>Second level</a:t>
             </a:r>
           </a:p>
           <a:p>
             <a:pPr lvl="2"/>
             <a:r>
-              <a:rPr lang="en-US" smtClean="0"/>
+              <a:rPr lang="en-US"/>
               <a:t>Third level</a:t>
             </a:r>
           </a:p>
           <a:p>
             <a:pPr lvl="3"/>
             <a:r>
-              <a:rPr lang="en-US" smtClean="0"/>
+              <a:rPr lang="en-US"/>
               <a:t>Fourth level</a:t>
             </a:r>
           </a:p>
           <a:p>
             <a:pPr lvl="4"/>
             <a:r>
-              <a:rPr lang="en-US" smtClean="0"/>
+              <a:rPr lang="en-US"/>
               <a:t>Fifth level</a:t>
             </a:r>
             <a:endParaRPr lang="en-US" dirty="0"/>
@@ -814,7 +814,7 @@
     </p:spTree>
     <p:extLst>
       <p:ext uri="{BB962C8B-B14F-4D97-AF65-F5344CB8AC3E}">
-        <p14:creationId xmlns:p14="http://schemas.microsoft.com/office/powerpoint/2010/main" val="924188785"/>
+        <p14:creationId xmlns:p14="http://schemas.microsoft.com/office/powerpoint/2010/main" val="3596436508"/>
       </p:ext>
     </p:extLst>
   </p:cSld>
@@ -853,20 +853,20 @@
         </p:nvSpPr>
         <p:spPr>
           <a:xfrm>
-            <a:off x="831851" y="2051688"/>
-            <a:ext cx="10515600" cy="3423284"/>
+            <a:off x="935831" y="2051686"/>
+            <a:ext cx="11830050" cy="3423284"/>
           </a:xfrm>
         </p:spPr>
         <p:txBody>
           <a:bodyPr anchor="b"/>
           <a:lstStyle>
             <a:lvl1pPr>
-              <a:defRPr sz="7200"/>
+              <a:defRPr sz="6750"/>
             </a:lvl1pPr>
           </a:lstStyle>
           <a:p>
             <a:r>
-              <a:rPr lang="en-US" smtClean="0"/>
+              <a:rPr lang="en-US"/>
               <a:t>Click to edit Master title style</a:t>
             </a:r>
             <a:endParaRPr lang="en-US" dirty="0"/>
@@ -885,8 +885,8 @@
         </p:nvSpPr>
         <p:spPr>
           <a:xfrm>
-            <a:off x="831851" y="5507358"/>
-            <a:ext cx="10515600" cy="1800224"/>
+            <a:off x="935831" y="5507356"/>
+            <a:ext cx="11830050" cy="1800224"/>
           </a:xfrm>
         </p:spPr>
         <p:txBody>
@@ -894,15 +894,17 @@
           <a:lstStyle>
             <a:lvl1pPr marL="0" indent="0">
               <a:buNone/>
-              <a:defRPr sz="2880">
+              <a:defRPr sz="2700">
                 <a:solidFill>
-                  <a:schemeClr val="tx1"/>
+                  <a:schemeClr val="tx1">
+                    <a:tint val="75000"/>
+                  </a:schemeClr>
                 </a:solidFill>
               </a:defRPr>
             </a:lvl1pPr>
-            <a:lvl2pPr marL="548640" indent="0">
-              <a:buNone/>
-              <a:defRPr sz="2400">
+            <a:lvl2pPr marL="514350" indent="0">
+              <a:buNone/>
+              <a:defRPr sz="2250">
                 <a:solidFill>
                   <a:schemeClr val="tx1">
                     <a:tint val="75000"/>
@@ -910,9 +912,9 @@
                 </a:solidFill>
               </a:defRPr>
             </a:lvl2pPr>
-            <a:lvl3pPr marL="1097280" indent="0">
-              <a:buNone/>
-              <a:defRPr sz="2160">
+            <a:lvl3pPr marL="1028700" indent="0">
+              <a:buNone/>
+              <a:defRPr sz="2025">
                 <a:solidFill>
                   <a:schemeClr val="tx1">
                     <a:tint val="75000"/>
@@ -920,9 +922,9 @@
                 </a:solidFill>
               </a:defRPr>
             </a:lvl3pPr>
-            <a:lvl4pPr marL="1645920" indent="0">
-              <a:buNone/>
-              <a:defRPr sz="1920">
+            <a:lvl4pPr marL="1543050" indent="0">
+              <a:buNone/>
+              <a:defRPr sz="1800">
                 <a:solidFill>
                   <a:schemeClr val="tx1">
                     <a:tint val="75000"/>
@@ -930,9 +932,9 @@
                 </a:solidFill>
               </a:defRPr>
             </a:lvl4pPr>
-            <a:lvl5pPr marL="2194560" indent="0">
-              <a:buNone/>
-              <a:defRPr sz="1920">
+            <a:lvl5pPr marL="2057400" indent="0">
+              <a:buNone/>
+              <a:defRPr sz="1800">
                 <a:solidFill>
                   <a:schemeClr val="tx1">
                     <a:tint val="75000"/>
@@ -940,9 +942,9 @@
                 </a:solidFill>
               </a:defRPr>
             </a:lvl5pPr>
-            <a:lvl6pPr marL="2743200" indent="0">
-              <a:buNone/>
-              <a:defRPr sz="1920">
+            <a:lvl6pPr marL="2571750" indent="0">
+              <a:buNone/>
+              <a:defRPr sz="1800">
                 <a:solidFill>
                   <a:schemeClr val="tx1">
                     <a:tint val="75000"/>
@@ -950,9 +952,9 @@
                 </a:solidFill>
               </a:defRPr>
             </a:lvl6pPr>
-            <a:lvl7pPr marL="3291840" indent="0">
-              <a:buNone/>
-              <a:defRPr sz="1920">
+            <a:lvl7pPr marL="3086100" indent="0">
+              <a:buNone/>
+              <a:defRPr sz="1800">
                 <a:solidFill>
                   <a:schemeClr val="tx1">
                     <a:tint val="75000"/>
@@ -960,9 +962,9 @@
                 </a:solidFill>
               </a:defRPr>
             </a:lvl7pPr>
-            <a:lvl8pPr marL="3840480" indent="0">
-              <a:buNone/>
-              <a:defRPr sz="1920">
+            <a:lvl8pPr marL="3600450" indent="0">
+              <a:buNone/>
+              <a:defRPr sz="1800">
                 <a:solidFill>
                   <a:schemeClr val="tx1">
                     <a:tint val="75000"/>
@@ -970,9 +972,9 @@
                 </a:solidFill>
               </a:defRPr>
             </a:lvl8pPr>
-            <a:lvl9pPr marL="4389120" indent="0">
-              <a:buNone/>
-              <a:defRPr sz="1920">
+            <a:lvl9pPr marL="4114800" indent="0">
+              <a:buNone/>
+              <a:defRPr sz="1800">
                 <a:solidFill>
                   <a:schemeClr val="tx1">
                     <a:tint val="75000"/>
@@ -984,8 +986,8 @@
           <a:p>
             <a:pPr lvl="0"/>
             <a:r>
-              <a:rPr lang="en-US" smtClean="0"/>
-              <a:t>Edit Master text styles</a:t>
+              <a:rPr lang="en-US"/>
+              <a:t>Click to edit Master text styles</a:t>
             </a:r>
           </a:p>
         </p:txBody>
@@ -1058,7 +1060,7 @@
     </p:spTree>
     <p:extLst>
       <p:ext uri="{BB962C8B-B14F-4D97-AF65-F5344CB8AC3E}">
-        <p14:creationId xmlns:p14="http://schemas.microsoft.com/office/powerpoint/2010/main" val="2841018498"/>
+        <p14:creationId xmlns:p14="http://schemas.microsoft.com/office/powerpoint/2010/main" val="3435563707"/>
       </p:ext>
     </p:extLst>
   </p:cSld>
@@ -1101,7 +1103,7 @@
           <a:lstStyle/>
           <a:p>
             <a:r>
-              <a:rPr lang="en-US" smtClean="0"/>
+              <a:rPr lang="en-US"/>
               <a:t>Click to edit Master title style</a:t>
             </a:r>
             <a:endParaRPr lang="en-US" dirty="0"/>
@@ -1120,8 +1122,8 @@
         </p:nvSpPr>
         <p:spPr>
           <a:xfrm>
-            <a:off x="838200" y="2190750"/>
-            <a:ext cx="5181600" cy="5221606"/>
+            <a:off x="942975" y="2190750"/>
+            <a:ext cx="5829300" cy="5221606"/>
           </a:xfrm>
         </p:spPr>
         <p:txBody>
@@ -1130,35 +1132,35 @@
           <a:p>
             <a:pPr lvl="0"/>
             <a:r>
-              <a:rPr lang="en-US" smtClean="0"/>
-              <a:t>Edit Master text styles</a:t>
+              <a:rPr lang="en-US"/>
+              <a:t>Click to edit Master text styles</a:t>
             </a:r>
           </a:p>
           <a:p>
             <a:pPr lvl="1"/>
             <a:r>
-              <a:rPr lang="en-US" smtClean="0"/>
+              <a:rPr lang="en-US"/>
               <a:t>Second level</a:t>
             </a:r>
           </a:p>
           <a:p>
             <a:pPr lvl="2"/>
             <a:r>
-              <a:rPr lang="en-US" smtClean="0"/>
+              <a:rPr lang="en-US"/>
               <a:t>Third level</a:t>
             </a:r>
           </a:p>
           <a:p>
             <a:pPr lvl="3"/>
             <a:r>
-              <a:rPr lang="en-US" smtClean="0"/>
+              <a:rPr lang="en-US"/>
               <a:t>Fourth level</a:t>
             </a:r>
           </a:p>
           <a:p>
             <a:pPr lvl="4"/>
             <a:r>
-              <a:rPr lang="en-US" smtClean="0"/>
+              <a:rPr lang="en-US"/>
               <a:t>Fifth level</a:t>
             </a:r>
             <a:endParaRPr lang="en-US" dirty="0"/>
@@ -1177,8 +1179,8 @@
         </p:nvSpPr>
         <p:spPr>
           <a:xfrm>
-            <a:off x="6172200" y="2190750"/>
-            <a:ext cx="5181600" cy="5221606"/>
+            <a:off x="6943725" y="2190750"/>
+            <a:ext cx="5829300" cy="5221606"/>
           </a:xfrm>
         </p:spPr>
         <p:txBody>
@@ -1187,35 +1189,35 @@
           <a:p>
             <a:pPr lvl="0"/>
             <a:r>
-              <a:rPr lang="en-US" smtClean="0"/>
-              <a:t>Edit Master text styles</a:t>
+              <a:rPr lang="en-US"/>
+              <a:t>Click to edit Master text styles</a:t>
             </a:r>
           </a:p>
           <a:p>
             <a:pPr lvl="1"/>
             <a:r>
-              <a:rPr lang="en-US" smtClean="0"/>
+              <a:rPr lang="en-US"/>
               <a:t>Second level</a:t>
             </a:r>
           </a:p>
           <a:p>
             <a:pPr lvl="2"/>
             <a:r>
-              <a:rPr lang="en-US" smtClean="0"/>
+              <a:rPr lang="en-US"/>
               <a:t>Third level</a:t>
             </a:r>
           </a:p>
           <a:p>
             <a:pPr lvl="3"/>
             <a:r>
-              <a:rPr lang="en-US" smtClean="0"/>
+              <a:rPr lang="en-US"/>
               <a:t>Fourth level</a:t>
             </a:r>
           </a:p>
           <a:p>
             <a:pPr lvl="4"/>
             <a:r>
-              <a:rPr lang="en-US" smtClean="0"/>
+              <a:rPr lang="en-US"/>
               <a:t>Fifth level</a:t>
             </a:r>
             <a:endParaRPr lang="en-US" dirty="0"/>
@@ -1290,7 +1292,7 @@
     </p:spTree>
     <p:extLst>
       <p:ext uri="{BB962C8B-B14F-4D97-AF65-F5344CB8AC3E}">
-        <p14:creationId xmlns:p14="http://schemas.microsoft.com/office/powerpoint/2010/main" val="410423849"/>
+        <p14:creationId xmlns:p14="http://schemas.microsoft.com/office/powerpoint/2010/main" val="2916673078"/>
       </p:ext>
     </p:extLst>
   </p:cSld>
@@ -1329,8 +1331,8 @@
         </p:nvSpPr>
         <p:spPr>
           <a:xfrm>
-            <a:off x="839788" y="438152"/>
-            <a:ext cx="10515600" cy="1590676"/>
+            <a:off x="944762" y="438150"/>
+            <a:ext cx="11830050" cy="1590676"/>
           </a:xfrm>
         </p:spPr>
         <p:txBody>
@@ -1338,7 +1340,7 @@
           <a:lstStyle/>
           <a:p>
             <a:r>
-              <a:rPr lang="en-US" smtClean="0"/>
+              <a:rPr lang="en-US"/>
               <a:t>Click to edit Master title style</a:t>
             </a:r>
             <a:endParaRPr lang="en-US" dirty="0"/>
@@ -1357,8 +1359,8 @@
         </p:nvSpPr>
         <p:spPr>
           <a:xfrm>
-            <a:off x="839789" y="2017396"/>
-            <a:ext cx="5157787" cy="988694"/>
+            <a:off x="944762" y="2017396"/>
+            <a:ext cx="5802510" cy="988694"/>
           </a:xfrm>
         </p:spPr>
         <p:txBody>
@@ -1366,46 +1368,46 @@
           <a:lstStyle>
             <a:lvl1pPr marL="0" indent="0">
               <a:buNone/>
-              <a:defRPr sz="2880" b="1"/>
+              <a:defRPr sz="2700" b="1"/>
             </a:lvl1pPr>
-            <a:lvl2pPr marL="548640" indent="0">
-              <a:buNone/>
-              <a:defRPr sz="2400" b="1"/>
+            <a:lvl2pPr marL="514350" indent="0">
+              <a:buNone/>
+              <a:defRPr sz="2250" b="1"/>
             </a:lvl2pPr>
-            <a:lvl3pPr marL="1097280" indent="0">
-              <a:buNone/>
-              <a:defRPr sz="2160" b="1"/>
+            <a:lvl3pPr marL="1028700" indent="0">
+              <a:buNone/>
+              <a:defRPr sz="2025" b="1"/>
             </a:lvl3pPr>
-            <a:lvl4pPr marL="1645920" indent="0">
-              <a:buNone/>
-              <a:defRPr sz="1920" b="1"/>
+            <a:lvl4pPr marL="1543050" indent="0">
+              <a:buNone/>
+              <a:defRPr sz="1800" b="1"/>
             </a:lvl4pPr>
-            <a:lvl5pPr marL="2194560" indent="0">
-              <a:buNone/>
-              <a:defRPr sz="1920" b="1"/>
+            <a:lvl5pPr marL="2057400" indent="0">
+              <a:buNone/>
+              <a:defRPr sz="1800" b="1"/>
             </a:lvl5pPr>
-            <a:lvl6pPr marL="2743200" indent="0">
-              <a:buNone/>
-              <a:defRPr sz="1920" b="1"/>
+            <a:lvl6pPr marL="2571750" indent="0">
+              <a:buNone/>
+              <a:defRPr sz="1800" b="1"/>
             </a:lvl6pPr>
-            <a:lvl7pPr marL="3291840" indent="0">
-              <a:buNone/>
-              <a:defRPr sz="1920" b="1"/>
+            <a:lvl7pPr marL="3086100" indent="0">
+              <a:buNone/>
+              <a:defRPr sz="1800" b="1"/>
             </a:lvl7pPr>
-            <a:lvl8pPr marL="3840480" indent="0">
-              <a:buNone/>
-              <a:defRPr sz="1920" b="1"/>
+            <a:lvl8pPr marL="3600450" indent="0">
+              <a:buNone/>
+              <a:defRPr sz="1800" b="1"/>
             </a:lvl8pPr>
-            <a:lvl9pPr marL="4389120" indent="0">
-              <a:buNone/>
-              <a:defRPr sz="1920" b="1"/>
+            <a:lvl9pPr marL="4114800" indent="0">
+              <a:buNone/>
+              <a:defRPr sz="1800" b="1"/>
             </a:lvl9pPr>
           </a:lstStyle>
           <a:p>
             <a:pPr lvl="0"/>
             <a:r>
-              <a:rPr lang="en-US" smtClean="0"/>
-              <a:t>Edit Master text styles</a:t>
+              <a:rPr lang="en-US"/>
+              <a:t>Click to edit Master text styles</a:t>
             </a:r>
           </a:p>
         </p:txBody>
@@ -1422,8 +1424,8 @@
         </p:nvSpPr>
         <p:spPr>
           <a:xfrm>
-            <a:off x="839789" y="3006090"/>
-            <a:ext cx="5157787" cy="4421506"/>
+            <a:off x="944762" y="3006090"/>
+            <a:ext cx="5802510" cy="4421506"/>
           </a:xfrm>
         </p:spPr>
         <p:txBody>
@@ -1432,35 +1434,35 @@
           <a:p>
             <a:pPr lvl="0"/>
             <a:r>
-              <a:rPr lang="en-US" smtClean="0"/>
-              <a:t>Edit Master text styles</a:t>
+              <a:rPr lang="en-US"/>
+              <a:t>Click to edit Master text styles</a:t>
             </a:r>
           </a:p>
           <a:p>
             <a:pPr lvl="1"/>
             <a:r>
-              <a:rPr lang="en-US" smtClean="0"/>
+              <a:rPr lang="en-US"/>
               <a:t>Second level</a:t>
             </a:r>
           </a:p>
           <a:p>
             <a:pPr lvl="2"/>
             <a:r>
-              <a:rPr lang="en-US" smtClean="0"/>
+              <a:rPr lang="en-US"/>
               <a:t>Third level</a:t>
             </a:r>
           </a:p>
           <a:p>
             <a:pPr lvl="3"/>
             <a:r>
-              <a:rPr lang="en-US" smtClean="0"/>
+              <a:rPr lang="en-US"/>
               <a:t>Fourth level</a:t>
             </a:r>
           </a:p>
           <a:p>
             <a:pPr lvl="4"/>
             <a:r>
-              <a:rPr lang="en-US" smtClean="0"/>
+              <a:rPr lang="en-US"/>
               <a:t>Fifth level</a:t>
             </a:r>
             <a:endParaRPr lang="en-US" dirty="0"/>
@@ -1479,8 +1481,8 @@
         </p:nvSpPr>
         <p:spPr>
           <a:xfrm>
-            <a:off x="6172201" y="2017396"/>
-            <a:ext cx="5183188" cy="988694"/>
+            <a:off x="6943725" y="2017396"/>
+            <a:ext cx="5831087" cy="988694"/>
           </a:xfrm>
         </p:spPr>
         <p:txBody>
@@ -1488,46 +1490,46 @@
           <a:lstStyle>
             <a:lvl1pPr marL="0" indent="0">
               <a:buNone/>
-              <a:defRPr sz="2880" b="1"/>
+              <a:defRPr sz="2700" b="1"/>
             </a:lvl1pPr>
-            <a:lvl2pPr marL="548640" indent="0">
-              <a:buNone/>
-              <a:defRPr sz="2400" b="1"/>
+            <a:lvl2pPr marL="514350" indent="0">
+              <a:buNone/>
+              <a:defRPr sz="2250" b="1"/>
             </a:lvl2pPr>
-            <a:lvl3pPr marL="1097280" indent="0">
-              <a:buNone/>
-              <a:defRPr sz="2160" b="1"/>
+            <a:lvl3pPr marL="1028700" indent="0">
+              <a:buNone/>
+              <a:defRPr sz="2025" b="1"/>
             </a:lvl3pPr>
-            <a:lvl4pPr marL="1645920" indent="0">
-              <a:buNone/>
-              <a:defRPr sz="1920" b="1"/>
+            <a:lvl4pPr marL="1543050" indent="0">
+              <a:buNone/>
+              <a:defRPr sz="1800" b="1"/>
             </a:lvl4pPr>
-            <a:lvl5pPr marL="2194560" indent="0">
-              <a:buNone/>
-              <a:defRPr sz="1920" b="1"/>
+            <a:lvl5pPr marL="2057400" indent="0">
+              <a:buNone/>
+              <a:defRPr sz="1800" b="1"/>
             </a:lvl5pPr>
-            <a:lvl6pPr marL="2743200" indent="0">
-              <a:buNone/>
-              <a:defRPr sz="1920" b="1"/>
+            <a:lvl6pPr marL="2571750" indent="0">
+              <a:buNone/>
+              <a:defRPr sz="1800" b="1"/>
             </a:lvl6pPr>
-            <a:lvl7pPr marL="3291840" indent="0">
-              <a:buNone/>
-              <a:defRPr sz="1920" b="1"/>
+            <a:lvl7pPr marL="3086100" indent="0">
+              <a:buNone/>
+              <a:defRPr sz="1800" b="1"/>
             </a:lvl7pPr>
-            <a:lvl8pPr marL="3840480" indent="0">
-              <a:buNone/>
-              <a:defRPr sz="1920" b="1"/>
+            <a:lvl8pPr marL="3600450" indent="0">
+              <a:buNone/>
+              <a:defRPr sz="1800" b="1"/>
             </a:lvl8pPr>
-            <a:lvl9pPr marL="4389120" indent="0">
-              <a:buNone/>
-              <a:defRPr sz="1920" b="1"/>
+            <a:lvl9pPr marL="4114800" indent="0">
+              <a:buNone/>
+              <a:defRPr sz="1800" b="1"/>
             </a:lvl9pPr>
           </a:lstStyle>
           <a:p>
             <a:pPr lvl="0"/>
             <a:r>
-              <a:rPr lang="en-US" smtClean="0"/>
-              <a:t>Edit Master text styles</a:t>
+              <a:rPr lang="en-US"/>
+              <a:t>Click to edit Master text styles</a:t>
             </a:r>
           </a:p>
         </p:txBody>
@@ -1544,8 +1546,8 @@
         </p:nvSpPr>
         <p:spPr>
           <a:xfrm>
-            <a:off x="6172201" y="3006090"/>
-            <a:ext cx="5183188" cy="4421506"/>
+            <a:off x="6943725" y="3006090"/>
+            <a:ext cx="5831087" cy="4421506"/>
           </a:xfrm>
         </p:spPr>
         <p:txBody>
@@ -1554,35 +1556,35 @@
           <a:p>
             <a:pPr lvl="0"/>
             <a:r>
-              <a:rPr lang="en-US" smtClean="0"/>
-              <a:t>Edit Master text styles</a:t>
+              <a:rPr lang="en-US"/>
+              <a:t>Click to edit Master text styles</a:t>
             </a:r>
           </a:p>
           <a:p>
             <a:pPr lvl="1"/>
             <a:r>
-              <a:rPr lang="en-US" smtClean="0"/>
+              <a:rPr lang="en-US"/>
               <a:t>Second level</a:t>
             </a:r>
           </a:p>
           <a:p>
             <a:pPr lvl="2"/>
             <a:r>
-              <a:rPr lang="en-US" smtClean="0"/>
+              <a:rPr lang="en-US"/>
               <a:t>Third level</a:t>
             </a:r>
           </a:p>
           <a:p>
             <a:pPr lvl="3"/>
             <a:r>
-              <a:rPr lang="en-US" smtClean="0"/>
+              <a:rPr lang="en-US"/>
               <a:t>Fourth level</a:t>
             </a:r>
           </a:p>
           <a:p>
             <a:pPr lvl="4"/>
             <a:r>
-              <a:rPr lang="en-US" smtClean="0"/>
+              <a:rPr lang="en-US"/>
               <a:t>Fifth level</a:t>
             </a:r>
             <a:endParaRPr lang="en-US" dirty="0"/>
@@ -1657,7 +1659,7 @@
     </p:spTree>
     <p:extLst>
       <p:ext uri="{BB962C8B-B14F-4D97-AF65-F5344CB8AC3E}">
-        <p14:creationId xmlns:p14="http://schemas.microsoft.com/office/powerpoint/2010/main" val="3080642519"/>
+        <p14:creationId xmlns:p14="http://schemas.microsoft.com/office/powerpoint/2010/main" val="4042281779"/>
       </p:ext>
     </p:extLst>
   </p:cSld>
@@ -1700,7 +1702,7 @@
           <a:lstStyle/>
           <a:p>
             <a:r>
-              <a:rPr lang="en-US" smtClean="0"/>
+              <a:rPr lang="en-US"/>
               <a:t>Click to edit Master title style</a:t>
             </a:r>
             <a:endParaRPr lang="en-US" dirty="0"/>
@@ -1775,7 +1777,7 @@
     </p:spTree>
     <p:extLst>
       <p:ext uri="{BB962C8B-B14F-4D97-AF65-F5344CB8AC3E}">
-        <p14:creationId xmlns:p14="http://schemas.microsoft.com/office/powerpoint/2010/main" val="2851878103"/>
+        <p14:creationId xmlns:p14="http://schemas.microsoft.com/office/powerpoint/2010/main" val="3575874310"/>
       </p:ext>
     </p:extLst>
   </p:cSld>
@@ -1870,7 +1872,7 @@
     </p:spTree>
     <p:extLst>
       <p:ext uri="{BB962C8B-B14F-4D97-AF65-F5344CB8AC3E}">
-        <p14:creationId xmlns:p14="http://schemas.microsoft.com/office/powerpoint/2010/main" val="4258479931"/>
+        <p14:creationId xmlns:p14="http://schemas.microsoft.com/office/powerpoint/2010/main" val="2313095607"/>
       </p:ext>
     </p:extLst>
   </p:cSld>
@@ -1909,20 +1911,20 @@
         </p:nvSpPr>
         <p:spPr>
           <a:xfrm>
-            <a:off x="839788" y="548640"/>
-            <a:ext cx="3932237" cy="1920240"/>
+            <a:off x="944762" y="548640"/>
+            <a:ext cx="4423767" cy="1920240"/>
           </a:xfrm>
         </p:spPr>
         <p:txBody>
           <a:bodyPr anchor="b"/>
           <a:lstStyle>
             <a:lvl1pPr>
-              <a:defRPr sz="3840"/>
+              <a:defRPr sz="3600"/>
             </a:lvl1pPr>
           </a:lstStyle>
           <a:p>
             <a:r>
-              <a:rPr lang="en-US" smtClean="0"/>
+              <a:rPr lang="en-US"/>
               <a:t>Click to edit Master title style</a:t>
             </a:r>
             <a:endParaRPr lang="en-US" dirty="0"/>
@@ -1941,73 +1943,73 @@
         </p:nvSpPr>
         <p:spPr>
           <a:xfrm>
-            <a:off x="5183188" y="1184912"/>
-            <a:ext cx="6172200" cy="5848350"/>
+            <a:off x="5831087" y="1184911"/>
+            <a:ext cx="6943725" cy="5848350"/>
           </a:xfrm>
         </p:spPr>
         <p:txBody>
           <a:bodyPr/>
           <a:lstStyle>
             <a:lvl1pPr>
-              <a:defRPr sz="3840"/>
+              <a:defRPr sz="3600"/>
             </a:lvl1pPr>
             <a:lvl2pPr>
-              <a:defRPr sz="3360"/>
+              <a:defRPr sz="3150"/>
             </a:lvl2pPr>
             <a:lvl3pPr>
-              <a:defRPr sz="2880"/>
+              <a:defRPr sz="2700"/>
             </a:lvl3pPr>
             <a:lvl4pPr>
-              <a:defRPr sz="2400"/>
+              <a:defRPr sz="2250"/>
             </a:lvl4pPr>
             <a:lvl5pPr>
-              <a:defRPr sz="2400"/>
+              <a:defRPr sz="2250"/>
             </a:lvl5pPr>
             <a:lvl6pPr>
-              <a:defRPr sz="2400"/>
+              <a:defRPr sz="2250"/>
             </a:lvl6pPr>
             <a:lvl7pPr>
-              <a:defRPr sz="2400"/>
+              <a:defRPr sz="2250"/>
             </a:lvl7pPr>
             <a:lvl8pPr>
-              <a:defRPr sz="2400"/>
+              <a:defRPr sz="2250"/>
             </a:lvl8pPr>
             <a:lvl9pPr>
-              <a:defRPr sz="2400"/>
+              <a:defRPr sz="2250"/>
             </a:lvl9pPr>
           </a:lstStyle>
           <a:p>
             <a:pPr lvl="0"/>
             <a:r>
-              <a:rPr lang="en-US" smtClean="0"/>
-              <a:t>Edit Master text styles</a:t>
+              <a:rPr lang="en-US"/>
+              <a:t>Click to edit Master text styles</a:t>
             </a:r>
           </a:p>
           <a:p>
             <a:pPr lvl="1"/>
             <a:r>
-              <a:rPr lang="en-US" smtClean="0"/>
+              <a:rPr lang="en-US"/>
               <a:t>Second level</a:t>
             </a:r>
           </a:p>
           <a:p>
             <a:pPr lvl="2"/>
             <a:r>
-              <a:rPr lang="en-US" smtClean="0"/>
+              <a:rPr lang="en-US"/>
               <a:t>Third level</a:t>
             </a:r>
           </a:p>
           <a:p>
             <a:pPr lvl="3"/>
             <a:r>
-              <a:rPr lang="en-US" smtClean="0"/>
+              <a:rPr lang="en-US"/>
               <a:t>Fourth level</a:t>
             </a:r>
           </a:p>
           <a:p>
             <a:pPr lvl="4"/>
             <a:r>
-              <a:rPr lang="en-US" smtClean="0"/>
+              <a:rPr lang="en-US"/>
               <a:t>Fifth level</a:t>
             </a:r>
             <a:endParaRPr lang="en-US" dirty="0"/>
@@ -2026,8 +2028,8 @@
         </p:nvSpPr>
         <p:spPr>
           <a:xfrm>
-            <a:off x="839788" y="2468880"/>
-            <a:ext cx="3932237" cy="4573906"/>
+            <a:off x="944762" y="2468880"/>
+            <a:ext cx="4423767" cy="4573906"/>
           </a:xfrm>
         </p:spPr>
         <p:txBody>
@@ -2035,46 +2037,46 @@
           <a:lstStyle>
             <a:lvl1pPr marL="0" indent="0">
               <a:buNone/>
-              <a:defRPr sz="1920"/>
+              <a:defRPr sz="1800"/>
             </a:lvl1pPr>
-            <a:lvl2pPr marL="548640" indent="0">
-              <a:buNone/>
-              <a:defRPr sz="1680"/>
+            <a:lvl2pPr marL="514350" indent="0">
+              <a:buNone/>
+              <a:defRPr sz="1575"/>
             </a:lvl2pPr>
-            <a:lvl3pPr marL="1097280" indent="0">
-              <a:buNone/>
-              <a:defRPr sz="1440"/>
+            <a:lvl3pPr marL="1028700" indent="0">
+              <a:buNone/>
+              <a:defRPr sz="1350"/>
             </a:lvl3pPr>
-            <a:lvl4pPr marL="1645920" indent="0">
-              <a:buNone/>
-              <a:defRPr sz="1200"/>
+            <a:lvl4pPr marL="1543050" indent="0">
+              <a:buNone/>
+              <a:defRPr sz="1125"/>
             </a:lvl4pPr>
-            <a:lvl5pPr marL="2194560" indent="0">
-              <a:buNone/>
-              <a:defRPr sz="1200"/>
+            <a:lvl5pPr marL="2057400" indent="0">
+              <a:buNone/>
+              <a:defRPr sz="1125"/>
             </a:lvl5pPr>
-            <a:lvl6pPr marL="2743200" indent="0">
-              <a:buNone/>
-              <a:defRPr sz="1200"/>
+            <a:lvl6pPr marL="2571750" indent="0">
+              <a:buNone/>
+              <a:defRPr sz="1125"/>
             </a:lvl6pPr>
-            <a:lvl7pPr marL="3291840" indent="0">
-              <a:buNone/>
-              <a:defRPr sz="1200"/>
+            <a:lvl7pPr marL="3086100" indent="0">
+              <a:buNone/>
+              <a:defRPr sz="1125"/>
             </a:lvl7pPr>
-            <a:lvl8pPr marL="3840480" indent="0">
-              <a:buNone/>
-              <a:defRPr sz="1200"/>
+            <a:lvl8pPr marL="3600450" indent="0">
+              <a:buNone/>
+              <a:defRPr sz="1125"/>
             </a:lvl8pPr>
-            <a:lvl9pPr marL="4389120" indent="0">
-              <a:buNone/>
-              <a:defRPr sz="1200"/>
+            <a:lvl9pPr marL="4114800" indent="0">
+              <a:buNone/>
+              <a:defRPr sz="1125"/>
             </a:lvl9pPr>
           </a:lstStyle>
           <a:p>
             <a:pPr lvl="0"/>
             <a:r>
-              <a:rPr lang="en-US" smtClean="0"/>
-              <a:t>Edit Master text styles</a:t>
+              <a:rPr lang="en-US"/>
+              <a:t>Click to edit Master text styles</a:t>
             </a:r>
           </a:p>
         </p:txBody>
@@ -2147,7 +2149,7 @@
     </p:spTree>
     <p:extLst>
       <p:ext uri="{BB962C8B-B14F-4D97-AF65-F5344CB8AC3E}">
-        <p14:creationId xmlns:p14="http://schemas.microsoft.com/office/powerpoint/2010/main" val="1667303426"/>
+        <p14:creationId xmlns:p14="http://schemas.microsoft.com/office/powerpoint/2010/main" val="4027396359"/>
       </p:ext>
     </p:extLst>
   </p:cSld>
@@ -2186,20 +2188,20 @@
         </p:nvSpPr>
         <p:spPr>
           <a:xfrm>
-            <a:off x="839788" y="548640"/>
-            <a:ext cx="3932237" cy="1920240"/>
+            <a:off x="944762" y="548640"/>
+            <a:ext cx="4423767" cy="1920240"/>
           </a:xfrm>
         </p:spPr>
         <p:txBody>
           <a:bodyPr anchor="b"/>
           <a:lstStyle>
             <a:lvl1pPr>
-              <a:defRPr sz="3840"/>
+              <a:defRPr sz="3600"/>
             </a:lvl1pPr>
           </a:lstStyle>
           <a:p>
             <a:r>
-              <a:rPr lang="en-US" smtClean="0"/>
+              <a:rPr lang="en-US"/>
               <a:t>Click to edit Master title style</a:t>
             </a:r>
             <a:endParaRPr lang="en-US" dirty="0"/>
@@ -2218,8 +2220,8 @@
         </p:nvSpPr>
         <p:spPr>
           <a:xfrm>
-            <a:off x="5183188" y="1184912"/>
-            <a:ext cx="6172200" cy="5848350"/>
+            <a:off x="5831087" y="1184911"/>
+            <a:ext cx="6943725" cy="5848350"/>
           </a:xfrm>
         </p:spPr>
         <p:txBody>
@@ -2227,44 +2229,44 @@
           <a:lstStyle>
             <a:lvl1pPr marL="0" indent="0">
               <a:buNone/>
-              <a:defRPr sz="3840"/>
+              <a:defRPr sz="3600"/>
             </a:lvl1pPr>
-            <a:lvl2pPr marL="548640" indent="0">
-              <a:buNone/>
-              <a:defRPr sz="3360"/>
+            <a:lvl2pPr marL="514350" indent="0">
+              <a:buNone/>
+              <a:defRPr sz="3150"/>
             </a:lvl2pPr>
-            <a:lvl3pPr marL="1097280" indent="0">
-              <a:buNone/>
-              <a:defRPr sz="2880"/>
+            <a:lvl3pPr marL="1028700" indent="0">
+              <a:buNone/>
+              <a:defRPr sz="2700"/>
             </a:lvl3pPr>
-            <a:lvl4pPr marL="1645920" indent="0">
-              <a:buNone/>
-              <a:defRPr sz="2400"/>
+            <a:lvl4pPr marL="1543050" indent="0">
+              <a:buNone/>
+              <a:defRPr sz="2250"/>
             </a:lvl4pPr>
-            <a:lvl5pPr marL="2194560" indent="0">
-              <a:buNone/>
-              <a:defRPr sz="2400"/>
+            <a:lvl5pPr marL="2057400" indent="0">
+              <a:buNone/>
+              <a:defRPr sz="2250"/>
             </a:lvl5pPr>
-            <a:lvl6pPr marL="2743200" indent="0">
-              <a:buNone/>
-              <a:defRPr sz="2400"/>
+            <a:lvl6pPr marL="2571750" indent="0">
+              <a:buNone/>
+              <a:defRPr sz="2250"/>
             </a:lvl6pPr>
-            <a:lvl7pPr marL="3291840" indent="0">
-              <a:buNone/>
-              <a:defRPr sz="2400"/>
+            <a:lvl7pPr marL="3086100" indent="0">
+              <a:buNone/>
+              <a:defRPr sz="2250"/>
             </a:lvl7pPr>
-            <a:lvl8pPr marL="3840480" indent="0">
-              <a:buNone/>
-              <a:defRPr sz="2400"/>
+            <a:lvl8pPr marL="3600450" indent="0">
+              <a:buNone/>
+              <a:defRPr sz="2250"/>
             </a:lvl8pPr>
-            <a:lvl9pPr marL="4389120" indent="0">
-              <a:buNone/>
-              <a:defRPr sz="2400"/>
+            <a:lvl9pPr marL="4114800" indent="0">
+              <a:buNone/>
+              <a:defRPr sz="2250"/>
             </a:lvl9pPr>
           </a:lstStyle>
           <a:p>
             <a:r>
-              <a:rPr lang="en-US" smtClean="0"/>
+              <a:rPr lang="en-US"/>
               <a:t>Click icon to add picture</a:t>
             </a:r>
             <a:endParaRPr lang="en-US" dirty="0"/>
@@ -2283,8 +2285,8 @@
         </p:nvSpPr>
         <p:spPr>
           <a:xfrm>
-            <a:off x="839788" y="2468880"/>
-            <a:ext cx="3932237" cy="4573906"/>
+            <a:off x="944762" y="2468880"/>
+            <a:ext cx="4423767" cy="4573906"/>
           </a:xfrm>
         </p:spPr>
         <p:txBody>
@@ -2292,46 +2294,46 @@
           <a:lstStyle>
             <a:lvl1pPr marL="0" indent="0">
               <a:buNone/>
-              <a:defRPr sz="1920"/>
+              <a:defRPr sz="1800"/>
             </a:lvl1pPr>
-            <a:lvl2pPr marL="548640" indent="0">
-              <a:buNone/>
-              <a:defRPr sz="1680"/>
+            <a:lvl2pPr marL="514350" indent="0">
+              <a:buNone/>
+              <a:defRPr sz="1575"/>
             </a:lvl2pPr>
-            <a:lvl3pPr marL="1097280" indent="0">
-              <a:buNone/>
-              <a:defRPr sz="1440"/>
+            <a:lvl3pPr marL="1028700" indent="0">
+              <a:buNone/>
+              <a:defRPr sz="1350"/>
             </a:lvl3pPr>
-            <a:lvl4pPr marL="1645920" indent="0">
-              <a:buNone/>
-              <a:defRPr sz="1200"/>
+            <a:lvl4pPr marL="1543050" indent="0">
+              <a:buNone/>
+              <a:defRPr sz="1125"/>
             </a:lvl4pPr>
-            <a:lvl5pPr marL="2194560" indent="0">
-              <a:buNone/>
-              <a:defRPr sz="1200"/>
+            <a:lvl5pPr marL="2057400" indent="0">
+              <a:buNone/>
+              <a:defRPr sz="1125"/>
             </a:lvl5pPr>
-            <a:lvl6pPr marL="2743200" indent="0">
-              <a:buNone/>
-              <a:defRPr sz="1200"/>
+            <a:lvl6pPr marL="2571750" indent="0">
+              <a:buNone/>
+              <a:defRPr sz="1125"/>
             </a:lvl6pPr>
-            <a:lvl7pPr marL="3291840" indent="0">
-              <a:buNone/>
-              <a:defRPr sz="1200"/>
+            <a:lvl7pPr marL="3086100" indent="0">
+              <a:buNone/>
+              <a:defRPr sz="1125"/>
             </a:lvl7pPr>
-            <a:lvl8pPr marL="3840480" indent="0">
-              <a:buNone/>
-              <a:defRPr sz="1200"/>
+            <a:lvl8pPr marL="3600450" indent="0">
+              <a:buNone/>
+              <a:defRPr sz="1125"/>
             </a:lvl8pPr>
-            <a:lvl9pPr marL="4389120" indent="0">
-              <a:buNone/>
-              <a:defRPr sz="1200"/>
+            <a:lvl9pPr marL="4114800" indent="0">
+              <a:buNone/>
+              <a:defRPr sz="1125"/>
             </a:lvl9pPr>
           </a:lstStyle>
           <a:p>
             <a:pPr lvl="0"/>
             <a:r>
-              <a:rPr lang="en-US" smtClean="0"/>
-              <a:t>Edit Master text styles</a:t>
+              <a:rPr lang="en-US"/>
+              <a:t>Click to edit Master text styles</a:t>
             </a:r>
           </a:p>
         </p:txBody>
@@ -2404,7 +2406,7 @@
     </p:spTree>
     <p:extLst>
       <p:ext uri="{BB962C8B-B14F-4D97-AF65-F5344CB8AC3E}">
-        <p14:creationId xmlns:p14="http://schemas.microsoft.com/office/powerpoint/2010/main" val="2275521379"/>
+        <p14:creationId xmlns:p14="http://schemas.microsoft.com/office/powerpoint/2010/main" val="3347611232"/>
       </p:ext>
     </p:extLst>
   </p:cSld>
@@ -2448,8 +2450,8 @@
         </p:nvSpPr>
         <p:spPr>
           <a:xfrm>
-            <a:off x="838200" y="438152"/>
-            <a:ext cx="10515600" cy="1590676"/>
+            <a:off x="942975" y="438150"/>
+            <a:ext cx="11830050" cy="1590676"/>
           </a:xfrm>
           <a:prstGeom prst="rect">
             <a:avLst/>
@@ -2462,7 +2464,7 @@
           <a:lstStyle/>
           <a:p>
             <a:r>
-              <a:rPr lang="en-US" smtClean="0"/>
+              <a:rPr lang="en-US"/>
               <a:t>Click to edit Master title style</a:t>
             </a:r>
             <a:endParaRPr lang="en-US" dirty="0"/>
@@ -2481,8 +2483,8 @@
         </p:nvSpPr>
         <p:spPr>
           <a:xfrm>
-            <a:off x="838200" y="2190750"/>
-            <a:ext cx="10515600" cy="5221606"/>
+            <a:off x="942975" y="2190750"/>
+            <a:ext cx="11830050" cy="5221606"/>
           </a:xfrm>
           <a:prstGeom prst="rect">
             <a:avLst/>
@@ -2496,35 +2498,35 @@
           <a:p>
             <a:pPr lvl="0"/>
             <a:r>
-              <a:rPr lang="en-US" smtClean="0"/>
-              <a:t>Edit Master text styles</a:t>
+              <a:rPr lang="en-US"/>
+              <a:t>Click to edit Master text styles</a:t>
             </a:r>
           </a:p>
           <a:p>
             <a:pPr lvl="1"/>
             <a:r>
-              <a:rPr lang="en-US" smtClean="0"/>
+              <a:rPr lang="en-US"/>
               <a:t>Second level</a:t>
             </a:r>
           </a:p>
           <a:p>
             <a:pPr lvl="2"/>
             <a:r>
-              <a:rPr lang="en-US" smtClean="0"/>
+              <a:rPr lang="en-US"/>
               <a:t>Third level</a:t>
             </a:r>
           </a:p>
           <a:p>
             <a:pPr lvl="3"/>
             <a:r>
-              <a:rPr lang="en-US" smtClean="0"/>
+              <a:rPr lang="en-US"/>
               <a:t>Fourth level</a:t>
             </a:r>
           </a:p>
           <a:p>
             <a:pPr lvl="4"/>
             <a:r>
-              <a:rPr lang="en-US" smtClean="0"/>
+              <a:rPr lang="en-US"/>
               <a:t>Fifth level</a:t>
             </a:r>
             <a:endParaRPr lang="en-US" dirty="0"/>
@@ -2543,8 +2545,8 @@
         </p:nvSpPr>
         <p:spPr>
           <a:xfrm>
-            <a:off x="838200" y="7627622"/>
-            <a:ext cx="2743200" cy="438150"/>
+            <a:off x="942975" y="7627621"/>
+            <a:ext cx="3086100" cy="438150"/>
           </a:xfrm>
           <a:prstGeom prst="rect">
             <a:avLst/>
@@ -2554,7 +2556,7 @@
           <a:bodyPr vert="horz" lIns="91440" tIns="45720" rIns="91440" bIns="45720" rtlCol="0" anchor="ctr"/>
           <a:lstStyle>
             <a:lvl1pPr algn="l">
-              <a:defRPr sz="1440">
+              <a:defRPr sz="1350">
                 <a:solidFill>
                   <a:schemeClr val="tx1">
                     <a:tint val="75000"/>
@@ -2584,8 +2586,8 @@
         </p:nvSpPr>
         <p:spPr>
           <a:xfrm>
-            <a:off x="4038600" y="7627622"/>
-            <a:ext cx="4114800" cy="438150"/>
+            <a:off x="4543425" y="7627621"/>
+            <a:ext cx="4629150" cy="438150"/>
           </a:xfrm>
           <a:prstGeom prst="rect">
             <a:avLst/>
@@ -2595,7 +2597,7 @@
           <a:bodyPr vert="horz" lIns="91440" tIns="45720" rIns="91440" bIns="45720" rtlCol="0" anchor="ctr"/>
           <a:lstStyle>
             <a:lvl1pPr algn="ctr">
-              <a:defRPr sz="1440">
+              <a:defRPr sz="1350">
                 <a:solidFill>
                   <a:schemeClr val="tx1">
                     <a:tint val="75000"/>
@@ -2621,8 +2623,8 @@
         </p:nvSpPr>
         <p:spPr>
           <a:xfrm>
-            <a:off x="8610600" y="7627622"/>
-            <a:ext cx="2743200" cy="438150"/>
+            <a:off x="9686925" y="7627621"/>
+            <a:ext cx="3086100" cy="438150"/>
           </a:xfrm>
           <a:prstGeom prst="rect">
             <a:avLst/>
@@ -2632,7 +2634,7 @@
           <a:bodyPr vert="horz" lIns="91440" tIns="45720" rIns="91440" bIns="45720" rtlCol="0" anchor="ctr"/>
           <a:lstStyle>
             <a:lvl1pPr algn="r">
-              <a:defRPr sz="1440">
+              <a:defRPr sz="1350">
                 <a:solidFill>
                   <a:schemeClr val="tx1">
                     <a:tint val="75000"/>
@@ -2653,27 +2655,27 @@
     </p:spTree>
     <p:extLst>
       <p:ext uri="{BB962C8B-B14F-4D97-AF65-F5344CB8AC3E}">
-        <p14:creationId xmlns:p14="http://schemas.microsoft.com/office/powerpoint/2010/main" val="1902246008"/>
+        <p14:creationId xmlns:p14="http://schemas.microsoft.com/office/powerpoint/2010/main" val="2631583119"/>
       </p:ext>
     </p:extLst>
   </p:cSld>
   <p:clrMap bg1="lt1" tx1="dk1" bg2="lt2" tx2="dk2" accent1="accent1" accent2="accent2" accent3="accent3" accent4="accent4" accent5="accent5" accent6="accent6" hlink="hlink" folHlink="folHlink"/>
   <p:sldLayoutIdLst>
-    <p:sldLayoutId id="2147483661" r:id="rId1"/>
-    <p:sldLayoutId id="2147483662" r:id="rId2"/>
-    <p:sldLayoutId id="2147483663" r:id="rId3"/>
-    <p:sldLayoutId id="2147483664" r:id="rId4"/>
-    <p:sldLayoutId id="2147483665" r:id="rId5"/>
-    <p:sldLayoutId id="2147483666" r:id="rId6"/>
-    <p:sldLayoutId id="2147483667" r:id="rId7"/>
-    <p:sldLayoutId id="2147483668" r:id="rId8"/>
-    <p:sldLayoutId id="2147483669" r:id="rId9"/>
-    <p:sldLayoutId id="2147483670" r:id="rId10"/>
-    <p:sldLayoutId id="2147483671" r:id="rId11"/>
+    <p:sldLayoutId id="2147483673" r:id="rId1"/>
+    <p:sldLayoutId id="2147483674" r:id="rId2"/>
+    <p:sldLayoutId id="2147483675" r:id="rId3"/>
+    <p:sldLayoutId id="2147483676" r:id="rId4"/>
+    <p:sldLayoutId id="2147483677" r:id="rId5"/>
+    <p:sldLayoutId id="2147483678" r:id="rId6"/>
+    <p:sldLayoutId id="2147483679" r:id="rId7"/>
+    <p:sldLayoutId id="2147483680" r:id="rId8"/>
+    <p:sldLayoutId id="2147483681" r:id="rId9"/>
+    <p:sldLayoutId id="2147483682" r:id="rId10"/>
+    <p:sldLayoutId id="2147483683" r:id="rId11"/>
   </p:sldLayoutIdLst>
   <p:txStyles>
     <p:titleStyle>
-      <a:lvl1pPr algn="l" defTabSz="1097280" rtl="0" eaLnBrk="1" latinLnBrk="0" hangingPunct="1">
+      <a:lvl1pPr algn="l" defTabSz="1028700" rtl="0" eaLnBrk="1" latinLnBrk="0" hangingPunct="1">
         <a:lnSpc>
           <a:spcPct val="90000"/>
         </a:lnSpc>
@@ -2681,7 +2683,7 @@
           <a:spcPct val="0"/>
         </a:spcBef>
         <a:buNone/>
-        <a:defRPr sz="5280" kern="1200">
+        <a:defRPr sz="4950" kern="1200">
           <a:solidFill>
             <a:schemeClr val="tx1"/>
           </a:solidFill>
@@ -2692,16 +2694,16 @@
       </a:lvl1pPr>
     </p:titleStyle>
     <p:bodyStyle>
-      <a:lvl1pPr marL="274320" indent="-274320" algn="l" defTabSz="1097280" rtl="0" eaLnBrk="1" latinLnBrk="0" hangingPunct="1">
+      <a:lvl1pPr marL="257175" indent="-257175" algn="l" defTabSz="1028700" rtl="0" eaLnBrk="1" latinLnBrk="0" hangingPunct="1">
         <a:lnSpc>
           <a:spcPct val="90000"/>
         </a:lnSpc>
         <a:spcBef>
-          <a:spcPts val="1200"/>
+          <a:spcPts val="1125"/>
         </a:spcBef>
         <a:buFont typeface="Arial" panose="020B0604020202020204" pitchFamily="34" charset="0"/>
         <a:buChar char="•"/>
-        <a:defRPr sz="3360" kern="1200">
+        <a:defRPr sz="3150" kern="1200">
           <a:solidFill>
             <a:schemeClr val="tx1"/>
           </a:solidFill>
@@ -2710,16 +2712,16 @@
           <a:cs typeface="+mn-cs"/>
         </a:defRPr>
       </a:lvl1pPr>
-      <a:lvl2pPr marL="822960" indent="-274320" algn="l" defTabSz="1097280" rtl="0" eaLnBrk="1" latinLnBrk="0" hangingPunct="1">
+      <a:lvl2pPr marL="771525" indent="-257175" algn="l" defTabSz="1028700" rtl="0" eaLnBrk="1" latinLnBrk="0" hangingPunct="1">
         <a:lnSpc>
           <a:spcPct val="90000"/>
         </a:lnSpc>
         <a:spcBef>
-          <a:spcPts val="600"/>
+          <a:spcPts val="563"/>
         </a:spcBef>
         <a:buFont typeface="Arial" panose="020B0604020202020204" pitchFamily="34" charset="0"/>
         <a:buChar char="•"/>
-        <a:defRPr sz="2880" kern="1200">
+        <a:defRPr sz="2700" kern="1200">
           <a:solidFill>
             <a:schemeClr val="tx1"/>
           </a:solidFill>
@@ -2728,16 +2730,16 @@
           <a:cs typeface="+mn-cs"/>
         </a:defRPr>
       </a:lvl2pPr>
-      <a:lvl3pPr marL="1371600" indent="-274320" algn="l" defTabSz="1097280" rtl="0" eaLnBrk="1" latinLnBrk="0" hangingPunct="1">
+      <a:lvl3pPr marL="1285875" indent="-257175" algn="l" defTabSz="1028700" rtl="0" eaLnBrk="1" latinLnBrk="0" hangingPunct="1">
         <a:lnSpc>
           <a:spcPct val="90000"/>
         </a:lnSpc>
         <a:spcBef>
-          <a:spcPts val="600"/>
+          <a:spcPts val="563"/>
         </a:spcBef>
         <a:buFont typeface="Arial" panose="020B0604020202020204" pitchFamily="34" charset="0"/>
         <a:buChar char="•"/>
-        <a:defRPr sz="2400" kern="1200">
+        <a:defRPr sz="2250" kern="1200">
           <a:solidFill>
             <a:schemeClr val="tx1"/>
           </a:solidFill>
@@ -2746,16 +2748,16 @@
           <a:cs typeface="+mn-cs"/>
         </a:defRPr>
       </a:lvl3pPr>
-      <a:lvl4pPr marL="1920240" indent="-274320" algn="l" defTabSz="1097280" rtl="0" eaLnBrk="1" latinLnBrk="0" hangingPunct="1">
+      <a:lvl4pPr marL="1800225" indent="-257175" algn="l" defTabSz="1028700" rtl="0" eaLnBrk="1" latinLnBrk="0" hangingPunct="1">
         <a:lnSpc>
           <a:spcPct val="90000"/>
         </a:lnSpc>
         <a:spcBef>
-          <a:spcPts val="600"/>
+          <a:spcPts val="563"/>
         </a:spcBef>
         <a:buFont typeface="Arial" panose="020B0604020202020204" pitchFamily="34" charset="0"/>
         <a:buChar char="•"/>
-        <a:defRPr sz="2160" kern="1200">
+        <a:defRPr sz="2025" kern="1200">
           <a:solidFill>
             <a:schemeClr val="tx1"/>
           </a:solidFill>
@@ -2764,16 +2766,16 @@
           <a:cs typeface="+mn-cs"/>
         </a:defRPr>
       </a:lvl4pPr>
-      <a:lvl5pPr marL="2468880" indent="-274320" algn="l" defTabSz="1097280" rtl="0" eaLnBrk="1" latinLnBrk="0" hangingPunct="1">
+      <a:lvl5pPr marL="2314575" indent="-257175" algn="l" defTabSz="1028700" rtl="0" eaLnBrk="1" latinLnBrk="0" hangingPunct="1">
         <a:lnSpc>
           <a:spcPct val="90000"/>
         </a:lnSpc>
         <a:spcBef>
-          <a:spcPts val="600"/>
+          <a:spcPts val="563"/>
         </a:spcBef>
         <a:buFont typeface="Arial" panose="020B0604020202020204" pitchFamily="34" charset="0"/>
         <a:buChar char="•"/>
-        <a:defRPr sz="2160" kern="1200">
+        <a:defRPr sz="2025" kern="1200">
           <a:solidFill>
             <a:schemeClr val="tx1"/>
           </a:solidFill>
@@ -2782,16 +2784,16 @@
           <a:cs typeface="+mn-cs"/>
         </a:defRPr>
       </a:lvl5pPr>
-      <a:lvl6pPr marL="3017520" indent="-274320" algn="l" defTabSz="1097280" rtl="0" eaLnBrk="1" latinLnBrk="0" hangingPunct="1">
+      <a:lvl6pPr marL="2828925" indent="-257175" algn="l" defTabSz="1028700" rtl="0" eaLnBrk="1" latinLnBrk="0" hangingPunct="1">
         <a:lnSpc>
           <a:spcPct val="90000"/>
         </a:lnSpc>
         <a:spcBef>
-          <a:spcPts val="600"/>
+          <a:spcPts val="563"/>
         </a:spcBef>
         <a:buFont typeface="Arial" panose="020B0604020202020204" pitchFamily="34" charset="0"/>
         <a:buChar char="•"/>
-        <a:defRPr sz="2160" kern="1200">
+        <a:defRPr sz="2025" kern="1200">
           <a:solidFill>
             <a:schemeClr val="tx1"/>
           </a:solidFill>
@@ -2800,16 +2802,16 @@
           <a:cs typeface="+mn-cs"/>
         </a:defRPr>
       </a:lvl6pPr>
-      <a:lvl7pPr marL="3566160" indent="-274320" algn="l" defTabSz="1097280" rtl="0" eaLnBrk="1" latinLnBrk="0" hangingPunct="1">
+      <a:lvl7pPr marL="3343275" indent="-257175" algn="l" defTabSz="1028700" rtl="0" eaLnBrk="1" latinLnBrk="0" hangingPunct="1">
         <a:lnSpc>
           <a:spcPct val="90000"/>
         </a:lnSpc>
         <a:spcBef>
-          <a:spcPts val="600"/>
+          <a:spcPts val="563"/>
         </a:spcBef>
         <a:buFont typeface="Arial" panose="020B0604020202020204" pitchFamily="34" charset="0"/>
         <a:buChar char="•"/>
-        <a:defRPr sz="2160" kern="1200">
+        <a:defRPr sz="2025" kern="1200">
           <a:solidFill>
             <a:schemeClr val="tx1"/>
           </a:solidFill>
@@ -2818,16 +2820,16 @@
           <a:cs typeface="+mn-cs"/>
         </a:defRPr>
       </a:lvl7pPr>
-      <a:lvl8pPr marL="4114800" indent="-274320" algn="l" defTabSz="1097280" rtl="0" eaLnBrk="1" latinLnBrk="0" hangingPunct="1">
+      <a:lvl8pPr marL="3857625" indent="-257175" algn="l" defTabSz="1028700" rtl="0" eaLnBrk="1" latinLnBrk="0" hangingPunct="1">
         <a:lnSpc>
           <a:spcPct val="90000"/>
         </a:lnSpc>
         <a:spcBef>
-          <a:spcPts val="600"/>
+          <a:spcPts val="563"/>
         </a:spcBef>
         <a:buFont typeface="Arial" panose="020B0604020202020204" pitchFamily="34" charset="0"/>
         <a:buChar char="•"/>
-        <a:defRPr sz="2160" kern="1200">
+        <a:defRPr sz="2025" kern="1200">
           <a:solidFill>
             <a:schemeClr val="tx1"/>
           </a:solidFill>
@@ -2836,16 +2838,16 @@
           <a:cs typeface="+mn-cs"/>
         </a:defRPr>
       </a:lvl8pPr>
-      <a:lvl9pPr marL="4663440" indent="-274320" algn="l" defTabSz="1097280" rtl="0" eaLnBrk="1" latinLnBrk="0" hangingPunct="1">
+      <a:lvl9pPr marL="4371975" indent="-257175" algn="l" defTabSz="1028700" rtl="0" eaLnBrk="1" latinLnBrk="0" hangingPunct="1">
         <a:lnSpc>
           <a:spcPct val="90000"/>
         </a:lnSpc>
         <a:spcBef>
-          <a:spcPts val="600"/>
+          <a:spcPts val="563"/>
         </a:spcBef>
         <a:buFont typeface="Arial" panose="020B0604020202020204" pitchFamily="34" charset="0"/>
         <a:buChar char="•"/>
-        <a:defRPr sz="2160" kern="1200">
+        <a:defRPr sz="2025" kern="1200">
           <a:solidFill>
             <a:schemeClr val="tx1"/>
           </a:solidFill>
@@ -2859,8 +2861,8 @@
       <a:defPPr>
         <a:defRPr lang="en-US"/>
       </a:defPPr>
-      <a:lvl1pPr marL="0" algn="l" defTabSz="1097280" rtl="0" eaLnBrk="1" latinLnBrk="0" hangingPunct="1">
-        <a:defRPr sz="2160" kern="1200">
+      <a:lvl1pPr marL="0" algn="l" defTabSz="1028700" rtl="0" eaLnBrk="1" latinLnBrk="0" hangingPunct="1">
+        <a:defRPr sz="2025" kern="1200">
           <a:solidFill>
             <a:schemeClr val="tx1"/>
           </a:solidFill>
@@ -2869,8 +2871,8 @@
           <a:cs typeface="+mn-cs"/>
         </a:defRPr>
       </a:lvl1pPr>
-      <a:lvl2pPr marL="548640" algn="l" defTabSz="1097280" rtl="0" eaLnBrk="1" latinLnBrk="0" hangingPunct="1">
-        <a:defRPr sz="2160" kern="1200">
+      <a:lvl2pPr marL="514350" algn="l" defTabSz="1028700" rtl="0" eaLnBrk="1" latinLnBrk="0" hangingPunct="1">
+        <a:defRPr sz="2025" kern="1200">
           <a:solidFill>
             <a:schemeClr val="tx1"/>
           </a:solidFill>
@@ -2879,8 +2881,8 @@
           <a:cs typeface="+mn-cs"/>
         </a:defRPr>
       </a:lvl2pPr>
-      <a:lvl3pPr marL="1097280" algn="l" defTabSz="1097280" rtl="0" eaLnBrk="1" latinLnBrk="0" hangingPunct="1">
-        <a:defRPr sz="2160" kern="1200">
+      <a:lvl3pPr marL="1028700" algn="l" defTabSz="1028700" rtl="0" eaLnBrk="1" latinLnBrk="0" hangingPunct="1">
+        <a:defRPr sz="2025" kern="1200">
           <a:solidFill>
             <a:schemeClr val="tx1"/>
           </a:solidFill>
@@ -2889,8 +2891,8 @@
           <a:cs typeface="+mn-cs"/>
         </a:defRPr>
       </a:lvl3pPr>
-      <a:lvl4pPr marL="1645920" algn="l" defTabSz="1097280" rtl="0" eaLnBrk="1" latinLnBrk="0" hangingPunct="1">
-        <a:defRPr sz="2160" kern="1200">
+      <a:lvl4pPr marL="1543050" algn="l" defTabSz="1028700" rtl="0" eaLnBrk="1" latinLnBrk="0" hangingPunct="1">
+        <a:defRPr sz="2025" kern="1200">
           <a:solidFill>
             <a:schemeClr val="tx1"/>
           </a:solidFill>
@@ -2899,8 +2901,8 @@
           <a:cs typeface="+mn-cs"/>
         </a:defRPr>
       </a:lvl4pPr>
-      <a:lvl5pPr marL="2194560" algn="l" defTabSz="1097280" rtl="0" eaLnBrk="1" latinLnBrk="0" hangingPunct="1">
-        <a:defRPr sz="2160" kern="1200">
+      <a:lvl5pPr marL="2057400" algn="l" defTabSz="1028700" rtl="0" eaLnBrk="1" latinLnBrk="0" hangingPunct="1">
+        <a:defRPr sz="2025" kern="1200">
           <a:solidFill>
             <a:schemeClr val="tx1"/>
           </a:solidFill>
@@ -2909,8 +2911,8 @@
           <a:cs typeface="+mn-cs"/>
         </a:defRPr>
       </a:lvl5pPr>
-      <a:lvl6pPr marL="2743200" algn="l" defTabSz="1097280" rtl="0" eaLnBrk="1" latinLnBrk="0" hangingPunct="1">
-        <a:defRPr sz="2160" kern="1200">
+      <a:lvl6pPr marL="2571750" algn="l" defTabSz="1028700" rtl="0" eaLnBrk="1" latinLnBrk="0" hangingPunct="1">
+        <a:defRPr sz="2025" kern="1200">
           <a:solidFill>
             <a:schemeClr val="tx1"/>
           </a:solidFill>
@@ -2919,8 +2921,8 @@
           <a:cs typeface="+mn-cs"/>
         </a:defRPr>
       </a:lvl6pPr>
-      <a:lvl7pPr marL="3291840" algn="l" defTabSz="1097280" rtl="0" eaLnBrk="1" latinLnBrk="0" hangingPunct="1">
-        <a:defRPr sz="2160" kern="1200">
+      <a:lvl7pPr marL="3086100" algn="l" defTabSz="1028700" rtl="0" eaLnBrk="1" latinLnBrk="0" hangingPunct="1">
+        <a:defRPr sz="2025" kern="1200">
           <a:solidFill>
             <a:schemeClr val="tx1"/>
           </a:solidFill>
@@ -2929,8 +2931,8 @@
           <a:cs typeface="+mn-cs"/>
         </a:defRPr>
       </a:lvl7pPr>
-      <a:lvl8pPr marL="3840480" algn="l" defTabSz="1097280" rtl="0" eaLnBrk="1" latinLnBrk="0" hangingPunct="1">
-        <a:defRPr sz="2160" kern="1200">
+      <a:lvl8pPr marL="3600450" algn="l" defTabSz="1028700" rtl="0" eaLnBrk="1" latinLnBrk="0" hangingPunct="1">
+        <a:defRPr sz="2025" kern="1200">
           <a:solidFill>
             <a:schemeClr val="tx1"/>
           </a:solidFill>
@@ -2939,8 +2941,8 @@
           <a:cs typeface="+mn-cs"/>
         </a:defRPr>
       </a:lvl8pPr>
-      <a:lvl9pPr marL="4389120" algn="l" defTabSz="1097280" rtl="0" eaLnBrk="1" latinLnBrk="0" hangingPunct="1">
-        <a:defRPr sz="2160" kern="1200">
+      <a:lvl9pPr marL="4114800" algn="l" defTabSz="1028700" rtl="0" eaLnBrk="1" latinLnBrk="0" hangingPunct="1">
+        <a:defRPr sz="2025" kern="1200">
           <a:solidFill>
             <a:schemeClr val="tx1"/>
           </a:solidFill>
@@ -2979,38 +2981,6 @@
           <a:chExt cx="0" cy="0"/>
         </a:xfrm>
       </p:grpSpPr>
-      <p:pic>
-        <p:nvPicPr>
-          <p:cNvPr id="36" name="Picture 35"/>
-          <p:cNvPicPr>
-            <a:picLocks noChangeAspect="1"/>
-          </p:cNvPicPr>
-          <p:nvPr/>
-        </p:nvPicPr>
-        <p:blipFill rotWithShape="1">
-          <a:blip r:embed="rId2">
-            <a:extLst>
-              <a:ext uri="{28A0092B-C50C-407E-A947-70E740481C1C}">
-                <a14:useLocalDpi xmlns:a14="http://schemas.microsoft.com/office/drawing/2010/main" val="0"/>
-              </a:ext>
-            </a:extLst>
-          </a:blip>
-          <a:srcRect l="4532" t="6918" r="4383" b="7138"/>
-          <a:stretch/>
-        </p:blipFill>
-        <p:spPr>
-          <a:xfrm>
-            <a:off x="7577" y="0"/>
-            <a:ext cx="12184424" cy="6888480"/>
-          </a:xfrm>
-          <a:prstGeom prst="rect">
-            <a:avLst/>
-          </a:prstGeom>
-          <a:ln>
-            <a:noFill/>
-          </a:ln>
-        </p:spPr>
-      </p:pic>
       <p:sp>
         <p:nvSpPr>
           <p:cNvPr id="6" name="TextBox 5"/>
@@ -3019,7 +2989,7 @@
         </p:nvSpPr>
         <p:spPr>
           <a:xfrm>
-            <a:off x="2828881" y="5741"/>
+            <a:off x="2931208" y="107341"/>
             <a:ext cx="1950720" cy="369332"/>
           </a:xfrm>
           <a:prstGeom prst="rect">
@@ -3033,21 +3003,14 @@
           </a:bodyPr>
           <a:lstStyle/>
           <a:p>
+            <a:pPr algn="ctr"/>
             <a:r>
               <a:rPr lang="en-US" dirty="0" err="1">
                 <a:solidFill>
                   <a:schemeClr val="accent1"/>
                 </a:solidFill>
               </a:rPr>
-              <a:t>t</a:t>
-            </a:r>
-            <a:r>
-              <a:rPr lang="en-US" dirty="0" err="1">
-                <a:solidFill>
-                  <a:schemeClr val="accent1"/>
-                </a:solidFill>
-              </a:rPr>
-              <a:t>itle_width</a:t>
+              <a:t>title_width</a:t>
             </a:r>
             <a:endParaRPr lang="en-US" dirty="0">
               <a:solidFill>
@@ -3065,8 +3028,8 @@
         </p:nvSpPr>
         <p:spPr>
           <a:xfrm rot="5400000">
-            <a:off x="6050801" y="-3284018"/>
-            <a:ext cx="112084" cy="7598231"/>
+            <a:off x="6906325" y="-3631910"/>
+            <a:ext cx="125152" cy="8484148"/>
           </a:xfrm>
           <a:prstGeom prst="leftBrace">
             <a:avLst>
@@ -3107,7 +3070,7 @@
         </p:nvSpPr>
         <p:spPr>
           <a:xfrm>
-            <a:off x="5756389" y="89723"/>
+            <a:off x="6458836" y="191323"/>
             <a:ext cx="1020130" cy="369332"/>
           </a:xfrm>
           <a:prstGeom prst="rect">
@@ -3121,6 +3084,7 @@
           </a:bodyPr>
           <a:lstStyle/>
           <a:p>
+            <a:pPr algn="ctr"/>
             <a:r>
               <a:rPr lang="en-US" dirty="0">
                 <a:solidFill>
@@ -3129,11 +3093,6 @@
               </a:rPr>
               <a:t>width</a:t>
             </a:r>
-            <a:endParaRPr lang="en-US" dirty="0">
-              <a:solidFill>
-                <a:schemeClr val="accent1"/>
-              </a:solidFill>
-            </a:endParaRPr>
           </a:p>
         </p:txBody>
       </p:sp>
@@ -3145,8 +3104,8 @@
         </p:nvSpPr>
         <p:spPr>
           <a:xfrm>
-            <a:off x="2166543" y="615315"/>
-            <a:ext cx="112084" cy="5682616"/>
+            <a:off x="2585643" y="716915"/>
+            <a:ext cx="107024" cy="5047790"/>
           </a:xfrm>
           <a:prstGeom prst="leftBrace">
             <a:avLst>
@@ -3187,7 +3146,7 @@
         </p:nvSpPr>
         <p:spPr>
           <a:xfrm>
-            <a:off x="1287597" y="3255566"/>
+            <a:off x="1706697" y="3056144"/>
             <a:ext cx="1020130" cy="369332"/>
           </a:xfrm>
           <a:prstGeom prst="rect">
@@ -3209,11 +3168,6 @@
               </a:rPr>
               <a:t>height</a:t>
             </a:r>
-            <a:endParaRPr lang="en-US" dirty="0">
-              <a:solidFill>
-                <a:schemeClr val="accent1"/>
-              </a:solidFill>
-            </a:endParaRPr>
           </a:p>
         </p:txBody>
       </p:sp>
@@ -3225,7 +3179,7 @@
         </p:nvSpPr>
         <p:spPr>
           <a:xfrm rot="10800000">
-            <a:off x="9959891" y="956914"/>
+            <a:off x="11249565" y="879066"/>
             <a:ext cx="112084" cy="59055"/>
           </a:xfrm>
           <a:prstGeom prst="leftBrace">
@@ -3271,7 +3225,7 @@
         </p:nvSpPr>
         <p:spPr>
           <a:xfrm rot="10800000">
-            <a:off x="9954831" y="669606"/>
+            <a:off x="11254098" y="771207"/>
             <a:ext cx="112084" cy="59055"/>
           </a:xfrm>
           <a:prstGeom prst="leftBrace">
@@ -3317,8 +3271,8 @@
         </p:nvSpPr>
         <p:spPr>
           <a:xfrm>
-            <a:off x="10121847" y="495248"/>
-            <a:ext cx="2025359" cy="646331"/>
+            <a:off x="11421115" y="467446"/>
+            <a:ext cx="2025359" cy="369332"/>
           </a:xfrm>
           <a:prstGeom prst="rect">
             <a:avLst/>
@@ -3345,21 +3299,6 @@
               </a:solidFill>
             </a:endParaRPr>
           </a:p>
-          <a:p>
-            <a:r>
-              <a:rPr lang="en-US" dirty="0" err="1">
-                <a:solidFill>
-                  <a:schemeClr val="accent6"/>
-                </a:solidFill>
-              </a:rPr>
-              <a:t>margin_legend_i</a:t>
-            </a:r>
-            <a:endParaRPr lang="en-US" dirty="0">
-              <a:solidFill>
-                <a:schemeClr val="accent6"/>
-              </a:solidFill>
-            </a:endParaRPr>
-          </a:p>
         </p:txBody>
       </p:sp>
       <p:sp>
@@ -3370,7 +3309,7 @@
         </p:nvSpPr>
         <p:spPr>
           <a:xfrm rot="10800000">
-            <a:off x="9959891" y="1258568"/>
+            <a:off x="11259158" y="1000589"/>
             <a:ext cx="112084" cy="123817"/>
           </a:xfrm>
           <a:prstGeom prst="leftBrace">
@@ -3416,7 +3355,7 @@
         </p:nvSpPr>
         <p:spPr>
           <a:xfrm>
-            <a:off x="10121846" y="1115490"/>
+            <a:off x="11421114" y="921350"/>
             <a:ext cx="2025359" cy="369332"/>
           </a:xfrm>
           <a:prstGeom prst="rect">
@@ -3454,7 +3393,7 @@
         </p:nvSpPr>
         <p:spPr>
           <a:xfrm rot="10800000">
-            <a:off x="10019882" y="6233544"/>
+            <a:off x="11236101" y="5687770"/>
             <a:ext cx="112084" cy="59055"/>
           </a:xfrm>
           <a:prstGeom prst="leftBrace">
@@ -3500,7 +3439,7 @@
         </p:nvSpPr>
         <p:spPr>
           <a:xfrm>
-            <a:off x="10181838" y="6048877"/>
+            <a:off x="11421113" y="5503102"/>
             <a:ext cx="2025359" cy="369332"/>
           </a:xfrm>
           <a:prstGeom prst="rect">
@@ -3538,7 +3477,7 @@
         </p:nvSpPr>
         <p:spPr>
           <a:xfrm rot="10800000" flipH="1">
-            <a:off x="2081401" y="610550"/>
+            <a:off x="2500501" y="712151"/>
             <a:ext cx="112084" cy="59055"/>
           </a:xfrm>
           <a:prstGeom prst="leftBrace">
@@ -3584,7 +3523,7 @@
         </p:nvSpPr>
         <p:spPr>
           <a:xfrm rot="10800000" flipH="1">
-            <a:off x="2081401" y="673371"/>
+            <a:off x="2500501" y="774972"/>
             <a:ext cx="112084" cy="59055"/>
           </a:xfrm>
           <a:prstGeom prst="leftBrace">
@@ -3630,7 +3569,7 @@
         </p:nvSpPr>
         <p:spPr>
           <a:xfrm rot="10800000" flipH="1">
-            <a:off x="2079152" y="1567746"/>
+            <a:off x="2498252" y="1437911"/>
             <a:ext cx="112084" cy="59055"/>
           </a:xfrm>
           <a:prstGeom prst="leftBrace">
@@ -3676,7 +3615,7 @@
         </p:nvSpPr>
         <p:spPr>
           <a:xfrm rot="10800000" flipH="1">
-            <a:off x="2054459" y="6242522"/>
+            <a:off x="2473559" y="5699715"/>
             <a:ext cx="112084" cy="59055"/>
           </a:xfrm>
           <a:prstGeom prst="leftBrace">
@@ -3722,7 +3661,7 @@
         </p:nvSpPr>
         <p:spPr>
           <a:xfrm rot="5400000" flipH="1">
-            <a:off x="2281212" y="6366347"/>
+            <a:off x="2700312" y="5855179"/>
             <a:ext cx="112084" cy="59055"/>
           </a:xfrm>
           <a:prstGeom prst="leftBrace">
@@ -3768,7 +3707,7 @@
         </p:nvSpPr>
         <p:spPr>
           <a:xfrm rot="5400000" flipH="1">
-            <a:off x="4556100" y="6334369"/>
+            <a:off x="4733559" y="5823201"/>
             <a:ext cx="112084" cy="123009"/>
           </a:xfrm>
           <a:prstGeom prst="leftBrace">
@@ -3814,8 +3753,8 @@
         </p:nvSpPr>
         <p:spPr>
           <a:xfrm rot="5400000" flipH="1">
-            <a:off x="9721328" y="6267286"/>
-            <a:ext cx="112084" cy="257178"/>
+            <a:off x="11106749" y="5811396"/>
+            <a:ext cx="112084" cy="146620"/>
           </a:xfrm>
           <a:prstGeom prst="leftBrace">
             <a:avLst>
@@ -3860,7 +3799,7 @@
         </p:nvSpPr>
         <p:spPr>
           <a:xfrm>
-            <a:off x="28577" y="315201"/>
+            <a:off x="447678" y="416802"/>
             <a:ext cx="2025359" cy="646331"/>
           </a:xfrm>
           <a:prstGeom prst="rect">
@@ -3915,7 +3854,7 @@
         </p:nvSpPr>
         <p:spPr>
           <a:xfrm>
-            <a:off x="28577" y="1415138"/>
+            <a:off x="447678" y="1282772"/>
             <a:ext cx="2025359" cy="369332"/>
           </a:xfrm>
           <a:prstGeom prst="rect">
@@ -3936,15 +3875,7 @@
                   <a:srgbClr val="7030A0"/>
                 </a:solidFill>
               </a:rPr>
-              <a:t>m</a:t>
-            </a:r>
-            <a:r>
-              <a:rPr lang="en-US" dirty="0" err="1">
-                <a:solidFill>
-                  <a:srgbClr val="7030A0"/>
-                </a:solidFill>
-              </a:rPr>
-              <a:t>argin_title_b</a:t>
+              <a:t>margin_title_b</a:t>
             </a:r>
             <a:endParaRPr lang="en-US" dirty="0">
               <a:solidFill>
@@ -3962,7 +3893,7 @@
         </p:nvSpPr>
         <p:spPr>
           <a:xfrm>
-            <a:off x="0" y="6078405"/>
+            <a:off x="419101" y="5535597"/>
             <a:ext cx="2025359" cy="369332"/>
           </a:xfrm>
           <a:prstGeom prst="rect">
@@ -4001,7 +3932,7 @@
         </p:nvSpPr>
         <p:spPr>
           <a:xfrm>
-            <a:off x="1539196" y="6494430"/>
+            <a:off x="1958296" y="5983261"/>
             <a:ext cx="10608008" cy="369332"/>
           </a:xfrm>
           <a:prstGeom prst="rect">
@@ -4029,7 +3960,7 @@
                   <a:srgbClr val="7030A0"/>
                 </a:solidFill>
               </a:rPr>
-              <a:t>                  </a:t>
+              <a:t>              </a:t>
             </a:r>
             <a:r>
               <a:rPr lang="en-US" dirty="0" err="1">
@@ -4045,7 +3976,7 @@
                   <a:srgbClr val="7030A0"/>
                 </a:solidFill>
               </a:rPr>
-              <a:t>                                                        </a:t>
+              <a:t>                                                                               </a:t>
             </a:r>
             <a:r>
               <a:rPr lang="en-US" dirty="0" err="1">
@@ -4063,7 +3994,7 @@
                   <a:srgbClr val="7030A0"/>
                 </a:solidFill>
               </a:rPr>
-              <a:t>   </a:t>
+              <a:t>  </a:t>
             </a:r>
             <a:r>
               <a:rPr lang="en-US" dirty="0" err="1">
@@ -4083,14 +4014,14 @@
       </p:sp>
       <p:sp>
         <p:nvSpPr>
-          <p:cNvPr id="37" name="Left Brace 36"/>
+          <p:cNvPr id="5" name="Left Brace 4"/>
           <p:cNvSpPr/>
           <p:nvPr/>
         </p:nvSpPr>
         <p:spPr>
-          <a:xfrm rot="16200000" flipH="1">
-            <a:off x="4671169" y="386345"/>
-            <a:ext cx="95677" cy="105955"/>
+          <a:xfrm rot="5400000">
+            <a:off x="3850526" y="-647025"/>
+            <a:ext cx="112084" cy="2359481"/>
           </a:xfrm>
           <a:prstGeom prst="leftBrace">
             <a:avLst>
@@ -4098,11 +4029,7 @@
               <a:gd name="adj2" fmla="val 50000"/>
             </a:avLst>
           </a:prstGeom>
-          <a:ln w="19050">
-            <a:solidFill>
-              <a:srgbClr val="7030A0"/>
-            </a:solidFill>
-          </a:ln>
+          <a:ln w="19050"/>
         </p:spPr>
         <p:style>
           <a:lnRef idx="1">
@@ -4129,22 +4056,28 @@
       </p:sp>
       <p:sp>
         <p:nvSpPr>
-          <p:cNvPr id="5" name="Left Brace 4"/>
+          <p:cNvPr id="39" name="Left Brace 38"/>
           <p:cNvSpPr/>
           <p:nvPr/>
         </p:nvSpPr>
         <p:spPr>
-          <a:xfrm rot="5400000">
-            <a:off x="3431426" y="-748625"/>
-            <a:ext cx="112084" cy="2359481"/>
+          <a:xfrm rot="5400000" flipH="1">
+            <a:off x="10968972" y="5829785"/>
+            <a:ext cx="112084" cy="109836"/>
           </a:xfrm>
           <a:prstGeom prst="leftBrace">
             <a:avLst>
-              <a:gd name="adj1" fmla="val 79717"/>
+              <a:gd name="adj1" fmla="val 25000"/>
               <a:gd name="adj2" fmla="val 50000"/>
             </a:avLst>
           </a:prstGeom>
-          <a:ln w="19050"/>
+          <a:ln w="19050">
+            <a:solidFill>
+              <a:schemeClr val="accent4">
+                <a:lumMod val="75000"/>
+              </a:schemeClr>
+            </a:solidFill>
+          </a:ln>
         </p:spPr>
         <p:style>
           <a:lnRef idx="1">
@@ -4169,101 +4102,6 @@
           </a:p>
         </p:txBody>
       </p:sp>
-      <p:sp>
-        <p:nvSpPr>
-          <p:cNvPr id="38" name="TextBox 37"/>
-          <p:cNvSpPr txBox="1"/>
-          <p:nvPr/>
-        </p:nvSpPr>
-        <p:spPr>
-          <a:xfrm>
-            <a:off x="3525333" y="5741"/>
-            <a:ext cx="2025359" cy="369332"/>
-          </a:xfrm>
-          <a:prstGeom prst="rect">
-            <a:avLst/>
-          </a:prstGeom>
-          <a:noFill/>
-        </p:spPr>
-        <p:txBody>
-          <a:bodyPr wrap="square" rtlCol="0">
-            <a:spAutoFit/>
-          </a:bodyPr>
-          <a:lstStyle/>
-          <a:p>
-            <a:pPr algn="r"/>
-            <a:r>
-              <a:rPr lang="en-US" dirty="0" err="1">
-                <a:solidFill>
-                  <a:srgbClr val="7030A0"/>
-                </a:solidFill>
-              </a:rPr>
-              <a:t>l</a:t>
-            </a:r>
-            <a:r>
-              <a:rPr lang="en-US" dirty="0" err="1">
-                <a:solidFill>
-                  <a:srgbClr val="7030A0"/>
-                </a:solidFill>
-              </a:rPr>
-              <a:t>egend_bump</a:t>
-            </a:r>
-            <a:endParaRPr lang="en-US" dirty="0">
-              <a:solidFill>
-                <a:srgbClr val="7030A0"/>
-              </a:solidFill>
-            </a:endParaRPr>
-          </a:p>
-        </p:txBody>
-      </p:sp>
-      <p:sp>
-        <p:nvSpPr>
-          <p:cNvPr id="39" name="Left Brace 38"/>
-          <p:cNvSpPr/>
-          <p:nvPr/>
-        </p:nvSpPr>
-        <p:spPr>
-          <a:xfrm rot="5400000" flipH="1">
-            <a:off x="9537821" y="6340954"/>
-            <a:ext cx="112084" cy="109836"/>
-          </a:xfrm>
-          <a:prstGeom prst="leftBrace">
-            <a:avLst>
-              <a:gd name="adj1" fmla="val 25000"/>
-              <a:gd name="adj2" fmla="val 50000"/>
-            </a:avLst>
-          </a:prstGeom>
-          <a:ln w="19050">
-            <a:solidFill>
-              <a:schemeClr val="accent4">
-                <a:lumMod val="75000"/>
-              </a:schemeClr>
-            </a:solidFill>
-          </a:ln>
-        </p:spPr>
-        <p:style>
-          <a:lnRef idx="1">
-            <a:schemeClr val="accent1"/>
-          </a:lnRef>
-          <a:fillRef idx="0">
-            <a:schemeClr val="accent1"/>
-          </a:fillRef>
-          <a:effectRef idx="0">
-            <a:schemeClr val="accent1"/>
-          </a:effectRef>
-          <a:fontRef idx="minor">
-            <a:schemeClr val="tx1"/>
-          </a:fontRef>
-        </p:style>
-        <p:txBody>
-          <a:bodyPr rtlCol="0" anchor="ctr"/>
-          <a:lstStyle/>
-          <a:p>
-            <a:pPr algn="ctr"/>
-            <a:endParaRPr lang="en-US"/>
-          </a:p>
-        </p:txBody>
-      </p:sp>
       <p:graphicFrame>
         <p:nvGraphicFramePr>
           <p:cNvPr id="2" name="Table 1"/>
@@ -4273,13 +4111,13 @@
           <p:nvPr>
             <p:extLst>
               <p:ext uri="{D42A27DB-BD31-4B8C-83A1-F6EECF244321}">
-                <p14:modId xmlns:p14="http://schemas.microsoft.com/office/powerpoint/2010/main" val="211960351"/>
+                <p14:modId xmlns:p14="http://schemas.microsoft.com/office/powerpoint/2010/main" val="523522582"/>
               </p:ext>
             </p:extLst>
           </p:nvPr>
         </p:nvGraphicFramePr>
         <p:xfrm>
-          <a:off x="1192394" y="7144210"/>
+          <a:off x="2169161" y="6630769"/>
           <a:ext cx="9599480" cy="1005840"/>
         </p:xfrm>
         <a:graphic>
@@ -4333,10 +4171,9 @@
                     <a:p>
                       <a:pPr algn="ctr"/>
                       <a:r>
-                        <a:rPr lang="en-US" sz="1600" dirty="0" smtClean="0"/>
+                        <a:rPr lang="en-US" sz="1600" dirty="0"/>
                         <a:t>Legend</a:t>
                       </a:r>
-                      <a:endParaRPr lang="en-US" sz="1600" dirty="0"/>
                     </a:p>
                   </a:txBody>
                   <a:tcPr anchor="ctr">
@@ -4445,10 +4282,9 @@
                     <a:p>
                       <a:pPr algn="r"/>
                       <a:r>
-                        <a:rPr lang="en-US" sz="1600" dirty="0" smtClean="0"/>
+                        <a:rPr lang="en-US" sz="1600" dirty="0"/>
                         <a:t>Where to override:</a:t>
                       </a:r>
-                      <a:endParaRPr lang="en-US" sz="1600" dirty="0"/>
                     </a:p>
                   </a:txBody>
                   <a:tcPr anchor="ctr">
@@ -4479,7 +4315,7 @@
                     <a:p>
                       <a:pPr algn="ctr"/>
                       <a:r>
-                        <a:rPr lang="en-US" sz="1600" dirty="0" err="1" smtClean="0">
+                        <a:rPr lang="en-US" sz="1600" dirty="0" err="1">
                           <a:solidFill>
                             <a:schemeClr val="accent1"/>
                           </a:solidFill>
@@ -4487,18 +4323,13 @@
                         <a:t>Finalize_plot</a:t>
                       </a:r>
                       <a:r>
-                        <a:rPr lang="en-US" sz="1600" dirty="0" smtClean="0">
+                        <a:rPr lang="en-US" sz="1600" dirty="0">
                           <a:solidFill>
                             <a:schemeClr val="accent1"/>
                           </a:solidFill>
                         </a:rPr>
                         <a:t>()</a:t>
                       </a:r>
-                      <a:endParaRPr lang="en-US" sz="1600" dirty="0">
-                        <a:solidFill>
-                          <a:schemeClr val="accent1"/>
-                        </a:solidFill>
-                      </a:endParaRPr>
                     </a:p>
                   </a:txBody>
                   <a:tcPr anchor="ctr">
@@ -4520,7 +4351,7 @@
                     <a:p>
                       <a:pPr algn="ctr"/>
                       <a:r>
-                        <a:rPr lang="en-US" sz="1600" dirty="0" err="1" smtClean="0">
+                        <a:rPr lang="en-US" sz="1600" dirty="0" err="1">
                           <a:solidFill>
                             <a:srgbClr val="7030A0"/>
                           </a:solidFill>
@@ -4528,18 +4359,13 @@
                         <a:t>Finalize_plot</a:t>
                       </a:r>
                       <a:r>
-                        <a:rPr lang="en-US" sz="1600" dirty="0" smtClean="0">
+                        <a:rPr lang="en-US" sz="1600" dirty="0">
                           <a:solidFill>
                             <a:srgbClr val="7030A0"/>
                           </a:solidFill>
                         </a:rPr>
                         <a:t>()</a:t>
                       </a:r>
-                      <a:endParaRPr lang="en-US" sz="1600" dirty="0">
-                        <a:solidFill>
-                          <a:srgbClr val="7030A0"/>
-                        </a:solidFill>
-                      </a:endParaRPr>
                     </a:p>
                   </a:txBody>
                   <a:tcPr anchor="ctr">
@@ -4561,18 +4387,13 @@
                     <a:p>
                       <a:pPr algn="ctr"/>
                       <a:r>
-                        <a:rPr lang="en-US" sz="1600" dirty="0" smtClean="0">
+                        <a:rPr lang="en-US" sz="1600" dirty="0">
                           <a:solidFill>
                             <a:schemeClr val="accent6"/>
                           </a:solidFill>
                         </a:rPr>
                         <a:t>Either function</a:t>
                       </a:r>
-                      <a:endParaRPr lang="en-US" sz="1600" dirty="0">
-                        <a:solidFill>
-                          <a:schemeClr val="accent6"/>
-                        </a:solidFill>
-                      </a:endParaRPr>
                     </a:p>
                   </a:txBody>
                   <a:tcPr anchor="ctr">
@@ -4594,7 +4415,7 @@
                     <a:p>
                       <a:pPr algn="ctr"/>
                       <a:r>
-                        <a:rPr lang="en-US" sz="1600" dirty="0" err="1" smtClean="0">
+                        <a:rPr lang="en-US" sz="1600" dirty="0" err="1">
                           <a:solidFill>
                             <a:schemeClr val="accent4">
                               <a:lumMod val="75000"/>
@@ -4604,7 +4425,7 @@
                         <a:t>Theme_cmap</a:t>
                       </a:r>
                       <a:r>
-                        <a:rPr lang="en-US" sz="1600" dirty="0" smtClean="0">
+                        <a:rPr lang="en-US" sz="1600" dirty="0">
                           <a:solidFill>
                             <a:schemeClr val="accent4">
                               <a:lumMod val="75000"/>
@@ -4613,13 +4434,6 @@
                         </a:rPr>
                         <a:t>()</a:t>
                       </a:r>
-                      <a:endParaRPr lang="en-US" sz="1600" dirty="0">
-                        <a:solidFill>
-                          <a:schemeClr val="accent4">
-                            <a:lumMod val="75000"/>
-                          </a:schemeClr>
-                        </a:solidFill>
-                      </a:endParaRPr>
                     </a:p>
                   </a:txBody>
                   <a:tcPr anchor="ctr">
@@ -4657,10 +4471,9 @@
                     <a:p>
                       <a:pPr algn="r"/>
                       <a:r>
-                        <a:rPr lang="en-US" sz="1600" dirty="0" smtClean="0"/>
+                        <a:rPr lang="en-US" sz="1600" dirty="0"/>
                         <a:t>Units:</a:t>
                       </a:r>
-                      <a:endParaRPr lang="en-US" sz="1600" dirty="0"/>
                     </a:p>
                   </a:txBody>
                   <a:tcPr anchor="ctr">
@@ -4700,18 +4513,13 @@
                     <a:p>
                       <a:pPr algn="ctr"/>
                       <a:r>
-                        <a:rPr lang="en-US" sz="1600" dirty="0" smtClean="0">
+                        <a:rPr lang="en-US" sz="1600" dirty="0">
                           <a:solidFill>
                             <a:schemeClr val="accent1"/>
                           </a:solidFill>
                         </a:rPr>
                         <a:t>Inches</a:t>
                       </a:r>
-                      <a:endParaRPr lang="en-US" sz="1600" dirty="0">
-                        <a:solidFill>
-                          <a:schemeClr val="accent1"/>
-                        </a:solidFill>
-                      </a:endParaRPr>
                     </a:p>
                   </a:txBody>
                   <a:tcPr anchor="ctr">
@@ -4742,7 +4550,7 @@
                     <a:p>
                       <a:pPr algn="ctr"/>
                       <a:r>
-                        <a:rPr lang="en-US" sz="1600" dirty="0" err="1" smtClean="0">
+                        <a:rPr lang="en-US" sz="1600" dirty="0" err="1">
                           <a:solidFill>
                             <a:srgbClr val="7030A0"/>
                           </a:solidFill>
@@ -4784,7 +4592,7 @@
                     <a:p>
                       <a:pPr algn="ctr"/>
                       <a:r>
-                        <a:rPr lang="en-US" sz="1600" dirty="0" err="1" smtClean="0">
+                        <a:rPr lang="en-US" sz="1600" dirty="0" err="1">
                           <a:solidFill>
                             <a:schemeClr val="accent6"/>
                           </a:solidFill>
@@ -4826,7 +4634,7 @@
                     <a:p>
                       <a:pPr algn="ctr"/>
                       <a:r>
-                        <a:rPr lang="en-US" sz="1600" dirty="0" err="1" smtClean="0">
+                        <a:rPr lang="en-US" sz="1600" dirty="0" err="1">
                           <a:solidFill>
                             <a:schemeClr val="accent4">
                               <a:lumMod val="75000"/>
@@ -4884,6 +4692,128 @@
           </a:graphicData>
         </a:graphic>
       </p:graphicFrame>
+      <p:pic>
+        <p:nvPicPr>
+          <p:cNvPr id="13" name="Picture 12" descr="Chart, line chart&#10;&#10;Description automatically generated">
+            <a:extLst>
+              <a:ext uri="{FF2B5EF4-FFF2-40B4-BE49-F238E27FC236}">
+                <a16:creationId xmlns:a16="http://schemas.microsoft.com/office/drawing/2014/main" id="{8D780F8C-7987-4FEB-8FCD-CF48F06438A0}"/>
+              </a:ext>
+            </a:extLst>
+          </p:cNvPr>
+          <p:cNvPicPr>
+            <a:picLocks noChangeAspect="1"/>
+          </p:cNvPicPr>
+          <p:nvPr/>
+        </p:nvPicPr>
+        <p:blipFill>
+          <a:blip r:embed="rId2" cstate="print">
+            <a:extLst>
+              <a:ext uri="{28A0092B-C50C-407E-A947-70E740481C1C}">
+                <a14:useLocalDpi xmlns:a14="http://schemas.microsoft.com/office/drawing/2010/main" val="0"/>
+              </a:ext>
+            </a:extLst>
+          </a:blip>
+          <a:stretch>
+            <a:fillRect/>
+          </a:stretch>
+        </p:blipFill>
+        <p:spPr>
+          <a:xfrm>
+            <a:off x="2722421" y="686727"/>
+            <a:ext cx="8506985" cy="5077978"/>
+          </a:xfrm>
+          <a:prstGeom prst="rect">
+            <a:avLst/>
+          </a:prstGeom>
+        </p:spPr>
+      </p:pic>
+      <p:sp>
+        <p:nvSpPr>
+          <p:cNvPr id="40" name="TextBox 39">
+            <a:extLst>
+              <a:ext uri="{FF2B5EF4-FFF2-40B4-BE49-F238E27FC236}">
+                <a16:creationId xmlns:a16="http://schemas.microsoft.com/office/drawing/2014/main" id="{7BFCDB99-5A0E-40F1-BF44-59BF0D547CCE}"/>
+              </a:ext>
+            </a:extLst>
+          </p:cNvPr>
+          <p:cNvSpPr txBox="1"/>
+          <p:nvPr/>
+        </p:nvSpPr>
+        <p:spPr>
+          <a:xfrm>
+            <a:off x="11439545" y="694398"/>
+            <a:ext cx="2439425" cy="369332"/>
+          </a:xfrm>
+          <a:prstGeom prst="rect">
+            <a:avLst/>
+          </a:prstGeom>
+          <a:noFill/>
+        </p:spPr>
+        <p:txBody>
+          <a:bodyPr wrap="square">
+            <a:spAutoFit/>
+          </a:bodyPr>
+          <a:lstStyle/>
+          <a:p>
+            <a:r>
+              <a:rPr lang="en-US" dirty="0" err="1">
+                <a:solidFill>
+                  <a:schemeClr val="accent6"/>
+                </a:solidFill>
+              </a:rPr>
+              <a:t>margin_legend_i</a:t>
+            </a:r>
+            <a:r>
+              <a:rPr lang="en-US" dirty="0">
+                <a:solidFill>
+                  <a:schemeClr val="accent6"/>
+                </a:solidFill>
+              </a:rPr>
+              <a:t> </a:t>
+            </a:r>
+          </a:p>
+        </p:txBody>
+      </p:sp>
+      <p:sp>
+        <p:nvSpPr>
+          <p:cNvPr id="41" name="TextBox 40">
+            <a:extLst>
+              <a:ext uri="{FF2B5EF4-FFF2-40B4-BE49-F238E27FC236}">
+                <a16:creationId xmlns:a16="http://schemas.microsoft.com/office/drawing/2014/main" id="{0B81D785-3D60-4F43-9384-1CEFD9F3D464}"/>
+              </a:ext>
+            </a:extLst>
+          </p:cNvPr>
+          <p:cNvSpPr txBox="1"/>
+          <p:nvPr/>
+        </p:nvSpPr>
+        <p:spPr>
+          <a:xfrm>
+            <a:off x="11439545" y="1384192"/>
+            <a:ext cx="2006927" cy="646331"/>
+          </a:xfrm>
+          <a:prstGeom prst="rect">
+            <a:avLst/>
+          </a:prstGeom>
+          <a:noFill/>
+        </p:spPr>
+        <p:txBody>
+          <a:bodyPr wrap="square">
+            <a:spAutoFit/>
+          </a:bodyPr>
+          <a:lstStyle/>
+          <a:p>
+            <a:r>
+              <a:rPr lang="en-US" sz="1200" i="1" dirty="0">
+                <a:solidFill>
+                  <a:schemeClr val="accent6"/>
+                </a:solidFill>
+              </a:rPr>
+              <a:t>Note that “margin_legend_i” only applies when there are two or more legends.</a:t>
+            </a:r>
+          </a:p>
+        </p:txBody>
+      </p:sp>
     </p:spTree>
     <p:extLst>
       <p:ext uri="{BB962C8B-B14F-4D97-AF65-F5344CB8AC3E}">
@@ -4914,7 +4844,7 @@
         <a:srgbClr val="E7E6E6"/>
       </a:lt2>
       <a:accent1>
-        <a:srgbClr val="5B9BD5"/>
+        <a:srgbClr val="4472C4"/>
       </a:accent1>
       <a:accent2>
         <a:srgbClr val="ED7D31"/>
@@ -4926,7 +4856,7 @@
         <a:srgbClr val="FFC000"/>
       </a:accent4>
       <a:accent5>
-        <a:srgbClr val="4472C4"/>
+        <a:srgbClr val="5B9BD5"/>
       </a:accent5>
       <a:accent6>
         <a:srgbClr val="70AD47"/>

</xml_diff>

<commit_message>
Improve sizing of margin image
</commit_message>
<xml_diff>
--- a/man/figures/margins.pptx
+++ b/man/figures/margins.pptx
@@ -2,12 +2,12 @@
 <file path=ppt/presentation.xml><?xml version="1.0" encoding="utf-8"?>
 <p:presentation xmlns:a="http://schemas.openxmlformats.org/drawingml/2006/main" xmlns:r="http://schemas.openxmlformats.org/officeDocument/2006/relationships" xmlns:p="http://schemas.openxmlformats.org/presentationml/2006/main" saveSubsetFonts="1">
   <p:sldMasterIdLst>
-    <p:sldMasterId id="2147483672" r:id="rId1"/>
+    <p:sldMasterId id="2147483696" r:id="rId1"/>
   </p:sldMasterIdLst>
   <p:sldIdLst>
     <p:sldId id="256" r:id="rId2"/>
   </p:sldIdLst>
-  <p:sldSz cx="13716000" cy="8229600"/>
+  <p:sldSz cx="12801600" cy="7772400"/>
   <p:notesSz cx="6858000" cy="9144000"/>
   <p:defaultTextStyle>
     <a:defPPr>
@@ -141,15 +141,15 @@
         </p:nvSpPr>
         <p:spPr>
           <a:xfrm>
-            <a:off x="1714500" y="1346836"/>
-            <a:ext cx="10287000" cy="2865120"/>
+            <a:off x="1600200" y="1272011"/>
+            <a:ext cx="9601200" cy="2705947"/>
           </a:xfrm>
         </p:spPr>
         <p:txBody>
           <a:bodyPr anchor="b"/>
           <a:lstStyle>
             <a:lvl1pPr algn="ctr">
-              <a:defRPr sz="6750"/>
+              <a:defRPr sz="6300"/>
             </a:lvl1pPr>
           </a:lstStyle>
           <a:p>
@@ -173,8 +173,8 @@
         </p:nvSpPr>
         <p:spPr>
           <a:xfrm>
-            <a:off x="1714500" y="4322446"/>
-            <a:ext cx="10287000" cy="1986914"/>
+            <a:off x="1600200" y="4082310"/>
+            <a:ext cx="9601200" cy="1876530"/>
           </a:xfrm>
         </p:spPr>
         <p:txBody>
@@ -182,39 +182,39 @@
           <a:lstStyle>
             <a:lvl1pPr marL="0" indent="0" algn="ctr">
               <a:buNone/>
-              <a:defRPr sz="2700"/>
+              <a:defRPr sz="2520"/>
             </a:lvl1pPr>
-            <a:lvl2pPr marL="514350" indent="0" algn="ctr">
-              <a:buNone/>
-              <a:defRPr sz="2250"/>
+            <a:lvl2pPr marL="480060" indent="0" algn="ctr">
+              <a:buNone/>
+              <a:defRPr sz="2100"/>
             </a:lvl2pPr>
-            <a:lvl3pPr marL="1028700" indent="0" algn="ctr">
-              <a:buNone/>
-              <a:defRPr sz="2025"/>
+            <a:lvl3pPr marL="960120" indent="0" algn="ctr">
+              <a:buNone/>
+              <a:defRPr sz="1890"/>
             </a:lvl3pPr>
-            <a:lvl4pPr marL="1543050" indent="0" algn="ctr">
-              <a:buNone/>
-              <a:defRPr sz="1800"/>
+            <a:lvl4pPr marL="1440180" indent="0" algn="ctr">
+              <a:buNone/>
+              <a:defRPr sz="1680"/>
             </a:lvl4pPr>
-            <a:lvl5pPr marL="2057400" indent="0" algn="ctr">
-              <a:buNone/>
-              <a:defRPr sz="1800"/>
+            <a:lvl5pPr marL="1920240" indent="0" algn="ctr">
+              <a:buNone/>
+              <a:defRPr sz="1680"/>
             </a:lvl5pPr>
-            <a:lvl6pPr marL="2571750" indent="0" algn="ctr">
-              <a:buNone/>
-              <a:defRPr sz="1800"/>
+            <a:lvl6pPr marL="2400300" indent="0" algn="ctr">
+              <a:buNone/>
+              <a:defRPr sz="1680"/>
             </a:lvl6pPr>
-            <a:lvl7pPr marL="3086100" indent="0" algn="ctr">
-              <a:buNone/>
-              <a:defRPr sz="1800"/>
+            <a:lvl7pPr marL="2880360" indent="0" algn="ctr">
+              <a:buNone/>
+              <a:defRPr sz="1680"/>
             </a:lvl7pPr>
-            <a:lvl8pPr marL="3600450" indent="0" algn="ctr">
-              <a:buNone/>
-              <a:defRPr sz="1800"/>
+            <a:lvl8pPr marL="3360420" indent="0" algn="ctr">
+              <a:buNone/>
+              <a:defRPr sz="1680"/>
             </a:lvl8pPr>
-            <a:lvl9pPr marL="4114800" indent="0" algn="ctr">
-              <a:buNone/>
-              <a:defRPr sz="1800"/>
+            <a:lvl9pPr marL="3840480" indent="0" algn="ctr">
+              <a:buNone/>
+              <a:defRPr sz="1680"/>
             </a:lvl9pPr>
           </a:lstStyle>
           <a:p>
@@ -294,7 +294,7 @@
     </p:spTree>
     <p:extLst>
       <p:ext uri="{BB962C8B-B14F-4D97-AF65-F5344CB8AC3E}">
-        <p14:creationId xmlns:p14="http://schemas.microsoft.com/office/powerpoint/2010/main" val="212239826"/>
+        <p14:creationId xmlns:p14="http://schemas.microsoft.com/office/powerpoint/2010/main" val="2306861557"/>
       </p:ext>
     </p:extLst>
   </p:cSld>
@@ -464,7 +464,7 @@
     </p:spTree>
     <p:extLst>
       <p:ext uri="{BB962C8B-B14F-4D97-AF65-F5344CB8AC3E}">
-        <p14:creationId xmlns:p14="http://schemas.microsoft.com/office/powerpoint/2010/main" val="3032142942"/>
+        <p14:creationId xmlns:p14="http://schemas.microsoft.com/office/powerpoint/2010/main" val="3147954572"/>
       </p:ext>
     </p:extLst>
   </p:cSld>
@@ -503,8 +503,8 @@
         </p:nvSpPr>
         <p:spPr>
           <a:xfrm>
-            <a:off x="9815512" y="438150"/>
-            <a:ext cx="2957513" cy="6974206"/>
+            <a:off x="9161145" y="413808"/>
+            <a:ext cx="2760345" cy="6586750"/>
           </a:xfrm>
         </p:spPr>
         <p:txBody>
@@ -531,8 +531,8 @@
         </p:nvSpPr>
         <p:spPr>
           <a:xfrm>
-            <a:off x="942975" y="438150"/>
-            <a:ext cx="8701088" cy="6974206"/>
+            <a:off x="880110" y="413808"/>
+            <a:ext cx="8121015" cy="6586750"/>
           </a:xfrm>
         </p:spPr>
         <p:txBody>
@@ -644,7 +644,7 @@
     </p:spTree>
     <p:extLst>
       <p:ext uri="{BB962C8B-B14F-4D97-AF65-F5344CB8AC3E}">
-        <p14:creationId xmlns:p14="http://schemas.microsoft.com/office/powerpoint/2010/main" val="4006090179"/>
+        <p14:creationId xmlns:p14="http://schemas.microsoft.com/office/powerpoint/2010/main" val="181842520"/>
       </p:ext>
     </p:extLst>
   </p:cSld>
@@ -814,7 +814,7 @@
     </p:spTree>
     <p:extLst>
       <p:ext uri="{BB962C8B-B14F-4D97-AF65-F5344CB8AC3E}">
-        <p14:creationId xmlns:p14="http://schemas.microsoft.com/office/powerpoint/2010/main" val="3596436508"/>
+        <p14:creationId xmlns:p14="http://schemas.microsoft.com/office/powerpoint/2010/main" val="4240807495"/>
       </p:ext>
     </p:extLst>
   </p:cSld>
@@ -853,15 +853,15 @@
         </p:nvSpPr>
         <p:spPr>
           <a:xfrm>
-            <a:off x="935831" y="2051686"/>
-            <a:ext cx="11830050" cy="3423284"/>
+            <a:off x="873443" y="1937704"/>
+            <a:ext cx="11041380" cy="3233102"/>
           </a:xfrm>
         </p:spPr>
         <p:txBody>
           <a:bodyPr anchor="b"/>
           <a:lstStyle>
             <a:lvl1pPr>
-              <a:defRPr sz="6750"/>
+              <a:defRPr sz="6300"/>
             </a:lvl1pPr>
           </a:lstStyle>
           <a:p>
@@ -885,8 +885,8 @@
         </p:nvSpPr>
         <p:spPr>
           <a:xfrm>
-            <a:off x="935831" y="5507356"/>
-            <a:ext cx="11830050" cy="1800224"/>
+            <a:off x="873443" y="5201392"/>
+            <a:ext cx="11041380" cy="1700212"/>
           </a:xfrm>
         </p:spPr>
         <p:txBody>
@@ -894,7 +894,7 @@
           <a:lstStyle>
             <a:lvl1pPr marL="0" indent="0">
               <a:buNone/>
-              <a:defRPr sz="2700">
+              <a:defRPr sz="2520">
                 <a:solidFill>
                   <a:schemeClr val="tx1">
                     <a:tint val="75000"/>
@@ -902,9 +902,9 @@
                 </a:solidFill>
               </a:defRPr>
             </a:lvl1pPr>
-            <a:lvl2pPr marL="514350" indent="0">
-              <a:buNone/>
-              <a:defRPr sz="2250">
+            <a:lvl2pPr marL="480060" indent="0">
+              <a:buNone/>
+              <a:defRPr sz="2100">
                 <a:solidFill>
                   <a:schemeClr val="tx1">
                     <a:tint val="75000"/>
@@ -912,9 +912,9 @@
                 </a:solidFill>
               </a:defRPr>
             </a:lvl2pPr>
-            <a:lvl3pPr marL="1028700" indent="0">
-              <a:buNone/>
-              <a:defRPr sz="2025">
+            <a:lvl3pPr marL="960120" indent="0">
+              <a:buNone/>
+              <a:defRPr sz="1890">
                 <a:solidFill>
                   <a:schemeClr val="tx1">
                     <a:tint val="75000"/>
@@ -922,9 +922,9 @@
                 </a:solidFill>
               </a:defRPr>
             </a:lvl3pPr>
-            <a:lvl4pPr marL="1543050" indent="0">
-              <a:buNone/>
-              <a:defRPr sz="1800">
+            <a:lvl4pPr marL="1440180" indent="0">
+              <a:buNone/>
+              <a:defRPr sz="1680">
                 <a:solidFill>
                   <a:schemeClr val="tx1">
                     <a:tint val="75000"/>
@@ -932,9 +932,9 @@
                 </a:solidFill>
               </a:defRPr>
             </a:lvl4pPr>
-            <a:lvl5pPr marL="2057400" indent="0">
-              <a:buNone/>
-              <a:defRPr sz="1800">
+            <a:lvl5pPr marL="1920240" indent="0">
+              <a:buNone/>
+              <a:defRPr sz="1680">
                 <a:solidFill>
                   <a:schemeClr val="tx1">
                     <a:tint val="75000"/>
@@ -942,9 +942,9 @@
                 </a:solidFill>
               </a:defRPr>
             </a:lvl5pPr>
-            <a:lvl6pPr marL="2571750" indent="0">
-              <a:buNone/>
-              <a:defRPr sz="1800">
+            <a:lvl6pPr marL="2400300" indent="0">
+              <a:buNone/>
+              <a:defRPr sz="1680">
                 <a:solidFill>
                   <a:schemeClr val="tx1">
                     <a:tint val="75000"/>
@@ -952,9 +952,9 @@
                 </a:solidFill>
               </a:defRPr>
             </a:lvl6pPr>
-            <a:lvl7pPr marL="3086100" indent="0">
-              <a:buNone/>
-              <a:defRPr sz="1800">
+            <a:lvl7pPr marL="2880360" indent="0">
+              <a:buNone/>
+              <a:defRPr sz="1680">
                 <a:solidFill>
                   <a:schemeClr val="tx1">
                     <a:tint val="75000"/>
@@ -962,9 +962,9 @@
                 </a:solidFill>
               </a:defRPr>
             </a:lvl7pPr>
-            <a:lvl8pPr marL="3600450" indent="0">
-              <a:buNone/>
-              <a:defRPr sz="1800">
+            <a:lvl8pPr marL="3360420" indent="0">
+              <a:buNone/>
+              <a:defRPr sz="1680">
                 <a:solidFill>
                   <a:schemeClr val="tx1">
                     <a:tint val="75000"/>
@@ -972,9 +972,9 @@
                 </a:solidFill>
               </a:defRPr>
             </a:lvl8pPr>
-            <a:lvl9pPr marL="4114800" indent="0">
-              <a:buNone/>
-              <a:defRPr sz="1800">
+            <a:lvl9pPr marL="3840480" indent="0">
+              <a:buNone/>
+              <a:defRPr sz="1680">
                 <a:solidFill>
                   <a:schemeClr val="tx1">
                     <a:tint val="75000"/>
@@ -1060,7 +1060,7 @@
     </p:spTree>
     <p:extLst>
       <p:ext uri="{BB962C8B-B14F-4D97-AF65-F5344CB8AC3E}">
-        <p14:creationId xmlns:p14="http://schemas.microsoft.com/office/powerpoint/2010/main" val="3435563707"/>
+        <p14:creationId xmlns:p14="http://schemas.microsoft.com/office/powerpoint/2010/main" val="3991346338"/>
       </p:ext>
     </p:extLst>
   </p:cSld>
@@ -1122,8 +1122,8 @@
         </p:nvSpPr>
         <p:spPr>
           <a:xfrm>
-            <a:off x="942975" y="2190750"/>
-            <a:ext cx="5829300" cy="5221606"/>
+            <a:off x="880110" y="2069042"/>
+            <a:ext cx="5440680" cy="4931516"/>
           </a:xfrm>
         </p:spPr>
         <p:txBody>
@@ -1179,8 +1179,8 @@
         </p:nvSpPr>
         <p:spPr>
           <a:xfrm>
-            <a:off x="6943725" y="2190750"/>
-            <a:ext cx="5829300" cy="5221606"/>
+            <a:off x="6480810" y="2069042"/>
+            <a:ext cx="5440680" cy="4931516"/>
           </a:xfrm>
         </p:spPr>
         <p:txBody>
@@ -1292,7 +1292,7 @@
     </p:spTree>
     <p:extLst>
       <p:ext uri="{BB962C8B-B14F-4D97-AF65-F5344CB8AC3E}">
-        <p14:creationId xmlns:p14="http://schemas.microsoft.com/office/powerpoint/2010/main" val="2916673078"/>
+        <p14:creationId xmlns:p14="http://schemas.microsoft.com/office/powerpoint/2010/main" val="3997524317"/>
       </p:ext>
     </p:extLst>
   </p:cSld>
@@ -1331,8 +1331,8 @@
         </p:nvSpPr>
         <p:spPr>
           <a:xfrm>
-            <a:off x="944762" y="438150"/>
-            <a:ext cx="11830050" cy="1590676"/>
+            <a:off x="881777" y="413809"/>
+            <a:ext cx="11041380" cy="1502305"/>
           </a:xfrm>
         </p:spPr>
         <p:txBody>
@@ -1359,8 +1359,8 @@
         </p:nvSpPr>
         <p:spPr>
           <a:xfrm>
-            <a:off x="944762" y="2017396"/>
-            <a:ext cx="5802510" cy="988694"/>
+            <a:off x="881778" y="1905318"/>
+            <a:ext cx="5415676" cy="933767"/>
           </a:xfrm>
         </p:spPr>
         <p:txBody>
@@ -1368,39 +1368,39 @@
           <a:lstStyle>
             <a:lvl1pPr marL="0" indent="0">
               <a:buNone/>
-              <a:defRPr sz="2700" b="1"/>
+              <a:defRPr sz="2520" b="1"/>
             </a:lvl1pPr>
-            <a:lvl2pPr marL="514350" indent="0">
-              <a:buNone/>
-              <a:defRPr sz="2250" b="1"/>
+            <a:lvl2pPr marL="480060" indent="0">
+              <a:buNone/>
+              <a:defRPr sz="2100" b="1"/>
             </a:lvl2pPr>
-            <a:lvl3pPr marL="1028700" indent="0">
-              <a:buNone/>
-              <a:defRPr sz="2025" b="1"/>
+            <a:lvl3pPr marL="960120" indent="0">
+              <a:buNone/>
+              <a:defRPr sz="1890" b="1"/>
             </a:lvl3pPr>
-            <a:lvl4pPr marL="1543050" indent="0">
-              <a:buNone/>
-              <a:defRPr sz="1800" b="1"/>
+            <a:lvl4pPr marL="1440180" indent="0">
+              <a:buNone/>
+              <a:defRPr sz="1680" b="1"/>
             </a:lvl4pPr>
-            <a:lvl5pPr marL="2057400" indent="0">
-              <a:buNone/>
-              <a:defRPr sz="1800" b="1"/>
+            <a:lvl5pPr marL="1920240" indent="0">
+              <a:buNone/>
+              <a:defRPr sz="1680" b="1"/>
             </a:lvl5pPr>
-            <a:lvl6pPr marL="2571750" indent="0">
-              <a:buNone/>
-              <a:defRPr sz="1800" b="1"/>
+            <a:lvl6pPr marL="2400300" indent="0">
+              <a:buNone/>
+              <a:defRPr sz="1680" b="1"/>
             </a:lvl6pPr>
-            <a:lvl7pPr marL="3086100" indent="0">
-              <a:buNone/>
-              <a:defRPr sz="1800" b="1"/>
+            <a:lvl7pPr marL="2880360" indent="0">
+              <a:buNone/>
+              <a:defRPr sz="1680" b="1"/>
             </a:lvl7pPr>
-            <a:lvl8pPr marL="3600450" indent="0">
-              <a:buNone/>
-              <a:defRPr sz="1800" b="1"/>
+            <a:lvl8pPr marL="3360420" indent="0">
+              <a:buNone/>
+              <a:defRPr sz="1680" b="1"/>
             </a:lvl8pPr>
-            <a:lvl9pPr marL="4114800" indent="0">
-              <a:buNone/>
-              <a:defRPr sz="1800" b="1"/>
+            <a:lvl9pPr marL="3840480" indent="0">
+              <a:buNone/>
+              <a:defRPr sz="1680" b="1"/>
             </a:lvl9pPr>
           </a:lstStyle>
           <a:p>
@@ -1424,8 +1424,8 @@
         </p:nvSpPr>
         <p:spPr>
           <a:xfrm>
-            <a:off x="944762" y="3006090"/>
-            <a:ext cx="5802510" cy="4421506"/>
+            <a:off x="881778" y="2839085"/>
+            <a:ext cx="5415676" cy="4175866"/>
           </a:xfrm>
         </p:spPr>
         <p:txBody>
@@ -1481,8 +1481,8 @@
         </p:nvSpPr>
         <p:spPr>
           <a:xfrm>
-            <a:off x="6943725" y="2017396"/>
-            <a:ext cx="5831087" cy="988694"/>
+            <a:off x="6480810" y="1905318"/>
+            <a:ext cx="5442347" cy="933767"/>
           </a:xfrm>
         </p:spPr>
         <p:txBody>
@@ -1490,39 +1490,39 @@
           <a:lstStyle>
             <a:lvl1pPr marL="0" indent="0">
               <a:buNone/>
-              <a:defRPr sz="2700" b="1"/>
+              <a:defRPr sz="2520" b="1"/>
             </a:lvl1pPr>
-            <a:lvl2pPr marL="514350" indent="0">
-              <a:buNone/>
-              <a:defRPr sz="2250" b="1"/>
+            <a:lvl2pPr marL="480060" indent="0">
+              <a:buNone/>
+              <a:defRPr sz="2100" b="1"/>
             </a:lvl2pPr>
-            <a:lvl3pPr marL="1028700" indent="0">
-              <a:buNone/>
-              <a:defRPr sz="2025" b="1"/>
+            <a:lvl3pPr marL="960120" indent="0">
+              <a:buNone/>
+              <a:defRPr sz="1890" b="1"/>
             </a:lvl3pPr>
-            <a:lvl4pPr marL="1543050" indent="0">
-              <a:buNone/>
-              <a:defRPr sz="1800" b="1"/>
+            <a:lvl4pPr marL="1440180" indent="0">
+              <a:buNone/>
+              <a:defRPr sz="1680" b="1"/>
             </a:lvl4pPr>
-            <a:lvl5pPr marL="2057400" indent="0">
-              <a:buNone/>
-              <a:defRPr sz="1800" b="1"/>
+            <a:lvl5pPr marL="1920240" indent="0">
+              <a:buNone/>
+              <a:defRPr sz="1680" b="1"/>
             </a:lvl5pPr>
-            <a:lvl6pPr marL="2571750" indent="0">
-              <a:buNone/>
-              <a:defRPr sz="1800" b="1"/>
+            <a:lvl6pPr marL="2400300" indent="0">
+              <a:buNone/>
+              <a:defRPr sz="1680" b="1"/>
             </a:lvl6pPr>
-            <a:lvl7pPr marL="3086100" indent="0">
-              <a:buNone/>
-              <a:defRPr sz="1800" b="1"/>
+            <a:lvl7pPr marL="2880360" indent="0">
+              <a:buNone/>
+              <a:defRPr sz="1680" b="1"/>
             </a:lvl7pPr>
-            <a:lvl8pPr marL="3600450" indent="0">
-              <a:buNone/>
-              <a:defRPr sz="1800" b="1"/>
+            <a:lvl8pPr marL="3360420" indent="0">
+              <a:buNone/>
+              <a:defRPr sz="1680" b="1"/>
             </a:lvl8pPr>
-            <a:lvl9pPr marL="4114800" indent="0">
-              <a:buNone/>
-              <a:defRPr sz="1800" b="1"/>
+            <a:lvl9pPr marL="3840480" indent="0">
+              <a:buNone/>
+              <a:defRPr sz="1680" b="1"/>
             </a:lvl9pPr>
           </a:lstStyle>
           <a:p>
@@ -1546,8 +1546,8 @@
         </p:nvSpPr>
         <p:spPr>
           <a:xfrm>
-            <a:off x="6943725" y="3006090"/>
-            <a:ext cx="5831087" cy="4421506"/>
+            <a:off x="6480810" y="2839085"/>
+            <a:ext cx="5442347" cy="4175866"/>
           </a:xfrm>
         </p:spPr>
         <p:txBody>
@@ -1659,7 +1659,7 @@
     </p:spTree>
     <p:extLst>
       <p:ext uri="{BB962C8B-B14F-4D97-AF65-F5344CB8AC3E}">
-        <p14:creationId xmlns:p14="http://schemas.microsoft.com/office/powerpoint/2010/main" val="4042281779"/>
+        <p14:creationId xmlns:p14="http://schemas.microsoft.com/office/powerpoint/2010/main" val="763879628"/>
       </p:ext>
     </p:extLst>
   </p:cSld>
@@ -1777,7 +1777,7 @@
     </p:spTree>
     <p:extLst>
       <p:ext uri="{BB962C8B-B14F-4D97-AF65-F5344CB8AC3E}">
-        <p14:creationId xmlns:p14="http://schemas.microsoft.com/office/powerpoint/2010/main" val="3575874310"/>
+        <p14:creationId xmlns:p14="http://schemas.microsoft.com/office/powerpoint/2010/main" val="3932940750"/>
       </p:ext>
     </p:extLst>
   </p:cSld>
@@ -1872,7 +1872,7 @@
     </p:spTree>
     <p:extLst>
       <p:ext uri="{BB962C8B-B14F-4D97-AF65-F5344CB8AC3E}">
-        <p14:creationId xmlns:p14="http://schemas.microsoft.com/office/powerpoint/2010/main" val="2313095607"/>
+        <p14:creationId xmlns:p14="http://schemas.microsoft.com/office/powerpoint/2010/main" val="1373893158"/>
       </p:ext>
     </p:extLst>
   </p:cSld>
@@ -1911,15 +1911,15 @@
         </p:nvSpPr>
         <p:spPr>
           <a:xfrm>
-            <a:off x="944762" y="548640"/>
-            <a:ext cx="4423767" cy="1920240"/>
+            <a:off x="881778" y="518160"/>
+            <a:ext cx="4128849" cy="1813560"/>
           </a:xfrm>
         </p:spPr>
         <p:txBody>
           <a:bodyPr anchor="b"/>
           <a:lstStyle>
             <a:lvl1pPr>
-              <a:defRPr sz="3600"/>
+              <a:defRPr sz="3360"/>
             </a:lvl1pPr>
           </a:lstStyle>
           <a:p>
@@ -1943,39 +1943,39 @@
         </p:nvSpPr>
         <p:spPr>
           <a:xfrm>
-            <a:off x="5831087" y="1184911"/>
-            <a:ext cx="6943725" cy="5848350"/>
+            <a:off x="5442347" y="1119082"/>
+            <a:ext cx="6480810" cy="5523442"/>
           </a:xfrm>
         </p:spPr>
         <p:txBody>
           <a:bodyPr/>
           <a:lstStyle>
             <a:lvl1pPr>
-              <a:defRPr sz="3600"/>
+              <a:defRPr sz="3360"/>
             </a:lvl1pPr>
             <a:lvl2pPr>
-              <a:defRPr sz="3150"/>
+              <a:defRPr sz="2940"/>
             </a:lvl2pPr>
             <a:lvl3pPr>
-              <a:defRPr sz="2700"/>
+              <a:defRPr sz="2520"/>
             </a:lvl3pPr>
             <a:lvl4pPr>
-              <a:defRPr sz="2250"/>
+              <a:defRPr sz="2100"/>
             </a:lvl4pPr>
             <a:lvl5pPr>
-              <a:defRPr sz="2250"/>
+              <a:defRPr sz="2100"/>
             </a:lvl5pPr>
             <a:lvl6pPr>
-              <a:defRPr sz="2250"/>
+              <a:defRPr sz="2100"/>
             </a:lvl6pPr>
             <a:lvl7pPr>
-              <a:defRPr sz="2250"/>
+              <a:defRPr sz="2100"/>
             </a:lvl7pPr>
             <a:lvl8pPr>
-              <a:defRPr sz="2250"/>
+              <a:defRPr sz="2100"/>
             </a:lvl8pPr>
             <a:lvl9pPr>
-              <a:defRPr sz="2250"/>
+              <a:defRPr sz="2100"/>
             </a:lvl9pPr>
           </a:lstStyle>
           <a:p>
@@ -2028,8 +2028,8 @@
         </p:nvSpPr>
         <p:spPr>
           <a:xfrm>
-            <a:off x="944762" y="2468880"/>
-            <a:ext cx="4423767" cy="4573906"/>
+            <a:off x="881778" y="2331720"/>
+            <a:ext cx="4128849" cy="4319800"/>
           </a:xfrm>
         </p:spPr>
         <p:txBody>
@@ -2037,39 +2037,39 @@
           <a:lstStyle>
             <a:lvl1pPr marL="0" indent="0">
               <a:buNone/>
-              <a:defRPr sz="1800"/>
+              <a:defRPr sz="1680"/>
             </a:lvl1pPr>
-            <a:lvl2pPr marL="514350" indent="0">
-              <a:buNone/>
-              <a:defRPr sz="1575"/>
+            <a:lvl2pPr marL="480060" indent="0">
+              <a:buNone/>
+              <a:defRPr sz="1470"/>
             </a:lvl2pPr>
-            <a:lvl3pPr marL="1028700" indent="0">
-              <a:buNone/>
-              <a:defRPr sz="1350"/>
+            <a:lvl3pPr marL="960120" indent="0">
+              <a:buNone/>
+              <a:defRPr sz="1260"/>
             </a:lvl3pPr>
-            <a:lvl4pPr marL="1543050" indent="0">
-              <a:buNone/>
-              <a:defRPr sz="1125"/>
+            <a:lvl4pPr marL="1440180" indent="0">
+              <a:buNone/>
+              <a:defRPr sz="1050"/>
             </a:lvl4pPr>
-            <a:lvl5pPr marL="2057400" indent="0">
-              <a:buNone/>
-              <a:defRPr sz="1125"/>
+            <a:lvl5pPr marL="1920240" indent="0">
+              <a:buNone/>
+              <a:defRPr sz="1050"/>
             </a:lvl5pPr>
-            <a:lvl6pPr marL="2571750" indent="0">
-              <a:buNone/>
-              <a:defRPr sz="1125"/>
+            <a:lvl6pPr marL="2400300" indent="0">
+              <a:buNone/>
+              <a:defRPr sz="1050"/>
             </a:lvl6pPr>
-            <a:lvl7pPr marL="3086100" indent="0">
-              <a:buNone/>
-              <a:defRPr sz="1125"/>
+            <a:lvl7pPr marL="2880360" indent="0">
+              <a:buNone/>
+              <a:defRPr sz="1050"/>
             </a:lvl7pPr>
-            <a:lvl8pPr marL="3600450" indent="0">
-              <a:buNone/>
-              <a:defRPr sz="1125"/>
+            <a:lvl8pPr marL="3360420" indent="0">
+              <a:buNone/>
+              <a:defRPr sz="1050"/>
             </a:lvl8pPr>
-            <a:lvl9pPr marL="4114800" indent="0">
-              <a:buNone/>
-              <a:defRPr sz="1125"/>
+            <a:lvl9pPr marL="3840480" indent="0">
+              <a:buNone/>
+              <a:defRPr sz="1050"/>
             </a:lvl9pPr>
           </a:lstStyle>
           <a:p>
@@ -2149,7 +2149,7 @@
     </p:spTree>
     <p:extLst>
       <p:ext uri="{BB962C8B-B14F-4D97-AF65-F5344CB8AC3E}">
-        <p14:creationId xmlns:p14="http://schemas.microsoft.com/office/powerpoint/2010/main" val="4027396359"/>
+        <p14:creationId xmlns:p14="http://schemas.microsoft.com/office/powerpoint/2010/main" val="992986331"/>
       </p:ext>
     </p:extLst>
   </p:cSld>
@@ -2188,15 +2188,15 @@
         </p:nvSpPr>
         <p:spPr>
           <a:xfrm>
-            <a:off x="944762" y="548640"/>
-            <a:ext cx="4423767" cy="1920240"/>
+            <a:off x="881778" y="518160"/>
+            <a:ext cx="4128849" cy="1813560"/>
           </a:xfrm>
         </p:spPr>
         <p:txBody>
           <a:bodyPr anchor="b"/>
           <a:lstStyle>
             <a:lvl1pPr>
-              <a:defRPr sz="3600"/>
+              <a:defRPr sz="3360"/>
             </a:lvl1pPr>
           </a:lstStyle>
           <a:p>
@@ -2220,8 +2220,8 @@
         </p:nvSpPr>
         <p:spPr>
           <a:xfrm>
-            <a:off x="5831087" y="1184911"/>
-            <a:ext cx="6943725" cy="5848350"/>
+            <a:off x="5442347" y="1119082"/>
+            <a:ext cx="6480810" cy="5523442"/>
           </a:xfrm>
         </p:spPr>
         <p:txBody>
@@ -2229,39 +2229,39 @@
           <a:lstStyle>
             <a:lvl1pPr marL="0" indent="0">
               <a:buNone/>
-              <a:defRPr sz="3600"/>
+              <a:defRPr sz="3360"/>
             </a:lvl1pPr>
-            <a:lvl2pPr marL="514350" indent="0">
-              <a:buNone/>
-              <a:defRPr sz="3150"/>
+            <a:lvl2pPr marL="480060" indent="0">
+              <a:buNone/>
+              <a:defRPr sz="2940"/>
             </a:lvl2pPr>
-            <a:lvl3pPr marL="1028700" indent="0">
-              <a:buNone/>
-              <a:defRPr sz="2700"/>
+            <a:lvl3pPr marL="960120" indent="0">
+              <a:buNone/>
+              <a:defRPr sz="2520"/>
             </a:lvl3pPr>
-            <a:lvl4pPr marL="1543050" indent="0">
-              <a:buNone/>
-              <a:defRPr sz="2250"/>
+            <a:lvl4pPr marL="1440180" indent="0">
+              <a:buNone/>
+              <a:defRPr sz="2100"/>
             </a:lvl4pPr>
-            <a:lvl5pPr marL="2057400" indent="0">
-              <a:buNone/>
-              <a:defRPr sz="2250"/>
+            <a:lvl5pPr marL="1920240" indent="0">
+              <a:buNone/>
+              <a:defRPr sz="2100"/>
             </a:lvl5pPr>
-            <a:lvl6pPr marL="2571750" indent="0">
-              <a:buNone/>
-              <a:defRPr sz="2250"/>
+            <a:lvl6pPr marL="2400300" indent="0">
+              <a:buNone/>
+              <a:defRPr sz="2100"/>
             </a:lvl6pPr>
-            <a:lvl7pPr marL="3086100" indent="0">
-              <a:buNone/>
-              <a:defRPr sz="2250"/>
+            <a:lvl7pPr marL="2880360" indent="0">
+              <a:buNone/>
+              <a:defRPr sz="2100"/>
             </a:lvl7pPr>
-            <a:lvl8pPr marL="3600450" indent="0">
-              <a:buNone/>
-              <a:defRPr sz="2250"/>
+            <a:lvl8pPr marL="3360420" indent="0">
+              <a:buNone/>
+              <a:defRPr sz="2100"/>
             </a:lvl8pPr>
-            <a:lvl9pPr marL="4114800" indent="0">
-              <a:buNone/>
-              <a:defRPr sz="2250"/>
+            <a:lvl9pPr marL="3840480" indent="0">
+              <a:buNone/>
+              <a:defRPr sz="2100"/>
             </a:lvl9pPr>
           </a:lstStyle>
           <a:p>
@@ -2285,8 +2285,8 @@
         </p:nvSpPr>
         <p:spPr>
           <a:xfrm>
-            <a:off x="944762" y="2468880"/>
-            <a:ext cx="4423767" cy="4573906"/>
+            <a:off x="881778" y="2331720"/>
+            <a:ext cx="4128849" cy="4319800"/>
           </a:xfrm>
         </p:spPr>
         <p:txBody>
@@ -2294,39 +2294,39 @@
           <a:lstStyle>
             <a:lvl1pPr marL="0" indent="0">
               <a:buNone/>
-              <a:defRPr sz="1800"/>
+              <a:defRPr sz="1680"/>
             </a:lvl1pPr>
-            <a:lvl2pPr marL="514350" indent="0">
-              <a:buNone/>
-              <a:defRPr sz="1575"/>
+            <a:lvl2pPr marL="480060" indent="0">
+              <a:buNone/>
+              <a:defRPr sz="1470"/>
             </a:lvl2pPr>
-            <a:lvl3pPr marL="1028700" indent="0">
-              <a:buNone/>
-              <a:defRPr sz="1350"/>
+            <a:lvl3pPr marL="960120" indent="0">
+              <a:buNone/>
+              <a:defRPr sz="1260"/>
             </a:lvl3pPr>
-            <a:lvl4pPr marL="1543050" indent="0">
-              <a:buNone/>
-              <a:defRPr sz="1125"/>
+            <a:lvl4pPr marL="1440180" indent="0">
+              <a:buNone/>
+              <a:defRPr sz="1050"/>
             </a:lvl4pPr>
-            <a:lvl5pPr marL="2057400" indent="0">
-              <a:buNone/>
-              <a:defRPr sz="1125"/>
+            <a:lvl5pPr marL="1920240" indent="0">
+              <a:buNone/>
+              <a:defRPr sz="1050"/>
             </a:lvl5pPr>
-            <a:lvl6pPr marL="2571750" indent="0">
-              <a:buNone/>
-              <a:defRPr sz="1125"/>
+            <a:lvl6pPr marL="2400300" indent="0">
+              <a:buNone/>
+              <a:defRPr sz="1050"/>
             </a:lvl6pPr>
-            <a:lvl7pPr marL="3086100" indent="0">
-              <a:buNone/>
-              <a:defRPr sz="1125"/>
+            <a:lvl7pPr marL="2880360" indent="0">
+              <a:buNone/>
+              <a:defRPr sz="1050"/>
             </a:lvl7pPr>
-            <a:lvl8pPr marL="3600450" indent="0">
-              <a:buNone/>
-              <a:defRPr sz="1125"/>
+            <a:lvl8pPr marL="3360420" indent="0">
+              <a:buNone/>
+              <a:defRPr sz="1050"/>
             </a:lvl8pPr>
-            <a:lvl9pPr marL="4114800" indent="0">
-              <a:buNone/>
-              <a:defRPr sz="1125"/>
+            <a:lvl9pPr marL="3840480" indent="0">
+              <a:buNone/>
+              <a:defRPr sz="1050"/>
             </a:lvl9pPr>
           </a:lstStyle>
           <a:p>
@@ -2406,7 +2406,7 @@
     </p:spTree>
     <p:extLst>
       <p:ext uri="{BB962C8B-B14F-4D97-AF65-F5344CB8AC3E}">
-        <p14:creationId xmlns:p14="http://schemas.microsoft.com/office/powerpoint/2010/main" val="3347611232"/>
+        <p14:creationId xmlns:p14="http://schemas.microsoft.com/office/powerpoint/2010/main" val="3029636099"/>
       </p:ext>
     </p:extLst>
   </p:cSld>
@@ -2450,8 +2450,8 @@
         </p:nvSpPr>
         <p:spPr>
           <a:xfrm>
-            <a:off x="942975" y="438150"/>
-            <a:ext cx="11830050" cy="1590676"/>
+            <a:off x="880110" y="413809"/>
+            <a:ext cx="11041380" cy="1502305"/>
           </a:xfrm>
           <a:prstGeom prst="rect">
             <a:avLst/>
@@ -2483,8 +2483,8 @@
         </p:nvSpPr>
         <p:spPr>
           <a:xfrm>
-            <a:off x="942975" y="2190750"/>
-            <a:ext cx="11830050" cy="5221606"/>
+            <a:off x="880110" y="2069042"/>
+            <a:ext cx="11041380" cy="4931516"/>
           </a:xfrm>
           <a:prstGeom prst="rect">
             <a:avLst/>
@@ -2545,8 +2545,8 @@
         </p:nvSpPr>
         <p:spPr>
           <a:xfrm>
-            <a:off x="942975" y="7627621"/>
-            <a:ext cx="3086100" cy="438150"/>
+            <a:off x="880110" y="7203864"/>
+            <a:ext cx="2880360" cy="413808"/>
           </a:xfrm>
           <a:prstGeom prst="rect">
             <a:avLst/>
@@ -2556,7 +2556,7 @@
           <a:bodyPr vert="horz" lIns="91440" tIns="45720" rIns="91440" bIns="45720" rtlCol="0" anchor="ctr"/>
           <a:lstStyle>
             <a:lvl1pPr algn="l">
-              <a:defRPr sz="1350">
+              <a:defRPr sz="1260">
                 <a:solidFill>
                   <a:schemeClr val="tx1">
                     <a:tint val="75000"/>
@@ -2586,8 +2586,8 @@
         </p:nvSpPr>
         <p:spPr>
           <a:xfrm>
-            <a:off x="4543425" y="7627621"/>
-            <a:ext cx="4629150" cy="438150"/>
+            <a:off x="4240530" y="7203864"/>
+            <a:ext cx="4320540" cy="413808"/>
           </a:xfrm>
           <a:prstGeom prst="rect">
             <a:avLst/>
@@ -2597,7 +2597,7 @@
           <a:bodyPr vert="horz" lIns="91440" tIns="45720" rIns="91440" bIns="45720" rtlCol="0" anchor="ctr"/>
           <a:lstStyle>
             <a:lvl1pPr algn="ctr">
-              <a:defRPr sz="1350">
+              <a:defRPr sz="1260">
                 <a:solidFill>
                   <a:schemeClr val="tx1">
                     <a:tint val="75000"/>
@@ -2623,8 +2623,8 @@
         </p:nvSpPr>
         <p:spPr>
           <a:xfrm>
-            <a:off x="9686925" y="7627621"/>
-            <a:ext cx="3086100" cy="438150"/>
+            <a:off x="9041130" y="7203864"/>
+            <a:ext cx="2880360" cy="413808"/>
           </a:xfrm>
           <a:prstGeom prst="rect">
             <a:avLst/>
@@ -2634,7 +2634,7 @@
           <a:bodyPr vert="horz" lIns="91440" tIns="45720" rIns="91440" bIns="45720" rtlCol="0" anchor="ctr"/>
           <a:lstStyle>
             <a:lvl1pPr algn="r">
-              <a:defRPr sz="1350">
+              <a:defRPr sz="1260">
                 <a:solidFill>
                   <a:schemeClr val="tx1">
                     <a:tint val="75000"/>
@@ -2655,27 +2655,27 @@
     </p:spTree>
     <p:extLst>
       <p:ext uri="{BB962C8B-B14F-4D97-AF65-F5344CB8AC3E}">
-        <p14:creationId xmlns:p14="http://schemas.microsoft.com/office/powerpoint/2010/main" val="2631583119"/>
+        <p14:creationId xmlns:p14="http://schemas.microsoft.com/office/powerpoint/2010/main" val="3245437592"/>
       </p:ext>
     </p:extLst>
   </p:cSld>
   <p:clrMap bg1="lt1" tx1="dk1" bg2="lt2" tx2="dk2" accent1="accent1" accent2="accent2" accent3="accent3" accent4="accent4" accent5="accent5" accent6="accent6" hlink="hlink" folHlink="folHlink"/>
   <p:sldLayoutIdLst>
-    <p:sldLayoutId id="2147483673" r:id="rId1"/>
-    <p:sldLayoutId id="2147483674" r:id="rId2"/>
-    <p:sldLayoutId id="2147483675" r:id="rId3"/>
-    <p:sldLayoutId id="2147483676" r:id="rId4"/>
-    <p:sldLayoutId id="2147483677" r:id="rId5"/>
-    <p:sldLayoutId id="2147483678" r:id="rId6"/>
-    <p:sldLayoutId id="2147483679" r:id="rId7"/>
-    <p:sldLayoutId id="2147483680" r:id="rId8"/>
-    <p:sldLayoutId id="2147483681" r:id="rId9"/>
-    <p:sldLayoutId id="2147483682" r:id="rId10"/>
-    <p:sldLayoutId id="2147483683" r:id="rId11"/>
+    <p:sldLayoutId id="2147483697" r:id="rId1"/>
+    <p:sldLayoutId id="2147483698" r:id="rId2"/>
+    <p:sldLayoutId id="2147483699" r:id="rId3"/>
+    <p:sldLayoutId id="2147483700" r:id="rId4"/>
+    <p:sldLayoutId id="2147483701" r:id="rId5"/>
+    <p:sldLayoutId id="2147483702" r:id="rId6"/>
+    <p:sldLayoutId id="2147483703" r:id="rId7"/>
+    <p:sldLayoutId id="2147483704" r:id="rId8"/>
+    <p:sldLayoutId id="2147483705" r:id="rId9"/>
+    <p:sldLayoutId id="2147483706" r:id="rId10"/>
+    <p:sldLayoutId id="2147483707" r:id="rId11"/>
   </p:sldLayoutIdLst>
   <p:txStyles>
     <p:titleStyle>
-      <a:lvl1pPr algn="l" defTabSz="1028700" rtl="0" eaLnBrk="1" latinLnBrk="0" hangingPunct="1">
+      <a:lvl1pPr algn="l" defTabSz="960120" rtl="0" eaLnBrk="1" latinLnBrk="0" hangingPunct="1">
         <a:lnSpc>
           <a:spcPct val="90000"/>
         </a:lnSpc>
@@ -2683,7 +2683,7 @@
           <a:spcPct val="0"/>
         </a:spcBef>
         <a:buNone/>
-        <a:defRPr sz="4950" kern="1200">
+        <a:defRPr sz="4620" kern="1200">
           <a:solidFill>
             <a:schemeClr val="tx1"/>
           </a:solidFill>
@@ -2694,16 +2694,16 @@
       </a:lvl1pPr>
     </p:titleStyle>
     <p:bodyStyle>
-      <a:lvl1pPr marL="257175" indent="-257175" algn="l" defTabSz="1028700" rtl="0" eaLnBrk="1" latinLnBrk="0" hangingPunct="1">
+      <a:lvl1pPr marL="240030" indent="-240030" algn="l" defTabSz="960120" rtl="0" eaLnBrk="1" latinLnBrk="0" hangingPunct="1">
         <a:lnSpc>
           <a:spcPct val="90000"/>
         </a:lnSpc>
         <a:spcBef>
-          <a:spcPts val="1125"/>
+          <a:spcPts val="1050"/>
         </a:spcBef>
         <a:buFont typeface="Arial" panose="020B0604020202020204" pitchFamily="34" charset="0"/>
         <a:buChar char="•"/>
-        <a:defRPr sz="3150" kern="1200">
+        <a:defRPr sz="2940" kern="1200">
           <a:solidFill>
             <a:schemeClr val="tx1"/>
           </a:solidFill>
@@ -2712,16 +2712,16 @@
           <a:cs typeface="+mn-cs"/>
         </a:defRPr>
       </a:lvl1pPr>
-      <a:lvl2pPr marL="771525" indent="-257175" algn="l" defTabSz="1028700" rtl="0" eaLnBrk="1" latinLnBrk="0" hangingPunct="1">
+      <a:lvl2pPr marL="720090" indent="-240030" algn="l" defTabSz="960120" rtl="0" eaLnBrk="1" latinLnBrk="0" hangingPunct="1">
         <a:lnSpc>
           <a:spcPct val="90000"/>
         </a:lnSpc>
         <a:spcBef>
-          <a:spcPts val="563"/>
+          <a:spcPts val="525"/>
         </a:spcBef>
         <a:buFont typeface="Arial" panose="020B0604020202020204" pitchFamily="34" charset="0"/>
         <a:buChar char="•"/>
-        <a:defRPr sz="2700" kern="1200">
+        <a:defRPr sz="2520" kern="1200">
           <a:solidFill>
             <a:schemeClr val="tx1"/>
           </a:solidFill>
@@ -2730,16 +2730,16 @@
           <a:cs typeface="+mn-cs"/>
         </a:defRPr>
       </a:lvl2pPr>
-      <a:lvl3pPr marL="1285875" indent="-257175" algn="l" defTabSz="1028700" rtl="0" eaLnBrk="1" latinLnBrk="0" hangingPunct="1">
+      <a:lvl3pPr marL="1200150" indent="-240030" algn="l" defTabSz="960120" rtl="0" eaLnBrk="1" latinLnBrk="0" hangingPunct="1">
         <a:lnSpc>
           <a:spcPct val="90000"/>
         </a:lnSpc>
         <a:spcBef>
-          <a:spcPts val="563"/>
+          <a:spcPts val="525"/>
         </a:spcBef>
         <a:buFont typeface="Arial" panose="020B0604020202020204" pitchFamily="34" charset="0"/>
         <a:buChar char="•"/>
-        <a:defRPr sz="2250" kern="1200">
+        <a:defRPr sz="2100" kern="1200">
           <a:solidFill>
             <a:schemeClr val="tx1"/>
           </a:solidFill>
@@ -2748,16 +2748,16 @@
           <a:cs typeface="+mn-cs"/>
         </a:defRPr>
       </a:lvl3pPr>
-      <a:lvl4pPr marL="1800225" indent="-257175" algn="l" defTabSz="1028700" rtl="0" eaLnBrk="1" latinLnBrk="0" hangingPunct="1">
+      <a:lvl4pPr marL="1680210" indent="-240030" algn="l" defTabSz="960120" rtl="0" eaLnBrk="1" latinLnBrk="0" hangingPunct="1">
         <a:lnSpc>
           <a:spcPct val="90000"/>
         </a:lnSpc>
         <a:spcBef>
-          <a:spcPts val="563"/>
+          <a:spcPts val="525"/>
         </a:spcBef>
         <a:buFont typeface="Arial" panose="020B0604020202020204" pitchFamily="34" charset="0"/>
         <a:buChar char="•"/>
-        <a:defRPr sz="2025" kern="1200">
+        <a:defRPr sz="1890" kern="1200">
           <a:solidFill>
             <a:schemeClr val="tx1"/>
           </a:solidFill>
@@ -2766,16 +2766,16 @@
           <a:cs typeface="+mn-cs"/>
         </a:defRPr>
       </a:lvl4pPr>
-      <a:lvl5pPr marL="2314575" indent="-257175" algn="l" defTabSz="1028700" rtl="0" eaLnBrk="1" latinLnBrk="0" hangingPunct="1">
+      <a:lvl5pPr marL="2160270" indent="-240030" algn="l" defTabSz="960120" rtl="0" eaLnBrk="1" latinLnBrk="0" hangingPunct="1">
         <a:lnSpc>
           <a:spcPct val="90000"/>
         </a:lnSpc>
         <a:spcBef>
-          <a:spcPts val="563"/>
+          <a:spcPts val="525"/>
         </a:spcBef>
         <a:buFont typeface="Arial" panose="020B0604020202020204" pitchFamily="34" charset="0"/>
         <a:buChar char="•"/>
-        <a:defRPr sz="2025" kern="1200">
+        <a:defRPr sz="1890" kern="1200">
           <a:solidFill>
             <a:schemeClr val="tx1"/>
           </a:solidFill>
@@ -2784,16 +2784,16 @@
           <a:cs typeface="+mn-cs"/>
         </a:defRPr>
       </a:lvl5pPr>
-      <a:lvl6pPr marL="2828925" indent="-257175" algn="l" defTabSz="1028700" rtl="0" eaLnBrk="1" latinLnBrk="0" hangingPunct="1">
+      <a:lvl6pPr marL="2640330" indent="-240030" algn="l" defTabSz="960120" rtl="0" eaLnBrk="1" latinLnBrk="0" hangingPunct="1">
         <a:lnSpc>
           <a:spcPct val="90000"/>
         </a:lnSpc>
         <a:spcBef>
-          <a:spcPts val="563"/>
+          <a:spcPts val="525"/>
         </a:spcBef>
         <a:buFont typeface="Arial" panose="020B0604020202020204" pitchFamily="34" charset="0"/>
         <a:buChar char="•"/>
-        <a:defRPr sz="2025" kern="1200">
+        <a:defRPr sz="1890" kern="1200">
           <a:solidFill>
             <a:schemeClr val="tx1"/>
           </a:solidFill>
@@ -2802,16 +2802,16 @@
           <a:cs typeface="+mn-cs"/>
         </a:defRPr>
       </a:lvl6pPr>
-      <a:lvl7pPr marL="3343275" indent="-257175" algn="l" defTabSz="1028700" rtl="0" eaLnBrk="1" latinLnBrk="0" hangingPunct="1">
+      <a:lvl7pPr marL="3120390" indent="-240030" algn="l" defTabSz="960120" rtl="0" eaLnBrk="1" latinLnBrk="0" hangingPunct="1">
         <a:lnSpc>
           <a:spcPct val="90000"/>
         </a:lnSpc>
         <a:spcBef>
-          <a:spcPts val="563"/>
+          <a:spcPts val="525"/>
         </a:spcBef>
         <a:buFont typeface="Arial" panose="020B0604020202020204" pitchFamily="34" charset="0"/>
         <a:buChar char="•"/>
-        <a:defRPr sz="2025" kern="1200">
+        <a:defRPr sz="1890" kern="1200">
           <a:solidFill>
             <a:schemeClr val="tx1"/>
           </a:solidFill>
@@ -2820,16 +2820,16 @@
           <a:cs typeface="+mn-cs"/>
         </a:defRPr>
       </a:lvl7pPr>
-      <a:lvl8pPr marL="3857625" indent="-257175" algn="l" defTabSz="1028700" rtl="0" eaLnBrk="1" latinLnBrk="0" hangingPunct="1">
+      <a:lvl8pPr marL="3600450" indent="-240030" algn="l" defTabSz="960120" rtl="0" eaLnBrk="1" latinLnBrk="0" hangingPunct="1">
         <a:lnSpc>
           <a:spcPct val="90000"/>
         </a:lnSpc>
         <a:spcBef>
-          <a:spcPts val="563"/>
+          <a:spcPts val="525"/>
         </a:spcBef>
         <a:buFont typeface="Arial" panose="020B0604020202020204" pitchFamily="34" charset="0"/>
         <a:buChar char="•"/>
-        <a:defRPr sz="2025" kern="1200">
+        <a:defRPr sz="1890" kern="1200">
           <a:solidFill>
             <a:schemeClr val="tx1"/>
           </a:solidFill>
@@ -2838,16 +2838,16 @@
           <a:cs typeface="+mn-cs"/>
         </a:defRPr>
       </a:lvl8pPr>
-      <a:lvl9pPr marL="4371975" indent="-257175" algn="l" defTabSz="1028700" rtl="0" eaLnBrk="1" latinLnBrk="0" hangingPunct="1">
+      <a:lvl9pPr marL="4080510" indent="-240030" algn="l" defTabSz="960120" rtl="0" eaLnBrk="1" latinLnBrk="0" hangingPunct="1">
         <a:lnSpc>
           <a:spcPct val="90000"/>
         </a:lnSpc>
         <a:spcBef>
-          <a:spcPts val="563"/>
+          <a:spcPts val="525"/>
         </a:spcBef>
         <a:buFont typeface="Arial" panose="020B0604020202020204" pitchFamily="34" charset="0"/>
         <a:buChar char="•"/>
-        <a:defRPr sz="2025" kern="1200">
+        <a:defRPr sz="1890" kern="1200">
           <a:solidFill>
             <a:schemeClr val="tx1"/>
           </a:solidFill>
@@ -2861,8 +2861,8 @@
       <a:defPPr>
         <a:defRPr lang="en-US"/>
       </a:defPPr>
-      <a:lvl1pPr marL="0" algn="l" defTabSz="1028700" rtl="0" eaLnBrk="1" latinLnBrk="0" hangingPunct="1">
-        <a:defRPr sz="2025" kern="1200">
+      <a:lvl1pPr marL="0" algn="l" defTabSz="960120" rtl="0" eaLnBrk="1" latinLnBrk="0" hangingPunct="1">
+        <a:defRPr sz="1890" kern="1200">
           <a:solidFill>
             <a:schemeClr val="tx1"/>
           </a:solidFill>
@@ -2871,8 +2871,8 @@
           <a:cs typeface="+mn-cs"/>
         </a:defRPr>
       </a:lvl1pPr>
-      <a:lvl2pPr marL="514350" algn="l" defTabSz="1028700" rtl="0" eaLnBrk="1" latinLnBrk="0" hangingPunct="1">
-        <a:defRPr sz="2025" kern="1200">
+      <a:lvl2pPr marL="480060" algn="l" defTabSz="960120" rtl="0" eaLnBrk="1" latinLnBrk="0" hangingPunct="1">
+        <a:defRPr sz="1890" kern="1200">
           <a:solidFill>
             <a:schemeClr val="tx1"/>
           </a:solidFill>
@@ -2881,8 +2881,8 @@
           <a:cs typeface="+mn-cs"/>
         </a:defRPr>
       </a:lvl2pPr>
-      <a:lvl3pPr marL="1028700" algn="l" defTabSz="1028700" rtl="0" eaLnBrk="1" latinLnBrk="0" hangingPunct="1">
-        <a:defRPr sz="2025" kern="1200">
+      <a:lvl3pPr marL="960120" algn="l" defTabSz="960120" rtl="0" eaLnBrk="1" latinLnBrk="0" hangingPunct="1">
+        <a:defRPr sz="1890" kern="1200">
           <a:solidFill>
             <a:schemeClr val="tx1"/>
           </a:solidFill>
@@ -2891,8 +2891,8 @@
           <a:cs typeface="+mn-cs"/>
         </a:defRPr>
       </a:lvl3pPr>
-      <a:lvl4pPr marL="1543050" algn="l" defTabSz="1028700" rtl="0" eaLnBrk="1" latinLnBrk="0" hangingPunct="1">
-        <a:defRPr sz="2025" kern="1200">
+      <a:lvl4pPr marL="1440180" algn="l" defTabSz="960120" rtl="0" eaLnBrk="1" latinLnBrk="0" hangingPunct="1">
+        <a:defRPr sz="1890" kern="1200">
           <a:solidFill>
             <a:schemeClr val="tx1"/>
           </a:solidFill>
@@ -2901,8 +2901,8 @@
           <a:cs typeface="+mn-cs"/>
         </a:defRPr>
       </a:lvl4pPr>
-      <a:lvl5pPr marL="2057400" algn="l" defTabSz="1028700" rtl="0" eaLnBrk="1" latinLnBrk="0" hangingPunct="1">
-        <a:defRPr sz="2025" kern="1200">
+      <a:lvl5pPr marL="1920240" algn="l" defTabSz="960120" rtl="0" eaLnBrk="1" latinLnBrk="0" hangingPunct="1">
+        <a:defRPr sz="1890" kern="1200">
           <a:solidFill>
             <a:schemeClr val="tx1"/>
           </a:solidFill>
@@ -2911,8 +2911,8 @@
           <a:cs typeface="+mn-cs"/>
         </a:defRPr>
       </a:lvl5pPr>
-      <a:lvl6pPr marL="2571750" algn="l" defTabSz="1028700" rtl="0" eaLnBrk="1" latinLnBrk="0" hangingPunct="1">
-        <a:defRPr sz="2025" kern="1200">
+      <a:lvl6pPr marL="2400300" algn="l" defTabSz="960120" rtl="0" eaLnBrk="1" latinLnBrk="0" hangingPunct="1">
+        <a:defRPr sz="1890" kern="1200">
           <a:solidFill>
             <a:schemeClr val="tx1"/>
           </a:solidFill>
@@ -2921,8 +2921,8 @@
           <a:cs typeface="+mn-cs"/>
         </a:defRPr>
       </a:lvl6pPr>
-      <a:lvl7pPr marL="3086100" algn="l" defTabSz="1028700" rtl="0" eaLnBrk="1" latinLnBrk="0" hangingPunct="1">
-        <a:defRPr sz="2025" kern="1200">
+      <a:lvl7pPr marL="2880360" algn="l" defTabSz="960120" rtl="0" eaLnBrk="1" latinLnBrk="0" hangingPunct="1">
+        <a:defRPr sz="1890" kern="1200">
           <a:solidFill>
             <a:schemeClr val="tx1"/>
           </a:solidFill>
@@ -2931,8 +2931,8 @@
           <a:cs typeface="+mn-cs"/>
         </a:defRPr>
       </a:lvl7pPr>
-      <a:lvl8pPr marL="3600450" algn="l" defTabSz="1028700" rtl="0" eaLnBrk="1" latinLnBrk="0" hangingPunct="1">
-        <a:defRPr sz="2025" kern="1200">
+      <a:lvl8pPr marL="3360420" algn="l" defTabSz="960120" rtl="0" eaLnBrk="1" latinLnBrk="0" hangingPunct="1">
+        <a:defRPr sz="1890" kern="1200">
           <a:solidFill>
             <a:schemeClr val="tx1"/>
           </a:solidFill>
@@ -2941,8 +2941,8 @@
           <a:cs typeface="+mn-cs"/>
         </a:defRPr>
       </a:lvl8pPr>
-      <a:lvl9pPr marL="4114800" algn="l" defTabSz="1028700" rtl="0" eaLnBrk="1" latinLnBrk="0" hangingPunct="1">
-        <a:defRPr sz="2025" kern="1200">
+      <a:lvl9pPr marL="3840480" algn="l" defTabSz="960120" rtl="0" eaLnBrk="1" latinLnBrk="0" hangingPunct="1">
+        <a:defRPr sz="1890" kern="1200">
           <a:solidFill>
             <a:schemeClr val="tx1"/>
           </a:solidFill>
@@ -2989,8 +2989,8 @@
         </p:nvSpPr>
         <p:spPr>
           <a:xfrm>
-            <a:off x="2931208" y="107341"/>
-            <a:ext cx="1950720" cy="369332"/>
+            <a:off x="2372409" y="0"/>
+            <a:ext cx="1950720" cy="369460"/>
           </a:xfrm>
           <a:prstGeom prst="rect">
             <a:avLst/>
@@ -3005,14 +3005,14 @@
           <a:p>
             <a:pPr algn="ctr"/>
             <a:r>
-              <a:rPr lang="en-US" dirty="0" err="1">
+              <a:rPr lang="en-US" sz="1801" dirty="0" err="1">
                 <a:solidFill>
                   <a:schemeClr val="accent1"/>
                 </a:solidFill>
               </a:rPr>
               <a:t>title_width</a:t>
             </a:r>
-            <a:endParaRPr lang="en-US" dirty="0">
+            <a:endParaRPr lang="en-US" sz="1801" dirty="0">
               <a:solidFill>
                 <a:schemeClr val="accent1"/>
               </a:solidFill>
@@ -3028,7 +3028,7 @@
         </p:nvSpPr>
         <p:spPr>
           <a:xfrm rot="5400000">
-            <a:off x="6906325" y="-3631910"/>
+            <a:off x="6347525" y="-3739251"/>
             <a:ext cx="125152" cy="8484148"/>
           </a:xfrm>
           <a:prstGeom prst="leftBrace">
@@ -3058,7 +3058,7 @@
           <a:lstStyle/>
           <a:p>
             <a:pPr algn="ctr"/>
-            <a:endParaRPr lang="en-US"/>
+            <a:endParaRPr lang="en-US" sz="1801"/>
           </a:p>
         </p:txBody>
       </p:sp>
@@ -3070,8 +3070,8 @@
         </p:nvSpPr>
         <p:spPr>
           <a:xfrm>
-            <a:off x="6458836" y="191323"/>
-            <a:ext cx="1020130" cy="369332"/>
+            <a:off x="5900036" y="83984"/>
+            <a:ext cx="1020130" cy="369460"/>
           </a:xfrm>
           <a:prstGeom prst="rect">
             <a:avLst/>
@@ -3086,7 +3086,7 @@
           <a:p>
             <a:pPr algn="ctr"/>
             <a:r>
-              <a:rPr lang="en-US" dirty="0">
+              <a:rPr lang="en-US" sz="1801" dirty="0">
                 <a:solidFill>
                   <a:schemeClr val="accent1"/>
                 </a:solidFill>
@@ -3104,7 +3104,7 @@
         </p:nvSpPr>
         <p:spPr>
           <a:xfrm>
-            <a:off x="2585643" y="716915"/>
+            <a:off x="2026846" y="609575"/>
             <a:ext cx="107024" cy="5047790"/>
           </a:xfrm>
           <a:prstGeom prst="leftBrace">
@@ -3134,7 +3134,7 @@
           <a:lstStyle/>
           <a:p>
             <a:pPr algn="ctr"/>
-            <a:endParaRPr lang="en-US"/>
+            <a:endParaRPr lang="en-US" sz="1801"/>
           </a:p>
         </p:txBody>
       </p:sp>
@@ -3146,8 +3146,8 @@
         </p:nvSpPr>
         <p:spPr>
           <a:xfrm>
-            <a:off x="1706697" y="3056144"/>
-            <a:ext cx="1020130" cy="369332"/>
+            <a:off x="1147897" y="2948805"/>
+            <a:ext cx="1020130" cy="369460"/>
           </a:xfrm>
           <a:prstGeom prst="rect">
             <a:avLst/>
@@ -3161,7 +3161,7 @@
           <a:lstStyle/>
           <a:p>
             <a:r>
-              <a:rPr lang="en-US" dirty="0">
+              <a:rPr lang="en-US" sz="1801" dirty="0">
                 <a:solidFill>
                   <a:schemeClr val="accent1"/>
                 </a:solidFill>
@@ -3179,8 +3179,8 @@
         </p:nvSpPr>
         <p:spPr>
           <a:xfrm rot="10800000">
-            <a:off x="11249565" y="879066"/>
-            <a:ext cx="112084" cy="59055"/>
+            <a:off x="10690766" y="771727"/>
+            <a:ext cx="112084" cy="59056"/>
           </a:xfrm>
           <a:prstGeom prst="leftBrace">
             <a:avLst>
@@ -3213,7 +3213,7 @@
           <a:lstStyle/>
           <a:p>
             <a:pPr algn="ctr"/>
-            <a:endParaRPr lang="en-US"/>
+            <a:endParaRPr lang="en-US" sz="1801"/>
           </a:p>
         </p:txBody>
       </p:sp>
@@ -3225,8 +3225,8 @@
         </p:nvSpPr>
         <p:spPr>
           <a:xfrm rot="10800000">
-            <a:off x="11254098" y="771207"/>
-            <a:ext cx="112084" cy="59055"/>
+            <a:off x="10695298" y="663868"/>
+            <a:ext cx="112084" cy="59056"/>
           </a:xfrm>
           <a:prstGeom prst="leftBrace">
             <a:avLst>
@@ -3259,7 +3259,7 @@
           <a:lstStyle/>
           <a:p>
             <a:pPr algn="ctr"/>
-            <a:endParaRPr lang="en-US"/>
+            <a:endParaRPr lang="en-US" sz="1801"/>
           </a:p>
         </p:txBody>
       </p:sp>
@@ -3271,8 +3271,8 @@
         </p:nvSpPr>
         <p:spPr>
           <a:xfrm>
-            <a:off x="11421115" y="467446"/>
-            <a:ext cx="2025359" cy="369332"/>
+            <a:off x="10862320" y="360107"/>
+            <a:ext cx="2025359" cy="369460"/>
           </a:xfrm>
           <a:prstGeom prst="rect">
             <a:avLst/>
@@ -3286,14 +3286,14 @@
           <a:lstStyle/>
           <a:p>
             <a:r>
-              <a:rPr lang="en-US" dirty="0" err="1">
+              <a:rPr lang="en-US" sz="1801" dirty="0" err="1">
                 <a:solidFill>
                   <a:srgbClr val="7030A0"/>
                 </a:solidFill>
               </a:rPr>
               <a:t>margin_legend_t</a:t>
             </a:r>
-            <a:endParaRPr lang="en-US" dirty="0">
+            <a:endParaRPr lang="en-US" sz="1801" dirty="0">
               <a:solidFill>
                 <a:srgbClr val="7030A0"/>
               </a:solidFill>
@@ -3309,8 +3309,8 @@
         </p:nvSpPr>
         <p:spPr>
           <a:xfrm rot="10800000">
-            <a:off x="11259158" y="1000589"/>
-            <a:ext cx="112084" cy="123817"/>
+            <a:off x="10700360" y="893249"/>
+            <a:ext cx="112084" cy="123818"/>
           </a:xfrm>
           <a:prstGeom prst="leftBrace">
             <a:avLst>
@@ -3343,7 +3343,7 @@
           <a:lstStyle/>
           <a:p>
             <a:pPr algn="ctr"/>
-            <a:endParaRPr lang="en-US"/>
+            <a:endParaRPr lang="en-US" sz="1801"/>
           </a:p>
         </p:txBody>
       </p:sp>
@@ -3355,8 +3355,8 @@
         </p:nvSpPr>
         <p:spPr>
           <a:xfrm>
-            <a:off x="11421114" y="921350"/>
-            <a:ext cx="2025359" cy="369332"/>
+            <a:off x="10862318" y="814012"/>
+            <a:ext cx="2025359" cy="369460"/>
           </a:xfrm>
           <a:prstGeom prst="rect">
             <a:avLst/>
@@ -3370,14 +3370,14 @@
           <a:lstStyle/>
           <a:p>
             <a:r>
-              <a:rPr lang="en-US" dirty="0" err="1">
+              <a:rPr lang="en-US" sz="1801" dirty="0" err="1">
                 <a:solidFill>
                   <a:schemeClr val="accent6"/>
                 </a:solidFill>
               </a:rPr>
               <a:t>margin_legend_b</a:t>
             </a:r>
-            <a:endParaRPr lang="en-US" dirty="0">
+            <a:endParaRPr lang="en-US" sz="1801" dirty="0">
               <a:solidFill>
                 <a:schemeClr val="accent6"/>
               </a:solidFill>
@@ -3393,8 +3393,8 @@
         </p:nvSpPr>
         <p:spPr>
           <a:xfrm rot="10800000">
-            <a:off x="11236101" y="5687770"/>
-            <a:ext cx="112084" cy="59055"/>
+            <a:off x="10677301" y="5580430"/>
+            <a:ext cx="112084" cy="59056"/>
           </a:xfrm>
           <a:prstGeom prst="leftBrace">
             <a:avLst>
@@ -3427,7 +3427,7 @@
           <a:lstStyle/>
           <a:p>
             <a:pPr algn="ctr"/>
-            <a:endParaRPr lang="en-US"/>
+            <a:endParaRPr lang="en-US" sz="1801"/>
           </a:p>
         </p:txBody>
       </p:sp>
@@ -3439,8 +3439,8 @@
         </p:nvSpPr>
         <p:spPr>
           <a:xfrm>
-            <a:off x="11421113" y="5503102"/>
-            <a:ext cx="2025359" cy="369332"/>
+            <a:off x="10862317" y="5395763"/>
+            <a:ext cx="2025359" cy="369460"/>
           </a:xfrm>
           <a:prstGeom prst="rect">
             <a:avLst/>
@@ -3454,14 +3454,14 @@
           <a:lstStyle/>
           <a:p>
             <a:r>
-              <a:rPr lang="en-US" dirty="0" err="1">
+              <a:rPr lang="en-US" sz="1801" dirty="0" err="1">
                 <a:solidFill>
                   <a:srgbClr val="7030A0"/>
                 </a:solidFill>
               </a:rPr>
               <a:t>margin_plot_b</a:t>
             </a:r>
-            <a:endParaRPr lang="en-US" dirty="0">
+            <a:endParaRPr lang="en-US" sz="1801" dirty="0">
               <a:solidFill>
                 <a:srgbClr val="7030A0"/>
               </a:solidFill>
@@ -3477,8 +3477,8 @@
         </p:nvSpPr>
         <p:spPr>
           <a:xfrm rot="10800000" flipH="1">
-            <a:off x="2500501" y="712151"/>
-            <a:ext cx="112084" cy="59055"/>
+            <a:off x="1941701" y="604812"/>
+            <a:ext cx="112084" cy="59056"/>
           </a:xfrm>
           <a:prstGeom prst="leftBrace">
             <a:avLst>
@@ -3511,7 +3511,7 @@
           <a:lstStyle/>
           <a:p>
             <a:pPr algn="ctr"/>
-            <a:endParaRPr lang="en-US"/>
+            <a:endParaRPr lang="en-US" sz="1801"/>
           </a:p>
         </p:txBody>
       </p:sp>
@@ -3523,8 +3523,8 @@
         </p:nvSpPr>
         <p:spPr>
           <a:xfrm rot="10800000" flipH="1">
-            <a:off x="2500501" y="774972"/>
-            <a:ext cx="112084" cy="59055"/>
+            <a:off x="1941701" y="667633"/>
+            <a:ext cx="112084" cy="59056"/>
           </a:xfrm>
           <a:prstGeom prst="leftBrace">
             <a:avLst>
@@ -3557,7 +3557,7 @@
           <a:lstStyle/>
           <a:p>
             <a:pPr algn="ctr"/>
-            <a:endParaRPr lang="en-US"/>
+            <a:endParaRPr lang="en-US" sz="1801"/>
           </a:p>
         </p:txBody>
       </p:sp>
@@ -3569,8 +3569,8 @@
         </p:nvSpPr>
         <p:spPr>
           <a:xfrm rot="10800000" flipH="1">
-            <a:off x="2498252" y="1437911"/>
-            <a:ext cx="112084" cy="59055"/>
+            <a:off x="1939454" y="1330572"/>
+            <a:ext cx="112084" cy="59056"/>
           </a:xfrm>
           <a:prstGeom prst="leftBrace">
             <a:avLst>
@@ -3603,7 +3603,7 @@
           <a:lstStyle/>
           <a:p>
             <a:pPr algn="ctr"/>
-            <a:endParaRPr lang="en-US"/>
+            <a:endParaRPr lang="en-US" sz="1801"/>
           </a:p>
         </p:txBody>
       </p:sp>
@@ -3615,8 +3615,8 @@
         </p:nvSpPr>
         <p:spPr>
           <a:xfrm rot="10800000" flipH="1">
-            <a:off x="2473559" y="5699715"/>
-            <a:ext cx="112084" cy="59055"/>
+            <a:off x="1914760" y="5592375"/>
+            <a:ext cx="112084" cy="59056"/>
           </a:xfrm>
           <a:prstGeom prst="leftBrace">
             <a:avLst>
@@ -3649,7 +3649,7 @@
           <a:lstStyle/>
           <a:p>
             <a:pPr algn="ctr"/>
-            <a:endParaRPr lang="en-US"/>
+            <a:endParaRPr lang="en-US" sz="1801"/>
           </a:p>
         </p:txBody>
       </p:sp>
@@ -3661,8 +3661,8 @@
         </p:nvSpPr>
         <p:spPr>
           <a:xfrm rot="5400000" flipH="1">
-            <a:off x="2700312" y="5855179"/>
-            <a:ext cx="112084" cy="59055"/>
+            <a:off x="2141513" y="5747839"/>
+            <a:ext cx="112084" cy="59056"/>
           </a:xfrm>
           <a:prstGeom prst="leftBrace">
             <a:avLst>
@@ -3695,7 +3695,7 @@
           <a:lstStyle/>
           <a:p>
             <a:pPr algn="ctr"/>
-            <a:endParaRPr lang="en-US"/>
+            <a:endParaRPr lang="en-US" sz="1801"/>
           </a:p>
         </p:txBody>
       </p:sp>
@@ -3707,7 +3707,7 @@
         </p:nvSpPr>
         <p:spPr>
           <a:xfrm rot="5400000" flipH="1">
-            <a:off x="4733559" y="5823201"/>
+            <a:off x="4174760" y="5715866"/>
             <a:ext cx="112084" cy="123009"/>
           </a:xfrm>
           <a:prstGeom prst="leftBrace">
@@ -3741,7 +3741,7 @@
           <a:lstStyle/>
           <a:p>
             <a:pPr algn="ctr"/>
-            <a:endParaRPr lang="en-US"/>
+            <a:endParaRPr lang="en-US" sz="1801"/>
           </a:p>
         </p:txBody>
       </p:sp>
@@ -3753,7 +3753,7 @@
         </p:nvSpPr>
         <p:spPr>
           <a:xfrm rot="5400000" flipH="1">
-            <a:off x="11106749" y="5811396"/>
+            <a:off x="10547950" y="5704056"/>
             <a:ext cx="112084" cy="146620"/>
           </a:xfrm>
           <a:prstGeom prst="leftBrace">
@@ -3787,7 +3787,7 @@
           <a:lstStyle/>
           <a:p>
             <a:pPr algn="ctr"/>
-            <a:endParaRPr lang="en-US"/>
+            <a:endParaRPr lang="en-US" sz="1801"/>
           </a:p>
         </p:txBody>
       </p:sp>
@@ -3799,8 +3799,8 @@
         </p:nvSpPr>
         <p:spPr>
           <a:xfrm>
-            <a:off x="447678" y="416802"/>
-            <a:ext cx="2025359" cy="646331"/>
+            <a:off x="-111119" y="309462"/>
+            <a:ext cx="2025359" cy="646587"/>
           </a:xfrm>
           <a:prstGeom prst="rect">
             <a:avLst/>
@@ -3815,14 +3815,14 @@
           <a:p>
             <a:pPr algn="r"/>
             <a:r>
-              <a:rPr lang="en-US" dirty="0" err="1">
+              <a:rPr lang="en-US" sz="1801" dirty="0" err="1">
                 <a:solidFill>
                   <a:srgbClr val="7030A0"/>
                 </a:solidFill>
               </a:rPr>
               <a:t>margin_topline_t</a:t>
             </a:r>
-            <a:endParaRPr lang="en-US" dirty="0">
+            <a:endParaRPr lang="en-US" sz="1801" dirty="0">
               <a:solidFill>
                 <a:srgbClr val="7030A0"/>
               </a:solidFill>
@@ -3831,14 +3831,14 @@
           <a:p>
             <a:pPr algn="r"/>
             <a:r>
-              <a:rPr lang="en-US" dirty="0" err="1">
+              <a:rPr lang="en-US" sz="1801" dirty="0" err="1">
                 <a:solidFill>
                   <a:srgbClr val="7030A0"/>
                 </a:solidFill>
               </a:rPr>
               <a:t>margin_title_t</a:t>
             </a:r>
-            <a:endParaRPr lang="en-US" dirty="0">
+            <a:endParaRPr lang="en-US" sz="1801" dirty="0">
               <a:solidFill>
                 <a:srgbClr val="7030A0"/>
               </a:solidFill>
@@ -3854,8 +3854,8 @@
         </p:nvSpPr>
         <p:spPr>
           <a:xfrm>
-            <a:off x="447678" y="1282772"/>
-            <a:ext cx="2025359" cy="369332"/>
+            <a:off x="-111119" y="1175433"/>
+            <a:ext cx="2025359" cy="369460"/>
           </a:xfrm>
           <a:prstGeom prst="rect">
             <a:avLst/>
@@ -3870,14 +3870,14 @@
           <a:p>
             <a:pPr algn="r"/>
             <a:r>
-              <a:rPr lang="en-US" dirty="0" err="1">
+              <a:rPr lang="en-US" sz="1801" dirty="0" err="1">
                 <a:solidFill>
                   <a:srgbClr val="7030A0"/>
                 </a:solidFill>
               </a:rPr>
               <a:t>margin_title_b</a:t>
             </a:r>
-            <a:endParaRPr lang="en-US" dirty="0">
+            <a:endParaRPr lang="en-US" sz="1801" dirty="0">
               <a:solidFill>
                 <a:srgbClr val="7030A0"/>
               </a:solidFill>
@@ -3893,8 +3893,8 @@
         </p:nvSpPr>
         <p:spPr>
           <a:xfrm>
-            <a:off x="419101" y="5535597"/>
-            <a:ext cx="2025359" cy="369332"/>
+            <a:off x="-139696" y="5428257"/>
+            <a:ext cx="2025359" cy="369460"/>
           </a:xfrm>
           <a:prstGeom prst="rect">
             <a:avLst/>
@@ -3909,14 +3909,14 @@
           <a:p>
             <a:pPr algn="r"/>
             <a:r>
-              <a:rPr lang="en-US" dirty="0" err="1">
+              <a:rPr lang="en-US" sz="1801" dirty="0" err="1">
                 <a:solidFill>
                   <a:srgbClr val="7030A0"/>
                 </a:solidFill>
               </a:rPr>
               <a:t>margin_caption_b</a:t>
             </a:r>
-            <a:endParaRPr lang="en-US" dirty="0">
+            <a:endParaRPr lang="en-US" sz="1801" dirty="0">
               <a:solidFill>
                 <a:srgbClr val="7030A0"/>
               </a:solidFill>
@@ -3932,8 +3932,8 @@
         </p:nvSpPr>
         <p:spPr>
           <a:xfrm>
-            <a:off x="1958296" y="5983261"/>
-            <a:ext cx="10608008" cy="369332"/>
+            <a:off x="1399496" y="5875921"/>
+            <a:ext cx="10608008" cy="369460"/>
           </a:xfrm>
           <a:prstGeom prst="rect">
             <a:avLst/>
@@ -3947,7 +3947,7 @@
           <a:lstStyle/>
           <a:p>
             <a:r>
-              <a:rPr lang="en-US" dirty="0" err="1">
+              <a:rPr lang="en-US" sz="1801" dirty="0" err="1">
                 <a:solidFill>
                   <a:srgbClr val="7030A0"/>
                 </a:solidFill>
@@ -3955,7 +3955,7 @@
               <a:t>margin_title_l</a:t>
             </a:r>
             <a:r>
-              <a:rPr lang="en-US" dirty="0">
+              <a:rPr lang="en-US" sz="1801" dirty="0">
                 <a:solidFill>
                   <a:srgbClr val="7030A0"/>
                 </a:solidFill>
@@ -3963,7 +3963,7 @@
               <a:t>              </a:t>
             </a:r>
             <a:r>
-              <a:rPr lang="en-US" dirty="0" err="1">
+              <a:rPr lang="en-US" sz="1801" dirty="0" err="1">
                 <a:solidFill>
                   <a:srgbClr val="7030A0"/>
                 </a:solidFill>
@@ -3971,7 +3971,7 @@
               <a:t>margin_title_r</a:t>
             </a:r>
             <a:r>
-              <a:rPr lang="en-US" dirty="0">
+              <a:rPr lang="en-US" sz="1801" dirty="0">
                 <a:solidFill>
                   <a:srgbClr val="7030A0"/>
                 </a:solidFill>
@@ -3979,7 +3979,7 @@
               <a:t>                                                                               </a:t>
             </a:r>
             <a:r>
-              <a:rPr lang="en-US" dirty="0" err="1">
+              <a:rPr lang="en-US" sz="1801" dirty="0" err="1">
                 <a:solidFill>
                   <a:schemeClr val="accent4">
                     <a:lumMod val="75000"/>
@@ -3989,7 +3989,7 @@
               <a:t>margin_panel_r</a:t>
             </a:r>
             <a:r>
-              <a:rPr lang="en-US" dirty="0">
+              <a:rPr lang="en-US" sz="1801" dirty="0">
                 <a:solidFill>
                   <a:srgbClr val="7030A0"/>
                 </a:solidFill>
@@ -3997,14 +3997,14 @@
               <a:t>  </a:t>
             </a:r>
             <a:r>
-              <a:rPr lang="en-US" dirty="0" err="1">
+              <a:rPr lang="en-US" sz="1801" dirty="0" err="1">
                 <a:solidFill>
                   <a:srgbClr val="7030A0"/>
                 </a:solidFill>
               </a:rPr>
               <a:t>margin_plot_r</a:t>
             </a:r>
-            <a:endParaRPr lang="en-US" dirty="0">
+            <a:endParaRPr lang="en-US" sz="1801" dirty="0">
               <a:solidFill>
                 <a:srgbClr val="7030A0"/>
               </a:solidFill>
@@ -4020,7 +4020,7 @@
         </p:nvSpPr>
         <p:spPr>
           <a:xfrm rot="5400000">
-            <a:off x="3850526" y="-647025"/>
+            <a:off x="3291726" y="-754366"/>
             <a:ext cx="112084" cy="2359481"/>
           </a:xfrm>
           <a:prstGeom prst="leftBrace">
@@ -4050,7 +4050,7 @@
           <a:lstStyle/>
           <a:p>
             <a:pPr algn="ctr"/>
-            <a:endParaRPr lang="en-US"/>
+            <a:endParaRPr lang="en-US" sz="1801"/>
           </a:p>
         </p:txBody>
       </p:sp>
@@ -4062,7 +4062,7 @@
         </p:nvSpPr>
         <p:spPr>
           <a:xfrm rot="5400000" flipH="1">
-            <a:off x="10968972" y="5829785"/>
+            <a:off x="10410173" y="5722444"/>
             <a:ext cx="112084" cy="109836"/>
           </a:xfrm>
           <a:prstGeom prst="leftBrace">
@@ -4098,7 +4098,7 @@
           <a:lstStyle/>
           <a:p>
             <a:pPr algn="ctr"/>
-            <a:endParaRPr lang="en-US"/>
+            <a:endParaRPr lang="en-US" sz="1801"/>
           </a:p>
         </p:txBody>
       </p:sp>
@@ -4111,14 +4111,14 @@
           <p:nvPr>
             <p:extLst>
               <p:ext uri="{D42A27DB-BD31-4B8C-83A1-F6EECF244321}">
-                <p14:modId xmlns:p14="http://schemas.microsoft.com/office/powerpoint/2010/main" val="523522582"/>
+                <p14:modId xmlns:p14="http://schemas.microsoft.com/office/powerpoint/2010/main" val="3818371632"/>
               </p:ext>
             </p:extLst>
           </p:nvPr>
         </p:nvGraphicFramePr>
         <p:xfrm>
-          <a:off x="2169161" y="6630769"/>
-          <a:ext cx="9599480" cy="1005840"/>
+          <a:off x="1610361" y="6523431"/>
+          <a:ext cx="9599480" cy="1005843"/>
         </p:xfrm>
         <a:graphic>
           <a:graphicData uri="http://schemas.openxmlformats.org/drawingml/2006/table">
@@ -4163,7 +4163,7 @@
                   </a:extLst>
                 </a:gridCol>
               </a:tblGrid>
-              <a:tr h="292688">
+              <a:tr h="335281">
                 <a:tc gridSpan="5">
                   <a:txBody>
                     <a:bodyPr/>
@@ -4274,7 +4274,7 @@
                   </a:ext>
                 </a:extLst>
               </a:tr>
-              <a:tr h="292688">
+              <a:tr h="335281">
                 <a:tc>
                   <a:txBody>
                     <a:bodyPr/>
@@ -4463,7 +4463,7 @@
                   </a:ext>
                 </a:extLst>
               </a:tr>
-              <a:tr h="292688">
+              <a:tr h="335281">
                 <a:tc>
                   <a:txBody>
                     <a:bodyPr/>
@@ -4720,7 +4720,7 @@
         </p:blipFill>
         <p:spPr>
           <a:xfrm>
-            <a:off x="2722421" y="686727"/>
+            <a:off x="2163624" y="579386"/>
             <a:ext cx="8506985" cy="5077978"/>
           </a:xfrm>
           <a:prstGeom prst="rect">
@@ -4742,8 +4742,8 @@
         </p:nvSpPr>
         <p:spPr>
           <a:xfrm>
-            <a:off x="11439545" y="694398"/>
-            <a:ext cx="2439425" cy="369332"/>
+            <a:off x="10880749" y="587059"/>
+            <a:ext cx="2439425" cy="369460"/>
           </a:xfrm>
           <a:prstGeom prst="rect">
             <a:avLst/>
@@ -4757,7 +4757,7 @@
           <a:lstStyle/>
           <a:p>
             <a:r>
-              <a:rPr lang="en-US" dirty="0" err="1">
+              <a:rPr lang="en-US" sz="1801" dirty="0" err="1">
                 <a:solidFill>
                   <a:schemeClr val="accent6"/>
                 </a:solidFill>
@@ -4765,7 +4765,7 @@
               <a:t>margin_legend_i</a:t>
             </a:r>
             <a:r>
-              <a:rPr lang="en-US" dirty="0">
+              <a:rPr lang="en-US" sz="1801" dirty="0">
                 <a:solidFill>
                   <a:schemeClr val="accent6"/>
                 </a:solidFill>
@@ -4789,8 +4789,8 @@
         </p:nvSpPr>
         <p:spPr>
           <a:xfrm>
-            <a:off x="11439545" y="1384192"/>
-            <a:ext cx="2006927" cy="646331"/>
+            <a:off x="10880749" y="1276856"/>
+            <a:ext cx="1897151" cy="1323439"/>
           </a:xfrm>
           <a:prstGeom prst="rect">
             <a:avLst/>
@@ -4804,7 +4804,7 @@
           <a:lstStyle/>
           <a:p>
             <a:r>
-              <a:rPr lang="en-US" sz="1200" i="1" dirty="0">
+              <a:rPr lang="en-US" sz="1600" i="1" dirty="0">
                 <a:solidFill>
                   <a:schemeClr val="accent6"/>
                 </a:solidFill>

</xml_diff>

<commit_message>
clarified margins legend, added note to plots vignette
</commit_message>
<xml_diff>
--- a/man/figures/margins.pptx
+++ b/man/figures/margins.pptx
@@ -2,12 +2,12 @@
 <file path=ppt/presentation.xml><?xml version="1.0" encoding="utf-8"?>
 <p:presentation xmlns:a="http://schemas.openxmlformats.org/drawingml/2006/main" xmlns:r="http://schemas.openxmlformats.org/officeDocument/2006/relationships" xmlns:p="http://schemas.openxmlformats.org/presentationml/2006/main" saveSubsetFonts="1">
   <p:sldMasterIdLst>
-    <p:sldMasterId id="2147483696" r:id="rId1"/>
+    <p:sldMasterId id="2147483708" r:id="rId1"/>
   </p:sldMasterIdLst>
   <p:sldIdLst>
     <p:sldId id="256" r:id="rId2"/>
   </p:sldIdLst>
-  <p:sldSz cx="12801600" cy="7772400"/>
+  <p:sldSz cx="12801600" cy="8229600"/>
   <p:notesSz cx="6858000" cy="9144000"/>
   <p:defaultTextStyle>
     <a:defPPr>
@@ -141,8 +141,8 @@
         </p:nvSpPr>
         <p:spPr>
           <a:xfrm>
-            <a:off x="1600200" y="1272011"/>
-            <a:ext cx="9601200" cy="2705947"/>
+            <a:off x="1600200" y="1346836"/>
+            <a:ext cx="9601200" cy="2865120"/>
           </a:xfrm>
         </p:spPr>
         <p:txBody>
@@ -154,7 +154,7 @@
           </a:lstStyle>
           <a:p>
             <a:r>
-              <a:rPr lang="en-US"/>
+              <a:rPr lang="en-US" smtClean="0"/>
               <a:t>Click to edit Master title style</a:t>
             </a:r>
             <a:endParaRPr lang="en-US" dirty="0"/>
@@ -173,8 +173,8 @@
         </p:nvSpPr>
         <p:spPr>
           <a:xfrm>
-            <a:off x="1600200" y="4082310"/>
-            <a:ext cx="9601200" cy="1876530"/>
+            <a:off x="1600200" y="4322446"/>
+            <a:ext cx="9601200" cy="1986914"/>
           </a:xfrm>
         </p:spPr>
         <p:txBody>
@@ -219,7 +219,7 @@
           </a:lstStyle>
           <a:p>
             <a:r>
-              <a:rPr lang="en-US"/>
+              <a:rPr lang="en-US" smtClean="0"/>
               <a:t>Click to edit Master subtitle style</a:t>
             </a:r>
             <a:endParaRPr lang="en-US" dirty="0"/>
@@ -294,7 +294,7 @@
     </p:spTree>
     <p:extLst>
       <p:ext uri="{BB962C8B-B14F-4D97-AF65-F5344CB8AC3E}">
-        <p14:creationId xmlns:p14="http://schemas.microsoft.com/office/powerpoint/2010/main" val="2306861557"/>
+        <p14:creationId xmlns:p14="http://schemas.microsoft.com/office/powerpoint/2010/main" val="1985004792"/>
       </p:ext>
     </p:extLst>
   </p:cSld>
@@ -337,7 +337,7 @@
           <a:lstStyle/>
           <a:p>
             <a:r>
-              <a:rPr lang="en-US"/>
+              <a:rPr lang="en-US" smtClean="0"/>
               <a:t>Click to edit Master title style</a:t>
             </a:r>
             <a:endParaRPr lang="en-US" dirty="0"/>
@@ -361,35 +361,35 @@
           <a:p>
             <a:pPr lvl="0"/>
             <a:r>
-              <a:rPr lang="en-US"/>
-              <a:t>Click to edit Master text styles</a:t>
+              <a:rPr lang="en-US" smtClean="0"/>
+              <a:t>Edit Master text styles</a:t>
             </a:r>
           </a:p>
           <a:p>
             <a:pPr lvl="1"/>
             <a:r>
-              <a:rPr lang="en-US"/>
+              <a:rPr lang="en-US" smtClean="0"/>
               <a:t>Second level</a:t>
             </a:r>
           </a:p>
           <a:p>
             <a:pPr lvl="2"/>
             <a:r>
-              <a:rPr lang="en-US"/>
+              <a:rPr lang="en-US" smtClean="0"/>
               <a:t>Third level</a:t>
             </a:r>
           </a:p>
           <a:p>
             <a:pPr lvl="3"/>
             <a:r>
-              <a:rPr lang="en-US"/>
+              <a:rPr lang="en-US" smtClean="0"/>
               <a:t>Fourth level</a:t>
             </a:r>
           </a:p>
           <a:p>
             <a:pPr lvl="4"/>
             <a:r>
-              <a:rPr lang="en-US"/>
+              <a:rPr lang="en-US" smtClean="0"/>
               <a:t>Fifth level</a:t>
             </a:r>
             <a:endParaRPr lang="en-US" dirty="0"/>
@@ -464,7 +464,7 @@
     </p:spTree>
     <p:extLst>
       <p:ext uri="{BB962C8B-B14F-4D97-AF65-F5344CB8AC3E}">
-        <p14:creationId xmlns:p14="http://schemas.microsoft.com/office/powerpoint/2010/main" val="3147954572"/>
+        <p14:creationId xmlns:p14="http://schemas.microsoft.com/office/powerpoint/2010/main" val="580237941"/>
       </p:ext>
     </p:extLst>
   </p:cSld>
@@ -503,8 +503,8 @@
         </p:nvSpPr>
         <p:spPr>
           <a:xfrm>
-            <a:off x="9161145" y="413808"/>
-            <a:ext cx="2760345" cy="6586750"/>
+            <a:off x="9161145" y="438150"/>
+            <a:ext cx="2760345" cy="6974206"/>
           </a:xfrm>
         </p:spPr>
         <p:txBody>
@@ -512,7 +512,7 @@
           <a:lstStyle/>
           <a:p>
             <a:r>
-              <a:rPr lang="en-US"/>
+              <a:rPr lang="en-US" smtClean="0"/>
               <a:t>Click to edit Master title style</a:t>
             </a:r>
             <a:endParaRPr lang="en-US" dirty="0"/>
@@ -531,8 +531,8 @@
         </p:nvSpPr>
         <p:spPr>
           <a:xfrm>
-            <a:off x="880110" y="413808"/>
-            <a:ext cx="8121015" cy="6586750"/>
+            <a:off x="880110" y="438150"/>
+            <a:ext cx="8121015" cy="6974206"/>
           </a:xfrm>
         </p:spPr>
         <p:txBody>
@@ -541,35 +541,35 @@
           <a:p>
             <a:pPr lvl="0"/>
             <a:r>
-              <a:rPr lang="en-US"/>
-              <a:t>Click to edit Master text styles</a:t>
+              <a:rPr lang="en-US" smtClean="0"/>
+              <a:t>Edit Master text styles</a:t>
             </a:r>
           </a:p>
           <a:p>
             <a:pPr lvl="1"/>
             <a:r>
-              <a:rPr lang="en-US"/>
+              <a:rPr lang="en-US" smtClean="0"/>
               <a:t>Second level</a:t>
             </a:r>
           </a:p>
           <a:p>
             <a:pPr lvl="2"/>
             <a:r>
-              <a:rPr lang="en-US"/>
+              <a:rPr lang="en-US" smtClean="0"/>
               <a:t>Third level</a:t>
             </a:r>
           </a:p>
           <a:p>
             <a:pPr lvl="3"/>
             <a:r>
-              <a:rPr lang="en-US"/>
+              <a:rPr lang="en-US" smtClean="0"/>
               <a:t>Fourth level</a:t>
             </a:r>
           </a:p>
           <a:p>
             <a:pPr lvl="4"/>
             <a:r>
-              <a:rPr lang="en-US"/>
+              <a:rPr lang="en-US" smtClean="0"/>
               <a:t>Fifth level</a:t>
             </a:r>
             <a:endParaRPr lang="en-US" dirty="0"/>
@@ -644,7 +644,7 @@
     </p:spTree>
     <p:extLst>
       <p:ext uri="{BB962C8B-B14F-4D97-AF65-F5344CB8AC3E}">
-        <p14:creationId xmlns:p14="http://schemas.microsoft.com/office/powerpoint/2010/main" val="181842520"/>
+        <p14:creationId xmlns:p14="http://schemas.microsoft.com/office/powerpoint/2010/main" val="130794805"/>
       </p:ext>
     </p:extLst>
   </p:cSld>
@@ -687,7 +687,7 @@
           <a:lstStyle/>
           <a:p>
             <a:r>
-              <a:rPr lang="en-US"/>
+              <a:rPr lang="en-US" smtClean="0"/>
               <a:t>Click to edit Master title style</a:t>
             </a:r>
             <a:endParaRPr lang="en-US" dirty="0"/>
@@ -711,35 +711,35 @@
           <a:p>
             <a:pPr lvl="0"/>
             <a:r>
-              <a:rPr lang="en-US"/>
-              <a:t>Click to edit Master text styles</a:t>
+              <a:rPr lang="en-US" smtClean="0"/>
+              <a:t>Edit Master text styles</a:t>
             </a:r>
           </a:p>
           <a:p>
             <a:pPr lvl="1"/>
             <a:r>
-              <a:rPr lang="en-US"/>
+              <a:rPr lang="en-US" smtClean="0"/>
               <a:t>Second level</a:t>
             </a:r>
           </a:p>
           <a:p>
             <a:pPr lvl="2"/>
             <a:r>
-              <a:rPr lang="en-US"/>
+              <a:rPr lang="en-US" smtClean="0"/>
               <a:t>Third level</a:t>
             </a:r>
           </a:p>
           <a:p>
             <a:pPr lvl="3"/>
             <a:r>
-              <a:rPr lang="en-US"/>
+              <a:rPr lang="en-US" smtClean="0"/>
               <a:t>Fourth level</a:t>
             </a:r>
           </a:p>
           <a:p>
             <a:pPr lvl="4"/>
             <a:r>
-              <a:rPr lang="en-US"/>
+              <a:rPr lang="en-US" smtClean="0"/>
               <a:t>Fifth level</a:t>
             </a:r>
             <a:endParaRPr lang="en-US" dirty="0"/>
@@ -814,7 +814,7 @@
     </p:spTree>
     <p:extLst>
       <p:ext uri="{BB962C8B-B14F-4D97-AF65-F5344CB8AC3E}">
-        <p14:creationId xmlns:p14="http://schemas.microsoft.com/office/powerpoint/2010/main" val="4240807495"/>
+        <p14:creationId xmlns:p14="http://schemas.microsoft.com/office/powerpoint/2010/main" val="1158602608"/>
       </p:ext>
     </p:extLst>
   </p:cSld>
@@ -853,8 +853,8 @@
         </p:nvSpPr>
         <p:spPr>
           <a:xfrm>
-            <a:off x="873443" y="1937704"/>
-            <a:ext cx="11041380" cy="3233102"/>
+            <a:off x="873443" y="2051686"/>
+            <a:ext cx="11041380" cy="3423284"/>
           </a:xfrm>
         </p:spPr>
         <p:txBody>
@@ -866,7 +866,7 @@
           </a:lstStyle>
           <a:p>
             <a:r>
-              <a:rPr lang="en-US"/>
+              <a:rPr lang="en-US" smtClean="0"/>
               <a:t>Click to edit Master title style</a:t>
             </a:r>
             <a:endParaRPr lang="en-US" dirty="0"/>
@@ -885,8 +885,8 @@
         </p:nvSpPr>
         <p:spPr>
           <a:xfrm>
-            <a:off x="873443" y="5201392"/>
-            <a:ext cx="11041380" cy="1700212"/>
+            <a:off x="873443" y="5507356"/>
+            <a:ext cx="11041380" cy="1800224"/>
           </a:xfrm>
         </p:spPr>
         <p:txBody>
@@ -986,8 +986,8 @@
           <a:p>
             <a:pPr lvl="0"/>
             <a:r>
-              <a:rPr lang="en-US"/>
-              <a:t>Click to edit Master text styles</a:t>
+              <a:rPr lang="en-US" smtClean="0"/>
+              <a:t>Edit Master text styles</a:t>
             </a:r>
           </a:p>
         </p:txBody>
@@ -1060,7 +1060,7 @@
     </p:spTree>
     <p:extLst>
       <p:ext uri="{BB962C8B-B14F-4D97-AF65-F5344CB8AC3E}">
-        <p14:creationId xmlns:p14="http://schemas.microsoft.com/office/powerpoint/2010/main" val="3991346338"/>
+        <p14:creationId xmlns:p14="http://schemas.microsoft.com/office/powerpoint/2010/main" val="3935626697"/>
       </p:ext>
     </p:extLst>
   </p:cSld>
@@ -1103,7 +1103,7 @@
           <a:lstStyle/>
           <a:p>
             <a:r>
-              <a:rPr lang="en-US"/>
+              <a:rPr lang="en-US" smtClean="0"/>
               <a:t>Click to edit Master title style</a:t>
             </a:r>
             <a:endParaRPr lang="en-US" dirty="0"/>
@@ -1122,8 +1122,8 @@
         </p:nvSpPr>
         <p:spPr>
           <a:xfrm>
-            <a:off x="880110" y="2069042"/>
-            <a:ext cx="5440680" cy="4931516"/>
+            <a:off x="880110" y="2190750"/>
+            <a:ext cx="5440680" cy="5221606"/>
           </a:xfrm>
         </p:spPr>
         <p:txBody>
@@ -1132,35 +1132,35 @@
           <a:p>
             <a:pPr lvl="0"/>
             <a:r>
-              <a:rPr lang="en-US"/>
-              <a:t>Click to edit Master text styles</a:t>
+              <a:rPr lang="en-US" smtClean="0"/>
+              <a:t>Edit Master text styles</a:t>
             </a:r>
           </a:p>
           <a:p>
             <a:pPr lvl="1"/>
             <a:r>
-              <a:rPr lang="en-US"/>
+              <a:rPr lang="en-US" smtClean="0"/>
               <a:t>Second level</a:t>
             </a:r>
           </a:p>
           <a:p>
             <a:pPr lvl="2"/>
             <a:r>
-              <a:rPr lang="en-US"/>
+              <a:rPr lang="en-US" smtClean="0"/>
               <a:t>Third level</a:t>
             </a:r>
           </a:p>
           <a:p>
             <a:pPr lvl="3"/>
             <a:r>
-              <a:rPr lang="en-US"/>
+              <a:rPr lang="en-US" smtClean="0"/>
               <a:t>Fourth level</a:t>
             </a:r>
           </a:p>
           <a:p>
             <a:pPr lvl="4"/>
             <a:r>
-              <a:rPr lang="en-US"/>
+              <a:rPr lang="en-US" smtClean="0"/>
               <a:t>Fifth level</a:t>
             </a:r>
             <a:endParaRPr lang="en-US" dirty="0"/>
@@ -1179,8 +1179,8 @@
         </p:nvSpPr>
         <p:spPr>
           <a:xfrm>
-            <a:off x="6480810" y="2069042"/>
-            <a:ext cx="5440680" cy="4931516"/>
+            <a:off x="6480810" y="2190750"/>
+            <a:ext cx="5440680" cy="5221606"/>
           </a:xfrm>
         </p:spPr>
         <p:txBody>
@@ -1189,35 +1189,35 @@
           <a:p>
             <a:pPr lvl="0"/>
             <a:r>
-              <a:rPr lang="en-US"/>
-              <a:t>Click to edit Master text styles</a:t>
+              <a:rPr lang="en-US" smtClean="0"/>
+              <a:t>Edit Master text styles</a:t>
             </a:r>
           </a:p>
           <a:p>
             <a:pPr lvl="1"/>
             <a:r>
-              <a:rPr lang="en-US"/>
+              <a:rPr lang="en-US" smtClean="0"/>
               <a:t>Second level</a:t>
             </a:r>
           </a:p>
           <a:p>
             <a:pPr lvl="2"/>
             <a:r>
-              <a:rPr lang="en-US"/>
+              <a:rPr lang="en-US" smtClean="0"/>
               <a:t>Third level</a:t>
             </a:r>
           </a:p>
           <a:p>
             <a:pPr lvl="3"/>
             <a:r>
-              <a:rPr lang="en-US"/>
+              <a:rPr lang="en-US" smtClean="0"/>
               <a:t>Fourth level</a:t>
             </a:r>
           </a:p>
           <a:p>
             <a:pPr lvl="4"/>
             <a:r>
-              <a:rPr lang="en-US"/>
+              <a:rPr lang="en-US" smtClean="0"/>
               <a:t>Fifth level</a:t>
             </a:r>
             <a:endParaRPr lang="en-US" dirty="0"/>
@@ -1292,7 +1292,7 @@
     </p:spTree>
     <p:extLst>
       <p:ext uri="{BB962C8B-B14F-4D97-AF65-F5344CB8AC3E}">
-        <p14:creationId xmlns:p14="http://schemas.microsoft.com/office/powerpoint/2010/main" val="3997524317"/>
+        <p14:creationId xmlns:p14="http://schemas.microsoft.com/office/powerpoint/2010/main" val="3860530941"/>
       </p:ext>
     </p:extLst>
   </p:cSld>
@@ -1331,8 +1331,8 @@
         </p:nvSpPr>
         <p:spPr>
           <a:xfrm>
-            <a:off x="881777" y="413809"/>
-            <a:ext cx="11041380" cy="1502305"/>
+            <a:off x="881777" y="438150"/>
+            <a:ext cx="11041380" cy="1590676"/>
           </a:xfrm>
         </p:spPr>
         <p:txBody>
@@ -1340,7 +1340,7 @@
           <a:lstStyle/>
           <a:p>
             <a:r>
-              <a:rPr lang="en-US"/>
+              <a:rPr lang="en-US" smtClean="0"/>
               <a:t>Click to edit Master title style</a:t>
             </a:r>
             <a:endParaRPr lang="en-US" dirty="0"/>
@@ -1359,8 +1359,8 @@
         </p:nvSpPr>
         <p:spPr>
           <a:xfrm>
-            <a:off x="881778" y="1905318"/>
-            <a:ext cx="5415676" cy="933767"/>
+            <a:off x="881778" y="2017396"/>
+            <a:ext cx="5415676" cy="988694"/>
           </a:xfrm>
         </p:spPr>
         <p:txBody>
@@ -1406,8 +1406,8 @@
           <a:p>
             <a:pPr lvl="0"/>
             <a:r>
-              <a:rPr lang="en-US"/>
-              <a:t>Click to edit Master text styles</a:t>
+              <a:rPr lang="en-US" smtClean="0"/>
+              <a:t>Edit Master text styles</a:t>
             </a:r>
           </a:p>
         </p:txBody>
@@ -1424,8 +1424,8 @@
         </p:nvSpPr>
         <p:spPr>
           <a:xfrm>
-            <a:off x="881778" y="2839085"/>
-            <a:ext cx="5415676" cy="4175866"/>
+            <a:off x="881778" y="3006090"/>
+            <a:ext cx="5415676" cy="4421506"/>
           </a:xfrm>
         </p:spPr>
         <p:txBody>
@@ -1434,35 +1434,35 @@
           <a:p>
             <a:pPr lvl="0"/>
             <a:r>
-              <a:rPr lang="en-US"/>
-              <a:t>Click to edit Master text styles</a:t>
+              <a:rPr lang="en-US" smtClean="0"/>
+              <a:t>Edit Master text styles</a:t>
             </a:r>
           </a:p>
           <a:p>
             <a:pPr lvl="1"/>
             <a:r>
-              <a:rPr lang="en-US"/>
+              <a:rPr lang="en-US" smtClean="0"/>
               <a:t>Second level</a:t>
             </a:r>
           </a:p>
           <a:p>
             <a:pPr lvl="2"/>
             <a:r>
-              <a:rPr lang="en-US"/>
+              <a:rPr lang="en-US" smtClean="0"/>
               <a:t>Third level</a:t>
             </a:r>
           </a:p>
           <a:p>
             <a:pPr lvl="3"/>
             <a:r>
-              <a:rPr lang="en-US"/>
+              <a:rPr lang="en-US" smtClean="0"/>
               <a:t>Fourth level</a:t>
             </a:r>
           </a:p>
           <a:p>
             <a:pPr lvl="4"/>
             <a:r>
-              <a:rPr lang="en-US"/>
+              <a:rPr lang="en-US" smtClean="0"/>
               <a:t>Fifth level</a:t>
             </a:r>
             <a:endParaRPr lang="en-US" dirty="0"/>
@@ -1481,8 +1481,8 @@
         </p:nvSpPr>
         <p:spPr>
           <a:xfrm>
-            <a:off x="6480810" y="1905318"/>
-            <a:ext cx="5442347" cy="933767"/>
+            <a:off x="6480810" y="2017396"/>
+            <a:ext cx="5442347" cy="988694"/>
           </a:xfrm>
         </p:spPr>
         <p:txBody>
@@ -1528,8 +1528,8 @@
           <a:p>
             <a:pPr lvl="0"/>
             <a:r>
-              <a:rPr lang="en-US"/>
-              <a:t>Click to edit Master text styles</a:t>
+              <a:rPr lang="en-US" smtClean="0"/>
+              <a:t>Edit Master text styles</a:t>
             </a:r>
           </a:p>
         </p:txBody>
@@ -1546,8 +1546,8 @@
         </p:nvSpPr>
         <p:spPr>
           <a:xfrm>
-            <a:off x="6480810" y="2839085"/>
-            <a:ext cx="5442347" cy="4175866"/>
+            <a:off x="6480810" y="3006090"/>
+            <a:ext cx="5442347" cy="4421506"/>
           </a:xfrm>
         </p:spPr>
         <p:txBody>
@@ -1556,35 +1556,35 @@
           <a:p>
             <a:pPr lvl="0"/>
             <a:r>
-              <a:rPr lang="en-US"/>
-              <a:t>Click to edit Master text styles</a:t>
+              <a:rPr lang="en-US" smtClean="0"/>
+              <a:t>Edit Master text styles</a:t>
             </a:r>
           </a:p>
           <a:p>
             <a:pPr lvl="1"/>
             <a:r>
-              <a:rPr lang="en-US"/>
+              <a:rPr lang="en-US" smtClean="0"/>
               <a:t>Second level</a:t>
             </a:r>
           </a:p>
           <a:p>
             <a:pPr lvl="2"/>
             <a:r>
-              <a:rPr lang="en-US"/>
+              <a:rPr lang="en-US" smtClean="0"/>
               <a:t>Third level</a:t>
             </a:r>
           </a:p>
           <a:p>
             <a:pPr lvl="3"/>
             <a:r>
-              <a:rPr lang="en-US"/>
+              <a:rPr lang="en-US" smtClean="0"/>
               <a:t>Fourth level</a:t>
             </a:r>
           </a:p>
           <a:p>
             <a:pPr lvl="4"/>
             <a:r>
-              <a:rPr lang="en-US"/>
+              <a:rPr lang="en-US" smtClean="0"/>
               <a:t>Fifth level</a:t>
             </a:r>
             <a:endParaRPr lang="en-US" dirty="0"/>
@@ -1659,7 +1659,7 @@
     </p:spTree>
     <p:extLst>
       <p:ext uri="{BB962C8B-B14F-4D97-AF65-F5344CB8AC3E}">
-        <p14:creationId xmlns:p14="http://schemas.microsoft.com/office/powerpoint/2010/main" val="763879628"/>
+        <p14:creationId xmlns:p14="http://schemas.microsoft.com/office/powerpoint/2010/main" val="4202560661"/>
       </p:ext>
     </p:extLst>
   </p:cSld>
@@ -1702,7 +1702,7 @@
           <a:lstStyle/>
           <a:p>
             <a:r>
-              <a:rPr lang="en-US"/>
+              <a:rPr lang="en-US" smtClean="0"/>
               <a:t>Click to edit Master title style</a:t>
             </a:r>
             <a:endParaRPr lang="en-US" dirty="0"/>
@@ -1777,7 +1777,7 @@
     </p:spTree>
     <p:extLst>
       <p:ext uri="{BB962C8B-B14F-4D97-AF65-F5344CB8AC3E}">
-        <p14:creationId xmlns:p14="http://schemas.microsoft.com/office/powerpoint/2010/main" val="3932940750"/>
+        <p14:creationId xmlns:p14="http://schemas.microsoft.com/office/powerpoint/2010/main" val="1862608508"/>
       </p:ext>
     </p:extLst>
   </p:cSld>
@@ -1872,7 +1872,7 @@
     </p:spTree>
     <p:extLst>
       <p:ext uri="{BB962C8B-B14F-4D97-AF65-F5344CB8AC3E}">
-        <p14:creationId xmlns:p14="http://schemas.microsoft.com/office/powerpoint/2010/main" val="1373893158"/>
+        <p14:creationId xmlns:p14="http://schemas.microsoft.com/office/powerpoint/2010/main" val="561003971"/>
       </p:ext>
     </p:extLst>
   </p:cSld>
@@ -1911,8 +1911,8 @@
         </p:nvSpPr>
         <p:spPr>
           <a:xfrm>
-            <a:off x="881778" y="518160"/>
-            <a:ext cx="4128849" cy="1813560"/>
+            <a:off x="881778" y="548640"/>
+            <a:ext cx="4128849" cy="1920240"/>
           </a:xfrm>
         </p:spPr>
         <p:txBody>
@@ -1924,7 +1924,7 @@
           </a:lstStyle>
           <a:p>
             <a:r>
-              <a:rPr lang="en-US"/>
+              <a:rPr lang="en-US" smtClean="0"/>
               <a:t>Click to edit Master title style</a:t>
             </a:r>
             <a:endParaRPr lang="en-US" dirty="0"/>
@@ -1943,8 +1943,8 @@
         </p:nvSpPr>
         <p:spPr>
           <a:xfrm>
-            <a:off x="5442347" y="1119082"/>
-            <a:ext cx="6480810" cy="5523442"/>
+            <a:off x="5442347" y="1184911"/>
+            <a:ext cx="6480810" cy="5848350"/>
           </a:xfrm>
         </p:spPr>
         <p:txBody>
@@ -1981,35 +1981,35 @@
           <a:p>
             <a:pPr lvl="0"/>
             <a:r>
-              <a:rPr lang="en-US"/>
-              <a:t>Click to edit Master text styles</a:t>
+              <a:rPr lang="en-US" smtClean="0"/>
+              <a:t>Edit Master text styles</a:t>
             </a:r>
           </a:p>
           <a:p>
             <a:pPr lvl="1"/>
             <a:r>
-              <a:rPr lang="en-US"/>
+              <a:rPr lang="en-US" smtClean="0"/>
               <a:t>Second level</a:t>
             </a:r>
           </a:p>
           <a:p>
             <a:pPr lvl="2"/>
             <a:r>
-              <a:rPr lang="en-US"/>
+              <a:rPr lang="en-US" smtClean="0"/>
               <a:t>Third level</a:t>
             </a:r>
           </a:p>
           <a:p>
             <a:pPr lvl="3"/>
             <a:r>
-              <a:rPr lang="en-US"/>
+              <a:rPr lang="en-US" smtClean="0"/>
               <a:t>Fourth level</a:t>
             </a:r>
           </a:p>
           <a:p>
             <a:pPr lvl="4"/>
             <a:r>
-              <a:rPr lang="en-US"/>
+              <a:rPr lang="en-US" smtClean="0"/>
               <a:t>Fifth level</a:t>
             </a:r>
             <a:endParaRPr lang="en-US" dirty="0"/>
@@ -2028,8 +2028,8 @@
         </p:nvSpPr>
         <p:spPr>
           <a:xfrm>
-            <a:off x="881778" y="2331720"/>
-            <a:ext cx="4128849" cy="4319800"/>
+            <a:off x="881778" y="2468880"/>
+            <a:ext cx="4128849" cy="4573906"/>
           </a:xfrm>
         </p:spPr>
         <p:txBody>
@@ -2075,8 +2075,8 @@
           <a:p>
             <a:pPr lvl="0"/>
             <a:r>
-              <a:rPr lang="en-US"/>
-              <a:t>Click to edit Master text styles</a:t>
+              <a:rPr lang="en-US" smtClean="0"/>
+              <a:t>Edit Master text styles</a:t>
             </a:r>
           </a:p>
         </p:txBody>
@@ -2149,7 +2149,7 @@
     </p:spTree>
     <p:extLst>
       <p:ext uri="{BB962C8B-B14F-4D97-AF65-F5344CB8AC3E}">
-        <p14:creationId xmlns:p14="http://schemas.microsoft.com/office/powerpoint/2010/main" val="992986331"/>
+        <p14:creationId xmlns:p14="http://schemas.microsoft.com/office/powerpoint/2010/main" val="2284034453"/>
       </p:ext>
     </p:extLst>
   </p:cSld>
@@ -2188,8 +2188,8 @@
         </p:nvSpPr>
         <p:spPr>
           <a:xfrm>
-            <a:off x="881778" y="518160"/>
-            <a:ext cx="4128849" cy="1813560"/>
+            <a:off x="881778" y="548640"/>
+            <a:ext cx="4128849" cy="1920240"/>
           </a:xfrm>
         </p:spPr>
         <p:txBody>
@@ -2201,7 +2201,7 @@
           </a:lstStyle>
           <a:p>
             <a:r>
-              <a:rPr lang="en-US"/>
+              <a:rPr lang="en-US" smtClean="0"/>
               <a:t>Click to edit Master title style</a:t>
             </a:r>
             <a:endParaRPr lang="en-US" dirty="0"/>
@@ -2220,8 +2220,8 @@
         </p:nvSpPr>
         <p:spPr>
           <a:xfrm>
-            <a:off x="5442347" y="1119082"/>
-            <a:ext cx="6480810" cy="5523442"/>
+            <a:off x="5442347" y="1184911"/>
+            <a:ext cx="6480810" cy="5848350"/>
           </a:xfrm>
         </p:spPr>
         <p:txBody>
@@ -2266,7 +2266,7 @@
           </a:lstStyle>
           <a:p>
             <a:r>
-              <a:rPr lang="en-US"/>
+              <a:rPr lang="en-US" smtClean="0"/>
               <a:t>Click icon to add picture</a:t>
             </a:r>
             <a:endParaRPr lang="en-US" dirty="0"/>
@@ -2285,8 +2285,8 @@
         </p:nvSpPr>
         <p:spPr>
           <a:xfrm>
-            <a:off x="881778" y="2331720"/>
-            <a:ext cx="4128849" cy="4319800"/>
+            <a:off x="881778" y="2468880"/>
+            <a:ext cx="4128849" cy="4573906"/>
           </a:xfrm>
         </p:spPr>
         <p:txBody>
@@ -2332,8 +2332,8 @@
           <a:p>
             <a:pPr lvl="0"/>
             <a:r>
-              <a:rPr lang="en-US"/>
-              <a:t>Click to edit Master text styles</a:t>
+              <a:rPr lang="en-US" smtClean="0"/>
+              <a:t>Edit Master text styles</a:t>
             </a:r>
           </a:p>
         </p:txBody>
@@ -2406,7 +2406,7 @@
     </p:spTree>
     <p:extLst>
       <p:ext uri="{BB962C8B-B14F-4D97-AF65-F5344CB8AC3E}">
-        <p14:creationId xmlns:p14="http://schemas.microsoft.com/office/powerpoint/2010/main" val="3029636099"/>
+        <p14:creationId xmlns:p14="http://schemas.microsoft.com/office/powerpoint/2010/main" val="2030990658"/>
       </p:ext>
     </p:extLst>
   </p:cSld>
@@ -2450,8 +2450,8 @@
         </p:nvSpPr>
         <p:spPr>
           <a:xfrm>
-            <a:off x="880110" y="413809"/>
-            <a:ext cx="11041380" cy="1502305"/>
+            <a:off x="880110" y="438150"/>
+            <a:ext cx="11041380" cy="1590676"/>
           </a:xfrm>
           <a:prstGeom prst="rect">
             <a:avLst/>
@@ -2464,7 +2464,7 @@
           <a:lstStyle/>
           <a:p>
             <a:r>
-              <a:rPr lang="en-US"/>
+              <a:rPr lang="en-US" smtClean="0"/>
               <a:t>Click to edit Master title style</a:t>
             </a:r>
             <a:endParaRPr lang="en-US" dirty="0"/>
@@ -2483,8 +2483,8 @@
         </p:nvSpPr>
         <p:spPr>
           <a:xfrm>
-            <a:off x="880110" y="2069042"/>
-            <a:ext cx="11041380" cy="4931516"/>
+            <a:off x="880110" y="2190750"/>
+            <a:ext cx="11041380" cy="5221606"/>
           </a:xfrm>
           <a:prstGeom prst="rect">
             <a:avLst/>
@@ -2498,35 +2498,35 @@
           <a:p>
             <a:pPr lvl="0"/>
             <a:r>
-              <a:rPr lang="en-US"/>
-              <a:t>Click to edit Master text styles</a:t>
+              <a:rPr lang="en-US" smtClean="0"/>
+              <a:t>Edit Master text styles</a:t>
             </a:r>
           </a:p>
           <a:p>
             <a:pPr lvl="1"/>
             <a:r>
-              <a:rPr lang="en-US"/>
+              <a:rPr lang="en-US" smtClean="0"/>
               <a:t>Second level</a:t>
             </a:r>
           </a:p>
           <a:p>
             <a:pPr lvl="2"/>
             <a:r>
-              <a:rPr lang="en-US"/>
+              <a:rPr lang="en-US" smtClean="0"/>
               <a:t>Third level</a:t>
             </a:r>
           </a:p>
           <a:p>
             <a:pPr lvl="3"/>
             <a:r>
-              <a:rPr lang="en-US"/>
+              <a:rPr lang="en-US" smtClean="0"/>
               <a:t>Fourth level</a:t>
             </a:r>
           </a:p>
           <a:p>
             <a:pPr lvl="4"/>
             <a:r>
-              <a:rPr lang="en-US"/>
+              <a:rPr lang="en-US" smtClean="0"/>
               <a:t>Fifth level</a:t>
             </a:r>
             <a:endParaRPr lang="en-US" dirty="0"/>
@@ -2545,8 +2545,8 @@
         </p:nvSpPr>
         <p:spPr>
           <a:xfrm>
-            <a:off x="880110" y="7203864"/>
-            <a:ext cx="2880360" cy="413808"/>
+            <a:off x="880110" y="7627621"/>
+            <a:ext cx="2880360" cy="438150"/>
           </a:xfrm>
           <a:prstGeom prst="rect">
             <a:avLst/>
@@ -2586,8 +2586,8 @@
         </p:nvSpPr>
         <p:spPr>
           <a:xfrm>
-            <a:off x="4240530" y="7203864"/>
-            <a:ext cx="4320540" cy="413808"/>
+            <a:off x="4240530" y="7627621"/>
+            <a:ext cx="4320540" cy="438150"/>
           </a:xfrm>
           <a:prstGeom prst="rect">
             <a:avLst/>
@@ -2623,8 +2623,8 @@
         </p:nvSpPr>
         <p:spPr>
           <a:xfrm>
-            <a:off x="9041130" y="7203864"/>
-            <a:ext cx="2880360" cy="413808"/>
+            <a:off x="9041130" y="7627621"/>
+            <a:ext cx="2880360" cy="438150"/>
           </a:xfrm>
           <a:prstGeom prst="rect">
             <a:avLst/>
@@ -2655,23 +2655,23 @@
     </p:spTree>
     <p:extLst>
       <p:ext uri="{BB962C8B-B14F-4D97-AF65-F5344CB8AC3E}">
-        <p14:creationId xmlns:p14="http://schemas.microsoft.com/office/powerpoint/2010/main" val="3245437592"/>
+        <p14:creationId xmlns:p14="http://schemas.microsoft.com/office/powerpoint/2010/main" val="3892707291"/>
       </p:ext>
     </p:extLst>
   </p:cSld>
   <p:clrMap bg1="lt1" tx1="dk1" bg2="lt2" tx2="dk2" accent1="accent1" accent2="accent2" accent3="accent3" accent4="accent4" accent5="accent5" accent6="accent6" hlink="hlink" folHlink="folHlink"/>
   <p:sldLayoutIdLst>
-    <p:sldLayoutId id="2147483697" r:id="rId1"/>
-    <p:sldLayoutId id="2147483698" r:id="rId2"/>
-    <p:sldLayoutId id="2147483699" r:id="rId3"/>
-    <p:sldLayoutId id="2147483700" r:id="rId4"/>
-    <p:sldLayoutId id="2147483701" r:id="rId5"/>
-    <p:sldLayoutId id="2147483702" r:id="rId6"/>
-    <p:sldLayoutId id="2147483703" r:id="rId7"/>
-    <p:sldLayoutId id="2147483704" r:id="rId8"/>
-    <p:sldLayoutId id="2147483705" r:id="rId9"/>
-    <p:sldLayoutId id="2147483706" r:id="rId10"/>
-    <p:sldLayoutId id="2147483707" r:id="rId11"/>
+    <p:sldLayoutId id="2147483709" r:id="rId1"/>
+    <p:sldLayoutId id="2147483710" r:id="rId2"/>
+    <p:sldLayoutId id="2147483711" r:id="rId3"/>
+    <p:sldLayoutId id="2147483712" r:id="rId4"/>
+    <p:sldLayoutId id="2147483713" r:id="rId5"/>
+    <p:sldLayoutId id="2147483714" r:id="rId6"/>
+    <p:sldLayoutId id="2147483715" r:id="rId7"/>
+    <p:sldLayoutId id="2147483716" r:id="rId8"/>
+    <p:sldLayoutId id="2147483717" r:id="rId9"/>
+    <p:sldLayoutId id="2147483718" r:id="rId10"/>
+    <p:sldLayoutId id="2147483719" r:id="rId11"/>
   </p:sldLayoutIdLst>
   <p:txStyles>
     <p:titleStyle>
@@ -2989,7 +2989,7 @@
         </p:nvSpPr>
         <p:spPr>
           <a:xfrm>
-            <a:off x="2372409" y="0"/>
+            <a:off x="2372409" y="103560"/>
             <a:ext cx="1950720" cy="369460"/>
           </a:xfrm>
           <a:prstGeom prst="rect">
@@ -3028,7 +3028,7 @@
         </p:nvSpPr>
         <p:spPr>
           <a:xfrm rot="5400000">
-            <a:off x="6347525" y="-3739251"/>
+            <a:off x="6347525" y="-3635691"/>
             <a:ext cx="125152" cy="8484148"/>
           </a:xfrm>
           <a:prstGeom prst="leftBrace">
@@ -3070,7 +3070,7 @@
         </p:nvSpPr>
         <p:spPr>
           <a:xfrm>
-            <a:off x="5900036" y="83984"/>
+            <a:off x="5900036" y="187544"/>
             <a:ext cx="1020130" cy="369460"/>
           </a:xfrm>
           <a:prstGeom prst="rect">
@@ -3104,7 +3104,7 @@
         </p:nvSpPr>
         <p:spPr>
           <a:xfrm>
-            <a:off x="2026846" y="609575"/>
+            <a:off x="2026846" y="713135"/>
             <a:ext cx="107024" cy="5047790"/>
           </a:xfrm>
           <a:prstGeom prst="leftBrace">
@@ -3146,7 +3146,7 @@
         </p:nvSpPr>
         <p:spPr>
           <a:xfrm>
-            <a:off x="1147897" y="2948805"/>
+            <a:off x="1147897" y="3052365"/>
             <a:ext cx="1020130" cy="369460"/>
           </a:xfrm>
           <a:prstGeom prst="rect">
@@ -3179,7 +3179,7 @@
         </p:nvSpPr>
         <p:spPr>
           <a:xfrm rot="10800000">
-            <a:off x="10690766" y="771727"/>
+            <a:off x="10690766" y="875287"/>
             <a:ext cx="112084" cy="59056"/>
           </a:xfrm>
           <a:prstGeom prst="leftBrace">
@@ -3225,7 +3225,7 @@
         </p:nvSpPr>
         <p:spPr>
           <a:xfrm rot="10800000">
-            <a:off x="10695298" y="663868"/>
+            <a:off x="10695298" y="767428"/>
             <a:ext cx="112084" cy="59056"/>
           </a:xfrm>
           <a:prstGeom prst="leftBrace">
@@ -3271,7 +3271,7 @@
         </p:nvSpPr>
         <p:spPr>
           <a:xfrm>
-            <a:off x="10862320" y="360107"/>
+            <a:off x="10862321" y="463667"/>
             <a:ext cx="2025359" cy="369460"/>
           </a:xfrm>
           <a:prstGeom prst="rect">
@@ -3309,7 +3309,7 @@
         </p:nvSpPr>
         <p:spPr>
           <a:xfrm rot="10800000">
-            <a:off x="10700360" y="893249"/>
+            <a:off x="10700360" y="996809"/>
             <a:ext cx="112084" cy="123818"/>
           </a:xfrm>
           <a:prstGeom prst="leftBrace">
@@ -3355,7 +3355,7 @@
         </p:nvSpPr>
         <p:spPr>
           <a:xfrm>
-            <a:off x="10862318" y="814012"/>
+            <a:off x="10862319" y="917572"/>
             <a:ext cx="2025359" cy="369460"/>
           </a:xfrm>
           <a:prstGeom prst="rect">
@@ -3393,7 +3393,7 @@
         </p:nvSpPr>
         <p:spPr>
           <a:xfrm rot="10800000">
-            <a:off x="10677301" y="5580430"/>
+            <a:off x="10677301" y="5683990"/>
             <a:ext cx="112084" cy="59056"/>
           </a:xfrm>
           <a:prstGeom prst="leftBrace">
@@ -3439,7 +3439,7 @@
         </p:nvSpPr>
         <p:spPr>
           <a:xfrm>
-            <a:off x="10862317" y="5395763"/>
+            <a:off x="10862318" y="5499323"/>
             <a:ext cx="2025359" cy="369460"/>
           </a:xfrm>
           <a:prstGeom prst="rect">
@@ -3477,7 +3477,7 @@
         </p:nvSpPr>
         <p:spPr>
           <a:xfrm rot="10800000" flipH="1">
-            <a:off x="1941701" y="604812"/>
+            <a:off x="1941701" y="708372"/>
             <a:ext cx="112084" cy="59056"/>
           </a:xfrm>
           <a:prstGeom prst="leftBrace">
@@ -3523,7 +3523,7 @@
         </p:nvSpPr>
         <p:spPr>
           <a:xfrm rot="10800000" flipH="1">
-            <a:off x="1941701" y="667633"/>
+            <a:off x="1941701" y="771193"/>
             <a:ext cx="112084" cy="59056"/>
           </a:xfrm>
           <a:prstGeom prst="leftBrace">
@@ -3569,7 +3569,7 @@
         </p:nvSpPr>
         <p:spPr>
           <a:xfrm rot="10800000" flipH="1">
-            <a:off x="1939454" y="1330572"/>
+            <a:off x="1939454" y="1434132"/>
             <a:ext cx="112084" cy="59056"/>
           </a:xfrm>
           <a:prstGeom prst="leftBrace">
@@ -3615,7 +3615,7 @@
         </p:nvSpPr>
         <p:spPr>
           <a:xfrm rot="10800000" flipH="1">
-            <a:off x="1914760" y="5592375"/>
+            <a:off x="1914760" y="5695935"/>
             <a:ext cx="112084" cy="59056"/>
           </a:xfrm>
           <a:prstGeom prst="leftBrace">
@@ -3661,7 +3661,7 @@
         </p:nvSpPr>
         <p:spPr>
           <a:xfrm rot="5400000" flipH="1">
-            <a:off x="2141513" y="5747839"/>
+            <a:off x="2141513" y="5851399"/>
             <a:ext cx="112084" cy="59056"/>
           </a:xfrm>
           <a:prstGeom prst="leftBrace">
@@ -3707,7 +3707,7 @@
         </p:nvSpPr>
         <p:spPr>
           <a:xfrm rot="5400000" flipH="1">
-            <a:off x="4174760" y="5715866"/>
+            <a:off x="4174760" y="5819427"/>
             <a:ext cx="112084" cy="123009"/>
           </a:xfrm>
           <a:prstGeom prst="leftBrace">
@@ -3753,7 +3753,7 @@
         </p:nvSpPr>
         <p:spPr>
           <a:xfrm rot="5400000" flipH="1">
-            <a:off x="10547950" y="5704056"/>
+            <a:off x="10547950" y="5807616"/>
             <a:ext cx="112084" cy="146620"/>
           </a:xfrm>
           <a:prstGeom prst="leftBrace">
@@ -3799,7 +3799,7 @@
         </p:nvSpPr>
         <p:spPr>
           <a:xfrm>
-            <a:off x="-111119" y="309462"/>
+            <a:off x="-111119" y="413023"/>
             <a:ext cx="2025359" cy="646587"/>
           </a:xfrm>
           <a:prstGeom prst="rect">
@@ -3854,7 +3854,7 @@
         </p:nvSpPr>
         <p:spPr>
           <a:xfrm>
-            <a:off x="-111119" y="1175433"/>
+            <a:off x="-111119" y="1278993"/>
             <a:ext cx="2025359" cy="369460"/>
           </a:xfrm>
           <a:prstGeom prst="rect">
@@ -3893,7 +3893,7 @@
         </p:nvSpPr>
         <p:spPr>
           <a:xfrm>
-            <a:off x="-139696" y="5428257"/>
+            <a:off x="-139696" y="5531817"/>
             <a:ext cx="2025359" cy="369460"/>
           </a:xfrm>
           <a:prstGeom prst="rect">
@@ -3932,7 +3932,7 @@
         </p:nvSpPr>
         <p:spPr>
           <a:xfrm>
-            <a:off x="1399496" y="5875921"/>
+            <a:off x="1399496" y="5979481"/>
             <a:ext cx="10608008" cy="369460"/>
           </a:xfrm>
           <a:prstGeom prst="rect">
@@ -4020,7 +4020,7 @@
         </p:nvSpPr>
         <p:spPr>
           <a:xfrm rot="5400000">
-            <a:off x="3291726" y="-754366"/>
+            <a:off x="3291726" y="-650806"/>
             <a:ext cx="112084" cy="2359481"/>
           </a:xfrm>
           <a:prstGeom prst="leftBrace">
@@ -4062,7 +4062,7 @@
         </p:nvSpPr>
         <p:spPr>
           <a:xfrm rot="5400000" flipH="1">
-            <a:off x="10410173" y="5722444"/>
+            <a:off x="10410173" y="5826004"/>
             <a:ext cx="112084" cy="109836"/>
           </a:xfrm>
           <a:prstGeom prst="leftBrace">
@@ -4111,14 +4111,14 @@
           <p:nvPr>
             <p:extLst>
               <p:ext uri="{D42A27DB-BD31-4B8C-83A1-F6EECF244321}">
-                <p14:modId xmlns:p14="http://schemas.microsoft.com/office/powerpoint/2010/main" val="3818371632"/>
+                <p14:modId xmlns:p14="http://schemas.microsoft.com/office/powerpoint/2010/main" val="1577209038"/>
               </p:ext>
             </p:extLst>
           </p:nvPr>
         </p:nvGraphicFramePr>
         <p:xfrm>
-          <a:off x="1610361" y="6523431"/>
-          <a:ext cx="9599480" cy="1005843"/>
+          <a:off x="1617376" y="6630541"/>
+          <a:ext cx="9599480" cy="1341124"/>
         </p:xfrm>
         <a:graphic>
           <a:graphicData uri="http://schemas.openxmlformats.org/drawingml/2006/table">
@@ -4283,8 +4283,13 @@
                       <a:pPr algn="r"/>
                       <a:r>
                         <a:rPr lang="en-US" sz="1600" dirty="0"/>
-                        <a:t>Where to override:</a:t>
+                        <a:t>Where to </a:t>
                       </a:r>
+                      <a:r>
+                        <a:rPr lang="en-US" sz="1600" dirty="0" smtClean="0"/>
+                        <a:t>set:</a:t>
+                      </a:r>
+                      <a:endParaRPr lang="en-US" sz="1600" dirty="0"/>
                     </a:p>
                   </a:txBody>
                   <a:tcPr anchor="ctr">
@@ -4460,6 +4465,237 @@
                 <a:extLst>
                   <a:ext uri="{0D108BD9-81ED-4DB2-BD59-A6C34878D82A}">
                     <a16:rowId xmlns:a16="http://schemas.microsoft.com/office/drawing/2014/main" val="227351936"/>
+                  </a:ext>
+                </a:extLst>
+              </a:tr>
+              <a:tr h="335281">
+                <a:tc>
+                  <a:txBody>
+                    <a:bodyPr/>
+                    <a:lstStyle/>
+                    <a:p>
+                      <a:pPr algn="r"/>
+                      <a:r>
+                        <a:rPr lang="en-US" sz="1600" dirty="0" smtClean="0"/>
+                        <a:t>How to set:</a:t>
+                      </a:r>
+                      <a:endParaRPr lang="en-US" sz="1600" dirty="0"/>
+                    </a:p>
+                  </a:txBody>
+                  <a:tcPr anchor="ctr">
+                    <a:lnL w="12700" cap="flat" cmpd="sng" algn="ctr">
+                      <a:solidFill>
+                        <a:schemeClr val="tx1"/>
+                      </a:solidFill>
+                      <a:prstDash val="solid"/>
+                      <a:round/>
+                      <a:headEnd type="none" w="med" len="med"/>
+                      <a:tailEnd type="none" w="med" len="med"/>
+                    </a:lnL>
+                    <a:lnT w="12700" cap="flat" cmpd="sng" algn="ctr">
+                      <a:solidFill>
+                        <a:schemeClr val="tx1"/>
+                      </a:solidFill>
+                      <a:prstDash val="dot"/>
+                      <a:round/>
+                      <a:headEnd type="none" w="med" len="med"/>
+                      <a:tailEnd type="none" w="med" len="med"/>
+                    </a:lnT>
+                    <a:lnB w="12700" cap="flat" cmpd="sng" algn="ctr">
+                      <a:solidFill>
+                        <a:schemeClr val="tx1"/>
+                      </a:solidFill>
+                      <a:prstDash val="dot"/>
+                      <a:round/>
+                      <a:headEnd type="none" w="med" len="med"/>
+                      <a:tailEnd type="none" w="med" len="med"/>
+                    </a:lnB>
+                  </a:tcPr>
+                </a:tc>
+                <a:tc>
+                  <a:txBody>
+                    <a:bodyPr/>
+                    <a:lstStyle/>
+                    <a:p>
+                      <a:pPr algn="ctr"/>
+                      <a:r>
+                        <a:rPr lang="en-US" sz="1600" dirty="0" smtClean="0">
+                          <a:solidFill>
+                            <a:schemeClr val="accent1"/>
+                          </a:solidFill>
+                        </a:rPr>
+                        <a:t>Arguments</a:t>
+                      </a:r>
+                      <a:endParaRPr lang="en-US" sz="1600" dirty="0">
+                        <a:solidFill>
+                          <a:schemeClr val="accent1"/>
+                        </a:solidFill>
+                      </a:endParaRPr>
+                    </a:p>
+                  </a:txBody>
+                  <a:tcPr anchor="ctr">
+                    <a:lnT w="12700" cap="flat" cmpd="sng" algn="ctr">
+                      <a:solidFill>
+                        <a:schemeClr val="tx1"/>
+                      </a:solidFill>
+                      <a:prstDash val="dot"/>
+                      <a:round/>
+                      <a:headEnd type="none" w="med" len="med"/>
+                      <a:tailEnd type="none" w="med" len="med"/>
+                    </a:lnT>
+                    <a:lnB w="12700" cap="flat" cmpd="sng" algn="ctr">
+                      <a:solidFill>
+                        <a:schemeClr val="tx1"/>
+                      </a:solidFill>
+                      <a:prstDash val="dot"/>
+                      <a:round/>
+                      <a:headEnd type="none" w="med" len="med"/>
+                      <a:tailEnd type="none" w="med" len="med"/>
+                    </a:lnB>
+                  </a:tcPr>
+                </a:tc>
+                <a:tc>
+                  <a:txBody>
+                    <a:bodyPr/>
+                    <a:lstStyle/>
+                    <a:p>
+                      <a:pPr algn="ctr"/>
+                      <a:r>
+                        <a:rPr lang="en-US" sz="1600" dirty="0" smtClean="0">
+                          <a:solidFill>
+                            <a:srgbClr val="7030A0"/>
+                          </a:solidFill>
+                        </a:rPr>
+                        <a:t>Overrides</a:t>
+                      </a:r>
+                      <a:endParaRPr lang="en-US" sz="1600" dirty="0">
+                        <a:solidFill>
+                          <a:srgbClr val="7030A0"/>
+                        </a:solidFill>
+                      </a:endParaRPr>
+                    </a:p>
+                  </a:txBody>
+                  <a:tcPr anchor="ctr">
+                    <a:lnT w="12700" cap="flat" cmpd="sng" algn="ctr">
+                      <a:solidFill>
+                        <a:schemeClr val="tx1"/>
+                      </a:solidFill>
+                      <a:prstDash val="dot"/>
+                      <a:round/>
+                      <a:headEnd type="none" w="med" len="med"/>
+                      <a:tailEnd type="none" w="med" len="med"/>
+                    </a:lnT>
+                    <a:lnB w="12700" cap="flat" cmpd="sng" algn="ctr">
+                      <a:solidFill>
+                        <a:schemeClr val="tx1"/>
+                      </a:solidFill>
+                      <a:prstDash val="dot"/>
+                      <a:round/>
+                      <a:headEnd type="none" w="med" len="med"/>
+                      <a:tailEnd type="none" w="med" len="med"/>
+                    </a:lnB>
+                  </a:tcPr>
+                </a:tc>
+                <a:tc>
+                  <a:txBody>
+                    <a:bodyPr/>
+                    <a:lstStyle/>
+                    <a:p>
+                      <a:pPr algn="ctr"/>
+                      <a:r>
+                        <a:rPr lang="en-US" sz="1600" dirty="0" smtClean="0">
+                          <a:solidFill>
+                            <a:schemeClr val="accent6"/>
+                          </a:solidFill>
+                        </a:rPr>
+                        <a:t>Overrides</a:t>
+                      </a:r>
+                      <a:endParaRPr lang="en-US" sz="1600" dirty="0">
+                        <a:solidFill>
+                          <a:schemeClr val="accent6"/>
+                        </a:solidFill>
+                      </a:endParaRPr>
+                    </a:p>
+                  </a:txBody>
+                  <a:tcPr anchor="ctr">
+                    <a:lnT w="12700" cap="flat" cmpd="sng" algn="ctr">
+                      <a:solidFill>
+                        <a:schemeClr val="tx1"/>
+                      </a:solidFill>
+                      <a:prstDash val="dot"/>
+                      <a:round/>
+                      <a:headEnd type="none" w="med" len="med"/>
+                      <a:tailEnd type="none" w="med" len="med"/>
+                    </a:lnT>
+                    <a:lnB w="12700" cap="flat" cmpd="sng" algn="ctr">
+                      <a:solidFill>
+                        <a:schemeClr val="tx1"/>
+                      </a:solidFill>
+                      <a:prstDash val="dot"/>
+                      <a:round/>
+                      <a:headEnd type="none" w="med" len="med"/>
+                      <a:tailEnd type="none" w="med" len="med"/>
+                    </a:lnB>
+                  </a:tcPr>
+                </a:tc>
+                <a:tc>
+                  <a:txBody>
+                    <a:bodyPr/>
+                    <a:lstStyle/>
+                    <a:p>
+                      <a:pPr algn="ctr"/>
+                      <a:r>
+                        <a:rPr lang="en-US" sz="1600" dirty="0" smtClean="0">
+                          <a:solidFill>
+                            <a:schemeClr val="accent4">
+                              <a:lumMod val="75000"/>
+                            </a:schemeClr>
+                          </a:solidFill>
+                        </a:rPr>
+                        <a:t>Overrides</a:t>
+                      </a:r>
+                      <a:endParaRPr lang="en-US" sz="1600" dirty="0">
+                        <a:solidFill>
+                          <a:schemeClr val="accent4">
+                            <a:lumMod val="75000"/>
+                          </a:schemeClr>
+                        </a:solidFill>
+                      </a:endParaRPr>
+                    </a:p>
+                  </a:txBody>
+                  <a:tcPr anchor="ctr">
+                    <a:lnR w="12700" cap="flat" cmpd="sng" algn="ctr">
+                      <a:solidFill>
+                        <a:schemeClr val="tx1"/>
+                      </a:solidFill>
+                      <a:prstDash val="solid"/>
+                      <a:round/>
+                      <a:headEnd type="none" w="med" len="med"/>
+                      <a:tailEnd type="none" w="med" len="med"/>
+                    </a:lnR>
+                    <a:lnT w="12700" cap="flat" cmpd="sng" algn="ctr">
+                      <a:solidFill>
+                        <a:schemeClr val="tx1"/>
+                      </a:solidFill>
+                      <a:prstDash val="dot"/>
+                      <a:round/>
+                      <a:headEnd type="none" w="med" len="med"/>
+                      <a:tailEnd type="none" w="med" len="med"/>
+                    </a:lnT>
+                    <a:lnB w="12700" cap="flat" cmpd="sng" algn="ctr">
+                      <a:solidFill>
+                        <a:schemeClr val="tx1"/>
+                      </a:solidFill>
+                      <a:prstDash val="dot"/>
+                      <a:round/>
+                      <a:headEnd type="none" w="med" len="med"/>
+                      <a:tailEnd type="none" w="med" len="med"/>
+                    </a:lnB>
+                  </a:tcPr>
+                </a:tc>
+                <a:extLst>
+                  <a:ext uri="{0D108BD9-81ED-4DB2-BD59-A6C34878D82A}">
+                    <a16:rowId xmlns:a16="http://schemas.microsoft.com/office/drawing/2014/main" val="1310112458"/>
                   </a:ext>
                 </a:extLst>
               </a:tr>
@@ -4720,7 +4956,7 @@
         </p:blipFill>
         <p:spPr>
           <a:xfrm>
-            <a:off x="2163624" y="579386"/>
+            <a:off x="2163625" y="682946"/>
             <a:ext cx="8506985" cy="5077978"/>
           </a:xfrm>
           <a:prstGeom prst="rect">
@@ -4742,7 +4978,7 @@
         </p:nvSpPr>
         <p:spPr>
           <a:xfrm>
-            <a:off x="10880749" y="587059"/>
+            <a:off x="10880750" y="690619"/>
             <a:ext cx="2439425" cy="369460"/>
           </a:xfrm>
           <a:prstGeom prst="rect">
@@ -4789,7 +5025,7 @@
         </p:nvSpPr>
         <p:spPr>
           <a:xfrm>
-            <a:off x="10880749" y="1276856"/>
+            <a:off x="10880750" y="1380417"/>
             <a:ext cx="1897151" cy="1323439"/>
           </a:xfrm>
           <a:prstGeom prst="rect">
@@ -4844,7 +5080,7 @@
         <a:srgbClr val="E7E6E6"/>
       </a:lt2>
       <a:accent1>
-        <a:srgbClr val="4472C4"/>
+        <a:srgbClr val="5B9BD5"/>
       </a:accent1>
       <a:accent2>
         <a:srgbClr val="ED7D31"/>
@@ -4856,7 +5092,7 @@
         <a:srgbClr val="FFC000"/>
       </a:accent4>
       <a:accent5>
-        <a:srgbClr val="5B9BD5"/>
+        <a:srgbClr val="4472C4"/>
       </a:accent5>
       <a:accent6>
         <a:srgbClr val="70AD47"/>

</xml_diff>

<commit_message>
section order tweaks, also a last adjustment to margins.png
</commit_message>
<xml_diff>
--- a/man/figures/margins.pptx
+++ b/man/figures/margins.pptx
@@ -243,7 +243,7 @@
           <a:p>
             <a:fld id="{601E7828-7FC6-4336-B4EC-5F99010F00A5}" type="datetimeFigureOut">
               <a:rPr lang="en-US" smtClean="0"/>
-              <a:t>11/24/2020</a:t>
+              <a:t>11/25/2020</a:t>
             </a:fld>
             <a:endParaRPr lang="en-US"/>
           </a:p>
@@ -413,7 +413,7 @@
           <a:p>
             <a:fld id="{601E7828-7FC6-4336-B4EC-5F99010F00A5}" type="datetimeFigureOut">
               <a:rPr lang="en-US" smtClean="0"/>
-              <a:t>11/24/2020</a:t>
+              <a:t>11/25/2020</a:t>
             </a:fld>
             <a:endParaRPr lang="en-US"/>
           </a:p>
@@ -593,7 +593,7 @@
           <a:p>
             <a:fld id="{601E7828-7FC6-4336-B4EC-5F99010F00A5}" type="datetimeFigureOut">
               <a:rPr lang="en-US" smtClean="0"/>
-              <a:t>11/24/2020</a:t>
+              <a:t>11/25/2020</a:t>
             </a:fld>
             <a:endParaRPr lang="en-US"/>
           </a:p>
@@ -763,7 +763,7 @@
           <a:p>
             <a:fld id="{601E7828-7FC6-4336-B4EC-5F99010F00A5}" type="datetimeFigureOut">
               <a:rPr lang="en-US" smtClean="0"/>
-              <a:t>11/24/2020</a:t>
+              <a:t>11/25/2020</a:t>
             </a:fld>
             <a:endParaRPr lang="en-US"/>
           </a:p>
@@ -1009,7 +1009,7 @@
           <a:p>
             <a:fld id="{601E7828-7FC6-4336-B4EC-5F99010F00A5}" type="datetimeFigureOut">
               <a:rPr lang="en-US" smtClean="0"/>
-              <a:t>11/24/2020</a:t>
+              <a:t>11/25/2020</a:t>
             </a:fld>
             <a:endParaRPr lang="en-US"/>
           </a:p>
@@ -1241,7 +1241,7 @@
           <a:p>
             <a:fld id="{601E7828-7FC6-4336-B4EC-5F99010F00A5}" type="datetimeFigureOut">
               <a:rPr lang="en-US" smtClean="0"/>
-              <a:t>11/24/2020</a:t>
+              <a:t>11/25/2020</a:t>
             </a:fld>
             <a:endParaRPr lang="en-US"/>
           </a:p>
@@ -1608,7 +1608,7 @@
           <a:p>
             <a:fld id="{601E7828-7FC6-4336-B4EC-5F99010F00A5}" type="datetimeFigureOut">
               <a:rPr lang="en-US" smtClean="0"/>
-              <a:t>11/24/2020</a:t>
+              <a:t>11/25/2020</a:t>
             </a:fld>
             <a:endParaRPr lang="en-US"/>
           </a:p>
@@ -1726,7 +1726,7 @@
           <a:p>
             <a:fld id="{601E7828-7FC6-4336-B4EC-5F99010F00A5}" type="datetimeFigureOut">
               <a:rPr lang="en-US" smtClean="0"/>
-              <a:t>11/24/2020</a:t>
+              <a:t>11/25/2020</a:t>
             </a:fld>
             <a:endParaRPr lang="en-US"/>
           </a:p>
@@ -1821,7 +1821,7 @@
           <a:p>
             <a:fld id="{601E7828-7FC6-4336-B4EC-5F99010F00A5}" type="datetimeFigureOut">
               <a:rPr lang="en-US" smtClean="0"/>
-              <a:t>11/24/2020</a:t>
+              <a:t>11/25/2020</a:t>
             </a:fld>
             <a:endParaRPr lang="en-US"/>
           </a:p>
@@ -2098,7 +2098,7 @@
           <a:p>
             <a:fld id="{601E7828-7FC6-4336-B4EC-5F99010F00A5}" type="datetimeFigureOut">
               <a:rPr lang="en-US" smtClean="0"/>
-              <a:t>11/24/2020</a:t>
+              <a:t>11/25/2020</a:t>
             </a:fld>
             <a:endParaRPr lang="en-US"/>
           </a:p>
@@ -2355,7 +2355,7 @@
           <a:p>
             <a:fld id="{601E7828-7FC6-4336-B4EC-5F99010F00A5}" type="datetimeFigureOut">
               <a:rPr lang="en-US" smtClean="0"/>
-              <a:t>11/24/2020</a:t>
+              <a:t>11/25/2020</a:t>
             </a:fld>
             <a:endParaRPr lang="en-US"/>
           </a:p>
@@ -2568,7 +2568,7 @@
           <a:p>
             <a:fld id="{601E7828-7FC6-4336-B4EC-5F99010F00A5}" type="datetimeFigureOut">
               <a:rPr lang="en-US" smtClean="0"/>
-              <a:t>11/24/2020</a:t>
+              <a:t>11/25/2020</a:t>
             </a:fld>
             <a:endParaRPr lang="en-US"/>
           </a:p>
@@ -3168,52 +3168,6 @@
               </a:rPr>
               <a:t>height</a:t>
             </a:r>
-          </a:p>
-        </p:txBody>
-      </p:sp>
-      <p:sp>
-        <p:nvSpPr>
-          <p:cNvPr id="11" name="Left Brace 10"/>
-          <p:cNvSpPr/>
-          <p:nvPr/>
-        </p:nvSpPr>
-        <p:spPr>
-          <a:xfrm rot="10800000">
-            <a:off x="10690766" y="875287"/>
-            <a:ext cx="112084" cy="59056"/>
-          </a:xfrm>
-          <a:prstGeom prst="leftBrace">
-            <a:avLst>
-              <a:gd name="adj1" fmla="val 79717"/>
-              <a:gd name="adj2" fmla="val 50000"/>
-            </a:avLst>
-          </a:prstGeom>
-          <a:ln w="19050">
-            <a:solidFill>
-              <a:schemeClr val="accent6"/>
-            </a:solidFill>
-          </a:ln>
-        </p:spPr>
-        <p:style>
-          <a:lnRef idx="1">
-            <a:schemeClr val="accent1"/>
-          </a:lnRef>
-          <a:fillRef idx="0">
-            <a:schemeClr val="accent1"/>
-          </a:fillRef>
-          <a:effectRef idx="0">
-            <a:schemeClr val="accent1"/>
-          </a:effectRef>
-          <a:fontRef idx="minor">
-            <a:schemeClr val="tx1"/>
-          </a:fontRef>
-        </p:style>
-        <p:txBody>
-          <a:bodyPr rtlCol="0" anchor="ctr"/>
-          <a:lstStyle/>
-          <a:p>
-            <a:pPr algn="ctr"/>
-            <a:endParaRPr lang="en-US" sz="1801"/>
           </a:p>
         </p:txBody>
       </p:sp>
@@ -4966,53 +4920,6 @@
       </p:pic>
       <p:sp>
         <p:nvSpPr>
-          <p:cNvPr id="40" name="TextBox 39">
-            <a:extLst>
-              <a:ext uri="{FF2B5EF4-FFF2-40B4-BE49-F238E27FC236}">
-                <a16:creationId xmlns:a16="http://schemas.microsoft.com/office/drawing/2014/main" id="{7BFCDB99-5A0E-40F1-BF44-59BF0D547CCE}"/>
-              </a:ext>
-            </a:extLst>
-          </p:cNvPr>
-          <p:cNvSpPr txBox="1"/>
-          <p:nvPr/>
-        </p:nvSpPr>
-        <p:spPr>
-          <a:xfrm>
-            <a:off x="10880750" y="690619"/>
-            <a:ext cx="2439425" cy="369460"/>
-          </a:xfrm>
-          <a:prstGeom prst="rect">
-            <a:avLst/>
-          </a:prstGeom>
-          <a:noFill/>
-        </p:spPr>
-        <p:txBody>
-          <a:bodyPr wrap="square">
-            <a:spAutoFit/>
-          </a:bodyPr>
-          <a:lstStyle/>
-          <a:p>
-            <a:r>
-              <a:rPr lang="en-US" sz="1801" dirty="0" err="1">
-                <a:solidFill>
-                  <a:schemeClr val="accent6"/>
-                </a:solidFill>
-              </a:rPr>
-              <a:t>margin_legend_i</a:t>
-            </a:r>
-            <a:r>
-              <a:rPr lang="en-US" sz="1801" dirty="0">
-                <a:solidFill>
-                  <a:schemeClr val="accent6"/>
-                </a:solidFill>
-              </a:rPr>
-              <a:t> </a:t>
-            </a:r>
-          </a:p>
-        </p:txBody>
-      </p:sp>
-      <p:sp>
-        <p:nvSpPr>
           <p:cNvPr id="41" name="TextBox 40">
             <a:extLst>
               <a:ext uri="{FF2B5EF4-FFF2-40B4-BE49-F238E27FC236}">
@@ -5025,8 +4932,8 @@
         </p:nvSpPr>
         <p:spPr>
           <a:xfrm>
-            <a:off x="10880750" y="1380417"/>
-            <a:ext cx="1897151" cy="1323439"/>
+            <a:off x="10862318" y="1397730"/>
+            <a:ext cx="1697005" cy="1815882"/>
           </a:xfrm>
           <a:prstGeom prst="rect">
             <a:avLst/>
@@ -5040,13 +4947,34 @@
           <a:lstStyle/>
           <a:p>
             <a:r>
-              <a:rPr lang="en-US" sz="1600" i="1" dirty="0">
+              <a:rPr lang="en-US" sz="1600" i="1" dirty="0" err="1" smtClean="0">
                 <a:solidFill>
                   <a:schemeClr val="accent6"/>
                 </a:solidFill>
               </a:rPr>
-              <a:t>Note that “margin_legend_i” only applies when there are two or more legends.</a:t>
-            </a:r>
+              <a:t>margin_legend_i</a:t>
+            </a:r>
+            <a:r>
+              <a:rPr lang="en-US" sz="1600" i="1" dirty="0" smtClean="0">
+                <a:solidFill>
+                  <a:schemeClr val="accent6"/>
+                </a:solidFill>
+              </a:rPr>
+              <a:t>, not pictured,</a:t>
+            </a:r>
+            <a:r>
+              <a:rPr lang="en-US" sz="1600" i="1" dirty="0" smtClean="0">
+                <a:solidFill>
+                  <a:schemeClr val="accent6"/>
+                </a:solidFill>
+              </a:rPr>
+              <a:t> sets the vertical space between legends if there the plot contains more than one. </a:t>
+            </a:r>
+            <a:endParaRPr lang="en-US" sz="1600" i="1" dirty="0">
+              <a:solidFill>
+                <a:schemeClr val="accent6"/>
+              </a:solidFill>
+            </a:endParaRPr>
           </a:p>
         </p:txBody>
       </p:sp>

</xml_diff>